<commit_message>
mudanca slide conceito BI
</commit_message>
<xml_diff>
--- a/Apresentação/MadrugadaNerdzao_Trilha PBI.pptx
+++ b/Apresentação/MadrugadaNerdzao_Trilha PBI.pptx
@@ -6,26 +6,27 @@
     <p:sldMasterId id="2147483663" r:id="rId2"/>
   </p:sldMasterIdLst>
   <p:notesMasterIdLst>
-    <p:notesMasterId r:id="rId20"/>
+    <p:notesMasterId r:id="rId21"/>
   </p:notesMasterIdLst>
   <p:sldIdLst>
     <p:sldId id="256" r:id="rId3"/>
     <p:sldId id="327" r:id="rId4"/>
     <p:sldId id="335" r:id="rId5"/>
     <p:sldId id="336" r:id="rId6"/>
-    <p:sldId id="339" r:id="rId7"/>
-    <p:sldId id="337" r:id="rId8"/>
-    <p:sldId id="340" r:id="rId9"/>
-    <p:sldId id="328" r:id="rId10"/>
-    <p:sldId id="302" r:id="rId11"/>
-    <p:sldId id="324" r:id="rId12"/>
-    <p:sldId id="323" r:id="rId13"/>
-    <p:sldId id="329" r:id="rId14"/>
-    <p:sldId id="332" r:id="rId15"/>
-    <p:sldId id="333" r:id="rId16"/>
-    <p:sldId id="341" r:id="rId17"/>
-    <p:sldId id="342" r:id="rId18"/>
-    <p:sldId id="330" r:id="rId19"/>
+    <p:sldId id="344" r:id="rId7"/>
+    <p:sldId id="343" r:id="rId8"/>
+    <p:sldId id="337" r:id="rId9"/>
+    <p:sldId id="340" r:id="rId10"/>
+    <p:sldId id="328" r:id="rId11"/>
+    <p:sldId id="302" r:id="rId12"/>
+    <p:sldId id="324" r:id="rId13"/>
+    <p:sldId id="323" r:id="rId14"/>
+    <p:sldId id="329" r:id="rId15"/>
+    <p:sldId id="332" r:id="rId16"/>
+    <p:sldId id="333" r:id="rId17"/>
+    <p:sldId id="341" r:id="rId18"/>
+    <p:sldId id="342" r:id="rId19"/>
+    <p:sldId id="330" r:id="rId20"/>
   </p:sldIdLst>
   <p:sldSz cx="12192000" cy="6858000"/>
   <p:notesSz cx="6858000" cy="9144000"/>
@@ -225,7 +226,7 @@
           <a:p>
             <a:fld id="{49B60EF2-7028-489F-85D8-FE86CD7CF2A0}" type="datetimeFigureOut">
               <a:rPr lang="en-US" smtClean="0"/>
-              <a:t>2/22/2019</a:t>
+              <a:t>4/9/2019</a:t>
             </a:fld>
             <a:endParaRPr lang="en-US" dirty="0"/>
           </a:p>
@@ -620,23 +621,6 @@
           <a:bodyPr/>
           <a:lstStyle/>
           <a:p>
-            <a:pPr marL="0" marR="0" indent="0" algn="l" defTabSz="914400" rtl="0" eaLnBrk="1" fontAlgn="auto" latinLnBrk="0" hangingPunct="1">
-              <a:lnSpc>
-                <a:spcPct val="100000"/>
-              </a:lnSpc>
-              <a:spcBef>
-                <a:spcPts val="0"/>
-              </a:spcBef>
-              <a:spcAft>
-                <a:spcPts val="0"/>
-              </a:spcAft>
-              <a:buClrTx/>
-              <a:buSzTx/>
-              <a:buFontTx/>
-              <a:buNone/>
-              <a:tabLst/>
-              <a:defRPr/>
-            </a:pPr>
             <a:r>
               <a:rPr lang="en-US" sz="1200" kern="1200" dirty="0">
                 <a:solidFill>
@@ -647,7 +631,7 @@
                 <a:ea typeface="+mn-ea"/>
                 <a:cs typeface="+mn-cs"/>
               </a:rPr>
-              <a:t>The basic building block for all</a:t>
+              <a:t>Power</a:t>
             </a:r>
             <a:r>
               <a:rPr lang="en-US" sz="1200" kern="1200" baseline="0" dirty="0">
@@ -659,7 +643,7 @@
                 <a:ea typeface="+mn-ea"/>
                 <a:cs typeface="+mn-cs"/>
               </a:rPr>
-              <a:t> Business Intelligence elements in Power BI begins with the data itself. Data from various sources is filtered, cleaned, and combined into Reports via Visualizations, and optionally published to Dashboards. Dashboard data is surfaced to users on any device, based on permissions and organization needs.</a:t>
+              <a:t> BI is a high-level name for Microsoft’s Power BI Services and Tools Suite. In general, all tools draw on the underlying foundation of Power BI Services, which is exposed to users via a web-based design and administration experience. More powerful features are available in the Power BI Desktop application targeting the Windows platform, and mobile versions of Power PI exist for Windows Mobile, iOS, and Android devices that enable end users to interactively access and navigate report and dashboard information. Developer and administrators can also exposed the services of Power BI via Power BI embedded which includes a robust REST-based API as well as tools to create custom visualizations.</a:t>
             </a:r>
             <a:endParaRPr lang="en-US" dirty="0"/>
           </a:p>
@@ -691,7 +675,7 @@
     </p:spTree>
     <p:extLst>
       <p:ext uri="{BB962C8B-B14F-4D97-AF65-F5344CB8AC3E}">
-        <p14:creationId xmlns:p14="http://schemas.microsoft.com/office/powerpoint/2010/main" val="2592072261"/>
+        <p14:creationId xmlns:p14="http://schemas.microsoft.com/office/powerpoint/2010/main" val="82150574"/>
       </p:ext>
     </p:extLst>
   </p:cSld>
@@ -745,37 +729,46 @@
           <a:bodyPr/>
           <a:lstStyle/>
           <a:p>
-            <a:r>
-              <a:rPr lang="en-US" dirty="0"/>
-              <a:t>Data Analysis Expressions, or “DAX” includes a library of over 200 functions, operators, and constructs</a:t>
-            </a:r>
-            <a:r>
-              <a:rPr lang="en-US" baseline="0" dirty="0"/>
-              <a:t> and are </a:t>
-            </a:r>
-            <a:r>
-              <a:rPr lang="en-US" dirty="0"/>
-              <a:t>similar to Excel formulas. DAX has many of the same functions as Excel,</a:t>
-            </a:r>
-            <a:r>
-              <a:rPr lang="en-US" baseline="0" dirty="0"/>
-              <a:t> except that</a:t>
-            </a:r>
-            <a:r>
-              <a:rPr lang="en-US" dirty="0"/>
-              <a:t> DAX functions</a:t>
-            </a:r>
-            <a:r>
-              <a:rPr lang="en-US" baseline="0" dirty="0"/>
-              <a:t> </a:t>
-            </a:r>
-            <a:r>
-              <a:rPr lang="en-US" dirty="0"/>
-              <a:t>are meant to work over data interactively “sliced” or filtered in a report. If users are familiar with writing</a:t>
-            </a:r>
-            <a:r>
-              <a:rPr lang="en-US" baseline="0" dirty="0"/>
-              <a:t> Excel functions, its an easy transition into DAX.</a:t>
+            <a:pPr marL="0" marR="0" indent="0" algn="l" defTabSz="914400" rtl="0" eaLnBrk="1" fontAlgn="auto" latinLnBrk="0" hangingPunct="1">
+              <a:lnSpc>
+                <a:spcPct val="100000"/>
+              </a:lnSpc>
+              <a:spcBef>
+                <a:spcPts val="0"/>
+              </a:spcBef>
+              <a:spcAft>
+                <a:spcPts val="0"/>
+              </a:spcAft>
+              <a:buClrTx/>
+              <a:buSzTx/>
+              <a:buFontTx/>
+              <a:buNone/>
+              <a:tabLst/>
+              <a:defRPr/>
+            </a:pPr>
+            <a:r>
+              <a:rPr lang="en-US" sz="1200" kern="1200" dirty="0">
+                <a:solidFill>
+                  <a:schemeClr val="tx1"/>
+                </a:solidFill>
+                <a:effectLst/>
+                <a:latin typeface="+mn-lt"/>
+                <a:ea typeface="+mn-ea"/>
+                <a:cs typeface="+mn-cs"/>
+              </a:rPr>
+              <a:t>The basic building block for all</a:t>
+            </a:r>
+            <a:r>
+              <a:rPr lang="en-US" sz="1200" kern="1200" baseline="0" dirty="0">
+                <a:solidFill>
+                  <a:schemeClr val="tx1"/>
+                </a:solidFill>
+                <a:effectLst/>
+                <a:latin typeface="+mn-lt"/>
+                <a:ea typeface="+mn-ea"/>
+                <a:cs typeface="+mn-cs"/>
+              </a:rPr>
+              <a:t> Business Intelligence elements in Power BI begins with the data itself. Data from various sources is filtered, cleaned, and combined into Reports via Visualizations, and optionally published to Dashboards. Dashboard data is surfaced to users on any device, based on permissions and organization needs.</a:t>
             </a:r>
             <a:endParaRPr lang="en-US" dirty="0"/>
           </a:p>
@@ -807,7 +800,7 @@
     </p:spTree>
     <p:extLst>
       <p:ext uri="{BB962C8B-B14F-4D97-AF65-F5344CB8AC3E}">
-        <p14:creationId xmlns:p14="http://schemas.microsoft.com/office/powerpoint/2010/main" val="675805713"/>
+        <p14:creationId xmlns:p14="http://schemas.microsoft.com/office/powerpoint/2010/main" val="2592072261"/>
       </p:ext>
     </p:extLst>
   </p:cSld>
@@ -861,46 +854,37 @@
           <a:bodyPr/>
           <a:lstStyle/>
           <a:p>
-            <a:pPr marL="0" marR="0" indent="0" algn="l" defTabSz="914400" rtl="0" eaLnBrk="1" fontAlgn="auto" latinLnBrk="0" hangingPunct="1">
-              <a:lnSpc>
-                <a:spcPct val="100000"/>
-              </a:lnSpc>
-              <a:spcBef>
-                <a:spcPts val="0"/>
-              </a:spcBef>
-              <a:spcAft>
-                <a:spcPts val="0"/>
-              </a:spcAft>
-              <a:buClrTx/>
-              <a:buSzTx/>
-              <a:buFontTx/>
-              <a:buNone/>
-              <a:tabLst/>
-              <a:defRPr/>
-            </a:pPr>
-            <a:r>
-              <a:rPr lang="en-US" sz="1200" kern="1200" dirty="0">
-                <a:solidFill>
-                  <a:schemeClr val="tx1"/>
-                </a:solidFill>
-                <a:effectLst/>
-                <a:latin typeface="+mn-lt"/>
-                <a:ea typeface="+mn-ea"/>
-                <a:cs typeface="+mn-cs"/>
-              </a:rPr>
-              <a:t>The basic building block for all</a:t>
-            </a:r>
-            <a:r>
-              <a:rPr lang="en-US" sz="1200" kern="1200" baseline="0" dirty="0">
-                <a:solidFill>
-                  <a:schemeClr val="tx1"/>
-                </a:solidFill>
-                <a:effectLst/>
-                <a:latin typeface="+mn-lt"/>
-                <a:ea typeface="+mn-ea"/>
-                <a:cs typeface="+mn-cs"/>
-              </a:rPr>
-              <a:t> Business Intelligence elements in Power BI begins with the data itself. Data from various sources is filtered, cleaned, and combined into Reports via Visualizations, and optionally published to Dashboards. Dashboard data is surfaced to users on any device, based on permissions and organization needs.</a:t>
+            <a:r>
+              <a:rPr lang="en-US" dirty="0"/>
+              <a:t>Data Analysis Expressions, or “DAX” includes a library of over 200 functions, operators, and constructs</a:t>
+            </a:r>
+            <a:r>
+              <a:rPr lang="en-US" baseline="0" dirty="0"/>
+              <a:t> and are </a:t>
+            </a:r>
+            <a:r>
+              <a:rPr lang="en-US" dirty="0"/>
+              <a:t>similar to Excel formulas. DAX has many of the same functions as Excel,</a:t>
+            </a:r>
+            <a:r>
+              <a:rPr lang="en-US" baseline="0" dirty="0"/>
+              <a:t> except that</a:t>
+            </a:r>
+            <a:r>
+              <a:rPr lang="en-US" dirty="0"/>
+              <a:t> DAX functions</a:t>
+            </a:r>
+            <a:r>
+              <a:rPr lang="en-US" baseline="0" dirty="0"/>
+              <a:t> </a:t>
+            </a:r>
+            <a:r>
+              <a:rPr lang="en-US" dirty="0"/>
+              <a:t>are meant to work over data interactively “sliced” or filtered in a report. If users are familiar with writing</a:t>
+            </a:r>
+            <a:r>
+              <a:rPr lang="en-US" baseline="0" dirty="0"/>
+              <a:t> Excel functions, its an easy transition into DAX.</a:t>
             </a:r>
             <a:endParaRPr lang="en-US" dirty="0"/>
           </a:p>
@@ -932,7 +916,7 @@
     </p:spTree>
     <p:extLst>
       <p:ext uri="{BB962C8B-B14F-4D97-AF65-F5344CB8AC3E}">
-        <p14:creationId xmlns:p14="http://schemas.microsoft.com/office/powerpoint/2010/main" val="2062977108"/>
+        <p14:creationId xmlns:p14="http://schemas.microsoft.com/office/powerpoint/2010/main" val="675805713"/>
       </p:ext>
     </p:extLst>
   </p:cSld>
@@ -1057,7 +1041,7 @@
     </p:spTree>
     <p:extLst>
       <p:ext uri="{BB962C8B-B14F-4D97-AF65-F5344CB8AC3E}">
-        <p14:creationId xmlns:p14="http://schemas.microsoft.com/office/powerpoint/2010/main" val="902561100"/>
+        <p14:creationId xmlns:p14="http://schemas.microsoft.com/office/powerpoint/2010/main" val="2062977108"/>
       </p:ext>
     </p:extLst>
   </p:cSld>
@@ -1182,7 +1166,7 @@
     </p:spTree>
     <p:extLst>
       <p:ext uri="{BB962C8B-B14F-4D97-AF65-F5344CB8AC3E}">
-        <p14:creationId xmlns:p14="http://schemas.microsoft.com/office/powerpoint/2010/main" val="3154359787"/>
+        <p14:creationId xmlns:p14="http://schemas.microsoft.com/office/powerpoint/2010/main" val="902561100"/>
       </p:ext>
     </p:extLst>
   </p:cSld>
@@ -1307,7 +1291,7 @@
     </p:spTree>
     <p:extLst>
       <p:ext uri="{BB962C8B-B14F-4D97-AF65-F5344CB8AC3E}">
-        <p14:creationId xmlns:p14="http://schemas.microsoft.com/office/powerpoint/2010/main" val="3766662740"/>
+        <p14:creationId xmlns:p14="http://schemas.microsoft.com/office/powerpoint/2010/main" val="3154359787"/>
       </p:ext>
     </p:extLst>
   </p:cSld>
@@ -1432,7 +1416,7 @@
     </p:spTree>
     <p:extLst>
       <p:ext uri="{BB962C8B-B14F-4D97-AF65-F5344CB8AC3E}">
-        <p14:creationId xmlns:p14="http://schemas.microsoft.com/office/powerpoint/2010/main" val="145020510"/>
+        <p14:creationId xmlns:p14="http://schemas.microsoft.com/office/powerpoint/2010/main" val="3766662740"/>
       </p:ext>
     </p:extLst>
   </p:cSld>
@@ -1549,6 +1533,131 @@
             <a:fld id="{01283FAC-A721-45A3-BBDE-EAF2B09B7CD9}" type="slidenum">
               <a:rPr lang="en-US" smtClean="0"/>
               <a:t>17</a:t>
+            </a:fld>
+            <a:endParaRPr lang="en-US" dirty="0"/>
+          </a:p>
+        </p:txBody>
+      </p:sp>
+    </p:spTree>
+    <p:extLst>
+      <p:ext uri="{BB962C8B-B14F-4D97-AF65-F5344CB8AC3E}">
+        <p14:creationId xmlns:p14="http://schemas.microsoft.com/office/powerpoint/2010/main" val="145020510"/>
+      </p:ext>
+    </p:extLst>
+  </p:cSld>
+  <p:clrMapOvr>
+    <a:masterClrMapping/>
+  </p:clrMapOvr>
+</p:notes>
+</file>
+
+<file path=ppt/notesSlides/notesSlide18.xml><?xml version="1.0" encoding="utf-8"?>
+<p:notes xmlns:a="http://schemas.openxmlformats.org/drawingml/2006/main" xmlns:r="http://schemas.openxmlformats.org/officeDocument/2006/relationships" xmlns:p="http://schemas.openxmlformats.org/presentationml/2006/main">
+  <p:cSld>
+    <p:spTree>
+      <p:nvGrpSpPr>
+        <p:cNvPr id="1" name=""/>
+        <p:cNvGrpSpPr/>
+        <p:nvPr/>
+      </p:nvGrpSpPr>
+      <p:grpSpPr>
+        <a:xfrm>
+          <a:off x="0" y="0"/>
+          <a:ext cx="0" cy="0"/>
+          <a:chOff x="0" y="0"/>
+          <a:chExt cx="0" cy="0"/>
+        </a:xfrm>
+      </p:grpSpPr>
+      <p:sp>
+        <p:nvSpPr>
+          <p:cNvPr id="2" name="Slide Image Placeholder 1"/>
+          <p:cNvSpPr>
+            <a:spLocks noGrp="1" noRot="1" noChangeAspect="1"/>
+          </p:cNvSpPr>
+          <p:nvPr>
+            <p:ph type="sldImg"/>
+          </p:nvPr>
+        </p:nvSpPr>
+        <p:spPr/>
+      </p:sp>
+      <p:sp>
+        <p:nvSpPr>
+          <p:cNvPr id="3" name="Notes Placeholder 2"/>
+          <p:cNvSpPr>
+            <a:spLocks noGrp="1"/>
+          </p:cNvSpPr>
+          <p:nvPr>
+            <p:ph type="body" idx="1"/>
+          </p:nvPr>
+        </p:nvSpPr>
+        <p:spPr/>
+        <p:txBody>
+          <a:bodyPr/>
+          <a:lstStyle/>
+          <a:p>
+            <a:pPr marL="0" marR="0" indent="0" algn="l" defTabSz="914400" rtl="0" eaLnBrk="1" fontAlgn="auto" latinLnBrk="0" hangingPunct="1">
+              <a:lnSpc>
+                <a:spcPct val="100000"/>
+              </a:lnSpc>
+              <a:spcBef>
+                <a:spcPts val="0"/>
+              </a:spcBef>
+              <a:spcAft>
+                <a:spcPts val="0"/>
+              </a:spcAft>
+              <a:buClrTx/>
+              <a:buSzTx/>
+              <a:buFontTx/>
+              <a:buNone/>
+              <a:tabLst/>
+              <a:defRPr/>
+            </a:pPr>
+            <a:r>
+              <a:rPr lang="en-US" sz="1200" kern="1200" dirty="0">
+                <a:solidFill>
+                  <a:schemeClr val="tx1"/>
+                </a:solidFill>
+                <a:effectLst/>
+                <a:latin typeface="+mn-lt"/>
+                <a:ea typeface="+mn-ea"/>
+                <a:cs typeface="+mn-cs"/>
+              </a:rPr>
+              <a:t>The basic building block for all</a:t>
+            </a:r>
+            <a:r>
+              <a:rPr lang="en-US" sz="1200" kern="1200" baseline="0" dirty="0">
+                <a:solidFill>
+                  <a:schemeClr val="tx1"/>
+                </a:solidFill>
+                <a:effectLst/>
+                <a:latin typeface="+mn-lt"/>
+                <a:ea typeface="+mn-ea"/>
+                <a:cs typeface="+mn-cs"/>
+              </a:rPr>
+              <a:t> Business Intelligence elements in Power BI begins with the data itself. Data from various sources is filtered, cleaned, and combined into Reports via Visualizations, and optionally published to Dashboards. Dashboard data is surfaced to users on any device, based on permissions and organization needs.</a:t>
+            </a:r>
+            <a:endParaRPr lang="en-US" dirty="0"/>
+          </a:p>
+        </p:txBody>
+      </p:sp>
+      <p:sp>
+        <p:nvSpPr>
+          <p:cNvPr id="4" name="Slide Number Placeholder 3"/>
+          <p:cNvSpPr>
+            <a:spLocks noGrp="1"/>
+          </p:cNvSpPr>
+          <p:nvPr>
+            <p:ph type="sldNum" sz="quarter" idx="10"/>
+          </p:nvPr>
+        </p:nvSpPr>
+        <p:spPr/>
+        <p:txBody>
+          <a:bodyPr/>
+          <a:lstStyle/>
+          <a:p>
+            <a:fld id="{01283FAC-A721-45A3-BBDE-EAF2B09B7CD9}" type="slidenum">
+              <a:rPr lang="en-US" smtClean="0"/>
+              <a:t>18</a:t>
             </a:fld>
             <a:endParaRPr lang="en-US" dirty="0"/>
           </a:p>
@@ -2117,7 +2226,7 @@
     </p:spTree>
     <p:extLst>
       <p:ext uri="{BB962C8B-B14F-4D97-AF65-F5344CB8AC3E}">
-        <p14:creationId xmlns:p14="http://schemas.microsoft.com/office/powerpoint/2010/main" val="3298797779"/>
+        <p14:creationId xmlns:p14="http://schemas.microsoft.com/office/powerpoint/2010/main" val="4071453709"/>
       </p:ext>
     </p:extLst>
   </p:cSld>
@@ -2257,7 +2366,7 @@
     </p:spTree>
     <p:extLst>
       <p:ext uri="{BB962C8B-B14F-4D97-AF65-F5344CB8AC3E}">
-        <p14:creationId xmlns:p14="http://schemas.microsoft.com/office/powerpoint/2010/main" val="1522689446"/>
+        <p14:creationId xmlns:p14="http://schemas.microsoft.com/office/powerpoint/2010/main" val="2926916927"/>
       </p:ext>
     </p:extLst>
   </p:cSld>
@@ -2397,7 +2506,7 @@
     </p:spTree>
     <p:extLst>
       <p:ext uri="{BB962C8B-B14F-4D97-AF65-F5344CB8AC3E}">
-        <p14:creationId xmlns:p14="http://schemas.microsoft.com/office/powerpoint/2010/main" val="2120980869"/>
+        <p14:creationId xmlns:p14="http://schemas.microsoft.com/office/powerpoint/2010/main" val="1522689446"/>
       </p:ext>
     </p:extLst>
   </p:cSld>
@@ -2537,7 +2646,7 @@
     </p:spTree>
     <p:extLst>
       <p:ext uri="{BB962C8B-B14F-4D97-AF65-F5344CB8AC3E}">
-        <p14:creationId xmlns:p14="http://schemas.microsoft.com/office/powerpoint/2010/main" val="1470035727"/>
+        <p14:creationId xmlns:p14="http://schemas.microsoft.com/office/powerpoint/2010/main" val="2120980869"/>
       </p:ext>
     </p:extLst>
   </p:cSld>
@@ -2601,7 +2710,7 @@
                 <a:ea typeface="+mn-ea"/>
                 <a:cs typeface="+mn-cs"/>
               </a:rPr>
-              <a:t>Power</a:t>
+              <a:t>Power BI can unify all of your organization’s data, whether in the cloud or on-premises. Using the Power BI gateways, you can connect SQL Server databases, Analysis Services models, and many other data sources to your same dashboards in Power BI. If you already have reporting portals or applications, you</a:t>
             </a:r>
             <a:r>
               <a:rPr lang="en-US" sz="1200" kern="1200" baseline="0" dirty="0">
@@ -2613,9 +2722,41 @@
                 <a:ea typeface="+mn-ea"/>
                 <a:cs typeface="+mn-cs"/>
               </a:rPr>
-              <a:t> BI is a high-level name for Microsoft’s Power BI Services and Tools Suite. In general, all tools draw on the underlying foundation of Power BI Services, which is exposed to users via a web-based design and administration experience. More powerful features are available in the Power BI Desktop application targeting the Windows platform, and mobile versions of Power PI exist for Windows Mobile, iOS, and Android devices that enable end users to interactively access and navigate report and dashboard information. Developer and administrators can also exposed the services of Power BI via Power BI embedded which includes a robust REST-based API as well as tools to create custom visualizations.</a:t>
-            </a:r>
-            <a:endParaRPr lang="en-US" dirty="0"/>
+              <a:t> can </a:t>
+            </a:r>
+            <a:r>
+              <a:rPr lang="en-US" sz="1200" kern="1200" dirty="0">
+                <a:solidFill>
+                  <a:schemeClr val="tx1"/>
+                </a:solidFill>
+                <a:effectLst/>
+                <a:latin typeface="+mn-lt"/>
+                <a:ea typeface="+mn-ea"/>
+                <a:cs typeface="+mn-cs"/>
+              </a:rPr>
+              <a:t>embed Power BI reports and dashboards into web and app scenarios for a unified experience</a:t>
+            </a:r>
+            <a:r>
+              <a:rPr lang="en-US" sz="1200" kern="1200" baseline="0" dirty="0">
+                <a:solidFill>
+                  <a:schemeClr val="tx1"/>
+                </a:solidFill>
+                <a:effectLst/>
+                <a:latin typeface="+mn-lt"/>
+                <a:ea typeface="+mn-ea"/>
+                <a:cs typeface="+mn-cs"/>
+              </a:rPr>
+              <a:t> across any device or platform.</a:t>
+            </a:r>
+            <a:endParaRPr lang="en-US" sz="1200" kern="1200" dirty="0">
+              <a:solidFill>
+                <a:schemeClr val="tx1"/>
+              </a:solidFill>
+              <a:effectLst/>
+              <a:latin typeface="+mn-lt"/>
+              <a:ea typeface="+mn-ea"/>
+              <a:cs typeface="+mn-cs"/>
+            </a:endParaRPr>
           </a:p>
         </p:txBody>
       </p:sp>
@@ -2645,7 +2786,7 @@
     </p:spTree>
     <p:extLst>
       <p:ext uri="{BB962C8B-B14F-4D97-AF65-F5344CB8AC3E}">
-        <p14:creationId xmlns:p14="http://schemas.microsoft.com/office/powerpoint/2010/main" val="82150574"/>
+        <p14:creationId xmlns:p14="http://schemas.microsoft.com/office/powerpoint/2010/main" val="1470035727"/>
       </p:ext>
     </p:extLst>
   </p:cSld>
@@ -2802,7 +2943,7 @@
           <a:p>
             <a:fld id="{0459C166-16D3-4A25-A2F8-C51E0E346B22}" type="datetimeFigureOut">
               <a:rPr lang="en-US" smtClean="0"/>
-              <a:t>2/22/2019</a:t>
+              <a:t>4/9/2019</a:t>
             </a:fld>
             <a:endParaRPr lang="en-US" dirty="0"/>
           </a:p>
@@ -2897,7 +3038,7 @@
           <a:p>
             <a:fld id="{0459C166-16D3-4A25-A2F8-C51E0E346B22}" type="datetimeFigureOut">
               <a:rPr lang="en-US" smtClean="0"/>
-              <a:t>2/22/2019</a:t>
+              <a:t>4/9/2019</a:t>
             </a:fld>
             <a:endParaRPr lang="en-US" dirty="0"/>
           </a:p>
@@ -3172,7 +3313,7 @@
           <a:p>
             <a:fld id="{0459C166-16D3-4A25-A2F8-C51E0E346B22}" type="datetimeFigureOut">
               <a:rPr lang="en-US" smtClean="0"/>
-              <a:t>2/22/2019</a:t>
+              <a:t>4/9/2019</a:t>
             </a:fld>
             <a:endParaRPr lang="en-US" dirty="0"/>
           </a:p>
@@ -3424,7 +3565,7 @@
           <a:p>
             <a:fld id="{0459C166-16D3-4A25-A2F8-C51E0E346B22}" type="datetimeFigureOut">
               <a:rPr lang="en-US" smtClean="0"/>
-              <a:t>2/22/2019</a:t>
+              <a:t>4/9/2019</a:t>
             </a:fld>
             <a:endParaRPr lang="en-US" dirty="0"/>
           </a:p>
@@ -3592,7 +3733,7 @@
           <a:p>
             <a:fld id="{0459C166-16D3-4A25-A2F8-C51E0E346B22}" type="datetimeFigureOut">
               <a:rPr lang="en-US" smtClean="0"/>
-              <a:t>2/22/2019</a:t>
+              <a:t>4/9/2019</a:t>
             </a:fld>
             <a:endParaRPr lang="en-US" dirty="0"/>
           </a:p>
@@ -3770,7 +3911,7 @@
           <a:p>
             <a:fld id="{0459C166-16D3-4A25-A2F8-C51E0E346B22}" type="datetimeFigureOut">
               <a:rPr lang="en-US" smtClean="0"/>
-              <a:t>2/22/2019</a:t>
+              <a:t>4/9/2019</a:t>
             </a:fld>
             <a:endParaRPr lang="en-US" dirty="0"/>
           </a:p>
@@ -5675,7 +5816,7 @@
           <a:p>
             <a:fld id="{0459C166-16D3-4A25-A2F8-C51E0E346B22}" type="datetimeFigureOut">
               <a:rPr lang="en-US" smtClean="0"/>
-              <a:t>2/22/2019</a:t>
+              <a:t>4/9/2019</a:t>
             </a:fld>
             <a:endParaRPr lang="en-US" dirty="0"/>
           </a:p>
@@ -11239,7 +11380,7 @@
             <a:fld id="{0459C166-16D3-4A25-A2F8-C51E0E346B22}" type="datetimeFigureOut">
               <a:rPr lang="en-US" smtClean="0"/>
               <a:pPr/>
-              <a:t>2/22/2019</a:t>
+              <a:t>4/9/2019</a:t>
             </a:fld>
             <a:endParaRPr lang="en-US" dirty="0"/>
           </a:p>
@@ -14457,7 +14598,7 @@
             <a:fld id="{96DFF08F-DC6B-4601-B491-B0F83F6DD2DA}" type="datetimeFigureOut">
               <a:rPr lang="en-US" dirty="0"/>
               <a:pPr/>
-              <a:t>2/22/2019</a:t>
+              <a:t>4/9/2019</a:t>
             </a:fld>
             <a:endParaRPr lang="en-US" dirty="0"/>
           </a:p>
@@ -15332,7 +15473,7 @@
           <a:p>
             <a:fld id="{0459C166-16D3-4A25-A2F8-C51E0E346B22}" type="datetimeFigureOut">
               <a:rPr lang="en-US" smtClean="0"/>
-              <a:t>2/22/2019</a:t>
+              <a:t>4/9/2019</a:t>
             </a:fld>
             <a:endParaRPr lang="en-US" dirty="0"/>
           </a:p>
@@ -15696,7 +15837,7 @@
           <a:p>
             <a:fld id="{0459C166-16D3-4A25-A2F8-C51E0E346B22}" type="datetimeFigureOut">
               <a:rPr lang="en-US" smtClean="0"/>
-              <a:t>2/22/2019</a:t>
+              <a:t>4/9/2019</a:t>
             </a:fld>
             <a:endParaRPr lang="en-US" dirty="0"/>
           </a:p>
@@ -15813,7 +15954,7 @@
           <a:p>
             <a:fld id="{0459C166-16D3-4A25-A2F8-C51E0E346B22}" type="datetimeFigureOut">
               <a:rPr lang="en-US" smtClean="0"/>
-              <a:t>2/22/2019</a:t>
+              <a:t>4/9/2019</a:t>
             </a:fld>
             <a:endParaRPr lang="en-US" dirty="0"/>
           </a:p>
@@ -16024,7 +16165,7 @@
           <a:p>
             <a:fld id="{0459C166-16D3-4A25-A2F8-C51E0E346B22}" type="datetimeFigureOut">
               <a:rPr lang="en-US" smtClean="0"/>
-              <a:t>2/22/2019</a:t>
+              <a:t>4/9/2019</a:t>
             </a:fld>
             <a:endParaRPr lang="en-US" dirty="0"/>
           </a:p>
@@ -17679,6 +17820,869 @@
             <p:ph type="title"/>
           </p:nvPr>
         </p:nvSpPr>
+        <p:spPr>
+          <a:xfrm>
+            <a:off x="683728" y="386097"/>
+            <a:ext cx="10515600" cy="1325563"/>
+          </a:xfrm>
+        </p:spPr>
+        <p:txBody>
+          <a:bodyPr/>
+          <a:lstStyle/>
+          <a:p>
+            <a:r>
+              <a:rPr lang="en-US" dirty="0"/>
+              <a:t>Principais Elementos</a:t>
+            </a:r>
+          </a:p>
+        </p:txBody>
+      </p:sp>
+      <p:sp>
+        <p:nvSpPr>
+          <p:cNvPr id="7" name="Rectangle 6"/>
+          <p:cNvSpPr/>
+          <p:nvPr/>
+        </p:nvSpPr>
+        <p:spPr bwMode="auto">
+          <a:xfrm>
+            <a:off x="3426928" y="1853174"/>
+            <a:ext cx="2636991" cy="790489"/>
+          </a:xfrm>
+          <a:prstGeom prst="rect">
+            <a:avLst/>
+          </a:prstGeom>
+          <a:solidFill>
+            <a:srgbClr val="F2C811"/>
+          </a:solidFill>
+          <a:ln>
+            <a:noFill/>
+            <a:headEnd type="none" w="med" len="med"/>
+            <a:tailEnd type="none" w="med" len="med"/>
+          </a:ln>
+          <a:effectLst/>
+        </p:spPr>
+        <p:style>
+          <a:lnRef idx="1">
+            <a:schemeClr val="accent2"/>
+          </a:lnRef>
+          <a:fillRef idx="3">
+            <a:schemeClr val="accent2"/>
+          </a:fillRef>
+          <a:effectRef idx="2">
+            <a:schemeClr val="accent2"/>
+          </a:effectRef>
+          <a:fontRef idx="minor">
+            <a:schemeClr val="lt1"/>
+          </a:fontRef>
+        </p:style>
+        <p:txBody>
+          <a:bodyPr vert="horz" wrap="square" lIns="91436" tIns="45718" rIns="91436" bIns="45718" numCol="1" rtlCol="0" anchor="ctr" anchorCtr="0" compatLnSpc="1">
+            <a:prstTxWarp prst="textNoShape">
+              <a:avLst/>
+            </a:prstTxWarp>
+          </a:bodyPr>
+          <a:lstStyle/>
+          <a:p>
+            <a:pPr algn="ctr" defTabSz="914099" fontAlgn="base">
+              <a:spcBef>
+                <a:spcPct val="0"/>
+              </a:spcBef>
+              <a:spcAft>
+                <a:spcPct val="0"/>
+              </a:spcAft>
+            </a:pPr>
+            <a:r>
+              <a:rPr lang="en-US" sz="2800" dirty="0">
+                <a:solidFill>
+                  <a:schemeClr val="tx1"/>
+                </a:solidFill>
+              </a:rPr>
+              <a:t>Desktop</a:t>
+            </a:r>
+          </a:p>
+        </p:txBody>
+      </p:sp>
+      <p:sp>
+        <p:nvSpPr>
+          <p:cNvPr id="8" name="Rectangle 7"/>
+          <p:cNvSpPr/>
+          <p:nvPr/>
+        </p:nvSpPr>
+        <p:spPr bwMode="auto">
+          <a:xfrm>
+            <a:off x="6170128" y="1853174"/>
+            <a:ext cx="2648217" cy="790489"/>
+          </a:xfrm>
+          <a:prstGeom prst="rect">
+            <a:avLst/>
+          </a:prstGeom>
+          <a:solidFill>
+            <a:srgbClr val="F2C811"/>
+          </a:solidFill>
+          <a:ln>
+            <a:noFill/>
+            <a:headEnd type="none" w="med" len="med"/>
+            <a:tailEnd type="none" w="med" len="med"/>
+          </a:ln>
+          <a:effectLst/>
+        </p:spPr>
+        <p:style>
+          <a:lnRef idx="1">
+            <a:schemeClr val="accent2"/>
+          </a:lnRef>
+          <a:fillRef idx="3">
+            <a:schemeClr val="accent2"/>
+          </a:fillRef>
+          <a:effectRef idx="2">
+            <a:schemeClr val="accent2"/>
+          </a:effectRef>
+          <a:fontRef idx="minor">
+            <a:schemeClr val="lt1"/>
+          </a:fontRef>
+        </p:style>
+        <p:txBody>
+          <a:bodyPr vert="horz" wrap="square" lIns="91436" tIns="45718" rIns="91436" bIns="45718" numCol="1" rtlCol="0" anchor="ctr" anchorCtr="0" compatLnSpc="1">
+            <a:prstTxWarp prst="textNoShape">
+              <a:avLst/>
+            </a:prstTxWarp>
+          </a:bodyPr>
+          <a:lstStyle/>
+          <a:p>
+            <a:pPr algn="ctr" defTabSz="914099" fontAlgn="base">
+              <a:spcBef>
+                <a:spcPct val="0"/>
+              </a:spcBef>
+              <a:spcAft>
+                <a:spcPct val="0"/>
+              </a:spcAft>
+            </a:pPr>
+            <a:r>
+              <a:rPr lang="en-US" sz="2800" dirty="0">
+                <a:solidFill>
+                  <a:schemeClr val="tx1"/>
+                </a:solidFill>
+              </a:rPr>
+              <a:t>Mobile</a:t>
+            </a:r>
+          </a:p>
+        </p:txBody>
+      </p:sp>
+      <p:sp>
+        <p:nvSpPr>
+          <p:cNvPr id="9" name="Rectangle 8"/>
+          <p:cNvSpPr/>
+          <p:nvPr/>
+        </p:nvSpPr>
+        <p:spPr bwMode="auto">
+          <a:xfrm>
+            <a:off x="683728" y="1864096"/>
+            <a:ext cx="2636991" cy="790489"/>
+          </a:xfrm>
+          <a:prstGeom prst="rect">
+            <a:avLst/>
+          </a:prstGeom>
+          <a:solidFill>
+            <a:srgbClr val="F2C811"/>
+          </a:solidFill>
+          <a:ln>
+            <a:noFill/>
+            <a:headEnd type="none" w="med" len="med"/>
+            <a:tailEnd type="none" w="med" len="med"/>
+          </a:ln>
+          <a:effectLst/>
+        </p:spPr>
+        <p:style>
+          <a:lnRef idx="1">
+            <a:schemeClr val="accent2"/>
+          </a:lnRef>
+          <a:fillRef idx="3">
+            <a:schemeClr val="accent2"/>
+          </a:fillRef>
+          <a:effectRef idx="2">
+            <a:schemeClr val="accent2"/>
+          </a:effectRef>
+          <a:fontRef idx="minor">
+            <a:schemeClr val="lt1"/>
+          </a:fontRef>
+        </p:style>
+        <p:txBody>
+          <a:bodyPr vert="horz" wrap="square" lIns="91436" tIns="45718" rIns="91436" bIns="45718" numCol="1" rtlCol="0" anchor="ctr" anchorCtr="0" compatLnSpc="1">
+            <a:prstTxWarp prst="textNoShape">
+              <a:avLst/>
+            </a:prstTxWarp>
+          </a:bodyPr>
+          <a:lstStyle/>
+          <a:p>
+            <a:pPr algn="ctr" defTabSz="914099" fontAlgn="base">
+              <a:spcBef>
+                <a:spcPct val="0"/>
+              </a:spcBef>
+              <a:spcAft>
+                <a:spcPct val="0"/>
+              </a:spcAft>
+            </a:pPr>
+            <a:r>
+              <a:rPr lang="en-US" sz="2800" dirty="0">
+                <a:solidFill>
+                  <a:schemeClr val="tx1"/>
+                </a:solidFill>
+              </a:rPr>
+              <a:t>Services</a:t>
+            </a:r>
+          </a:p>
+        </p:txBody>
+      </p:sp>
+      <p:cxnSp>
+        <p:nvCxnSpPr>
+          <p:cNvPr id="10" name="Straight Connector 9"/>
+          <p:cNvCxnSpPr/>
+          <p:nvPr/>
+        </p:nvCxnSpPr>
+        <p:spPr>
+          <a:xfrm flipH="1">
+            <a:off x="3360170" y="1864096"/>
+            <a:ext cx="4673" cy="4343400"/>
+          </a:xfrm>
+          <a:prstGeom prst="line">
+            <a:avLst/>
+          </a:prstGeom>
+          <a:ln>
+            <a:solidFill>
+              <a:srgbClr val="212121"/>
+            </a:solidFill>
+          </a:ln>
+        </p:spPr>
+        <p:style>
+          <a:lnRef idx="1">
+            <a:schemeClr val="accent1"/>
+          </a:lnRef>
+          <a:fillRef idx="0">
+            <a:schemeClr val="accent1"/>
+          </a:fillRef>
+          <a:effectRef idx="0">
+            <a:schemeClr val="accent1"/>
+          </a:effectRef>
+          <a:fontRef idx="minor">
+            <a:schemeClr val="tx1"/>
+          </a:fontRef>
+        </p:style>
+      </p:cxnSp>
+      <p:cxnSp>
+        <p:nvCxnSpPr>
+          <p:cNvPr id="11" name="Straight Connector 10"/>
+          <p:cNvCxnSpPr/>
+          <p:nvPr/>
+        </p:nvCxnSpPr>
+        <p:spPr>
+          <a:xfrm flipH="1">
+            <a:off x="8860904" y="1864096"/>
+            <a:ext cx="4673" cy="4343400"/>
+          </a:xfrm>
+          <a:prstGeom prst="line">
+            <a:avLst/>
+          </a:prstGeom>
+          <a:ln>
+            <a:solidFill>
+              <a:srgbClr val="212121"/>
+            </a:solidFill>
+          </a:ln>
+        </p:spPr>
+        <p:style>
+          <a:lnRef idx="1">
+            <a:schemeClr val="accent1"/>
+          </a:lnRef>
+          <a:fillRef idx="0">
+            <a:schemeClr val="accent1"/>
+          </a:fillRef>
+          <a:effectRef idx="0">
+            <a:schemeClr val="accent1"/>
+          </a:effectRef>
+          <a:fontRef idx="minor">
+            <a:schemeClr val="tx1"/>
+          </a:fontRef>
+        </p:style>
+      </p:cxnSp>
+      <p:sp>
+        <p:nvSpPr>
+          <p:cNvPr id="13" name="Rectangle 12"/>
+          <p:cNvSpPr/>
+          <p:nvPr/>
+        </p:nvSpPr>
+        <p:spPr bwMode="auto">
+          <a:xfrm>
+            <a:off x="8924554" y="1853174"/>
+            <a:ext cx="2648217" cy="790489"/>
+          </a:xfrm>
+          <a:prstGeom prst="rect">
+            <a:avLst/>
+          </a:prstGeom>
+          <a:solidFill>
+            <a:srgbClr val="F2C811"/>
+          </a:solidFill>
+          <a:ln>
+            <a:noFill/>
+            <a:headEnd type="none" w="med" len="med"/>
+            <a:tailEnd type="none" w="med" len="med"/>
+          </a:ln>
+          <a:effectLst/>
+        </p:spPr>
+        <p:style>
+          <a:lnRef idx="1">
+            <a:schemeClr val="accent2"/>
+          </a:lnRef>
+          <a:fillRef idx="3">
+            <a:schemeClr val="accent2"/>
+          </a:fillRef>
+          <a:effectRef idx="2">
+            <a:schemeClr val="accent2"/>
+          </a:effectRef>
+          <a:fontRef idx="minor">
+            <a:schemeClr val="lt1"/>
+          </a:fontRef>
+        </p:style>
+        <p:txBody>
+          <a:bodyPr vert="horz" wrap="square" lIns="91436" tIns="45718" rIns="91436" bIns="45718" numCol="1" rtlCol="0" anchor="ctr" anchorCtr="0" compatLnSpc="1">
+            <a:prstTxWarp prst="textNoShape">
+              <a:avLst/>
+            </a:prstTxWarp>
+          </a:bodyPr>
+          <a:lstStyle/>
+          <a:p>
+            <a:pPr algn="ctr" defTabSz="914099" fontAlgn="base">
+              <a:spcBef>
+                <a:spcPct val="0"/>
+              </a:spcBef>
+              <a:spcAft>
+                <a:spcPct val="0"/>
+              </a:spcAft>
+            </a:pPr>
+            <a:r>
+              <a:rPr lang="en-US" sz="2800" dirty="0">
+                <a:solidFill>
+                  <a:schemeClr val="tx1"/>
+                </a:solidFill>
+              </a:rPr>
+              <a:t>Embedded</a:t>
+            </a:r>
+          </a:p>
+        </p:txBody>
+      </p:sp>
+      <p:sp>
+        <p:nvSpPr>
+          <p:cNvPr id="14" name="Rectangle 13"/>
+          <p:cNvSpPr/>
+          <p:nvPr/>
+        </p:nvSpPr>
+        <p:spPr>
+          <a:xfrm>
+            <a:off x="699933" y="2807021"/>
+            <a:ext cx="2582958" cy="3367076"/>
+          </a:xfrm>
+          <a:prstGeom prst="rect">
+            <a:avLst/>
+          </a:prstGeom>
+        </p:spPr>
+        <p:txBody>
+          <a:bodyPr wrap="square" anchor="t" anchorCtr="0">
+            <a:spAutoFit/>
+          </a:bodyPr>
+          <a:lstStyle/>
+          <a:p>
+            <a:pPr marL="231775" indent="-231775">
+              <a:lnSpc>
+                <a:spcPct val="95000"/>
+              </a:lnSpc>
+              <a:buSzPct val="90000"/>
+              <a:buFont typeface="Arial" panose="020B0604020202020204" pitchFamily="34" charset="0"/>
+              <a:buChar char="•"/>
+            </a:pPr>
+            <a:r>
+              <a:rPr lang="en-US" sz="2800" spc="-200" dirty="0">
+                <a:latin typeface="Segoe UI" panose="020B0502040204020203" pitchFamily="34" charset="0"/>
+                <a:cs typeface="Segoe UI" panose="020B0502040204020203" pitchFamily="34" charset="0"/>
+              </a:rPr>
+              <a:t>Web-based</a:t>
+            </a:r>
+          </a:p>
+          <a:p>
+            <a:pPr marL="231775" indent="-231775">
+              <a:lnSpc>
+                <a:spcPct val="95000"/>
+              </a:lnSpc>
+              <a:buSzPct val="90000"/>
+              <a:buFont typeface="Arial" panose="020B0604020202020204" pitchFamily="34" charset="0"/>
+              <a:buChar char="•"/>
+            </a:pPr>
+            <a:r>
+              <a:rPr lang="en-US" sz="2800" spc="-200" dirty="0">
+                <a:latin typeface="Segoe UI" panose="020B0502040204020203" pitchFamily="34" charset="0"/>
+                <a:cs typeface="Segoe UI" panose="020B0502040204020203" pitchFamily="34" charset="0"/>
+              </a:rPr>
+              <a:t>All platforms</a:t>
+            </a:r>
+          </a:p>
+          <a:p>
+            <a:pPr marL="231775" indent="-231775">
+              <a:lnSpc>
+                <a:spcPct val="95000"/>
+              </a:lnSpc>
+              <a:buSzPct val="90000"/>
+              <a:buFont typeface="Arial" panose="020B0604020202020204" pitchFamily="34" charset="0"/>
+              <a:buChar char="•"/>
+            </a:pPr>
+            <a:r>
+              <a:rPr lang="en-US" sz="2800" spc="-200" dirty="0">
+                <a:latin typeface="Segoe UI" panose="020B0502040204020203" pitchFamily="34" charset="0"/>
+                <a:cs typeface="Segoe UI" panose="020B0502040204020203" pitchFamily="34" charset="0"/>
+              </a:rPr>
+              <a:t>Limited design tools</a:t>
+            </a:r>
+          </a:p>
+          <a:p>
+            <a:pPr marL="231775" indent="-231775">
+              <a:lnSpc>
+                <a:spcPct val="95000"/>
+              </a:lnSpc>
+              <a:buSzPct val="90000"/>
+              <a:buFont typeface="Arial" panose="020B0604020202020204" pitchFamily="34" charset="0"/>
+              <a:buChar char="•"/>
+            </a:pPr>
+            <a:r>
+              <a:rPr lang="en-US" sz="2800" spc="-200" dirty="0">
+                <a:latin typeface="Segoe UI" panose="020B0502040204020203" pitchFamily="34" charset="0"/>
+                <a:cs typeface="Segoe UI" panose="020B0502040204020203" pitchFamily="34" charset="0"/>
+              </a:rPr>
+              <a:t>Limited data sources</a:t>
+            </a:r>
+          </a:p>
+          <a:p>
+            <a:pPr marL="231775" indent="-231775">
+              <a:lnSpc>
+                <a:spcPct val="95000"/>
+              </a:lnSpc>
+              <a:buSzPct val="90000"/>
+              <a:buFont typeface="Arial" panose="020B0604020202020204" pitchFamily="34" charset="0"/>
+              <a:buChar char="•"/>
+            </a:pPr>
+            <a:r>
+              <a:rPr lang="en-US" sz="2800" spc="-200" dirty="0">
+                <a:latin typeface="Segoe UI" panose="020B0502040204020203" pitchFamily="34" charset="0"/>
+                <a:cs typeface="Segoe UI" panose="020B0502040204020203" pitchFamily="34" charset="0"/>
+              </a:rPr>
+              <a:t>Dashboards</a:t>
+            </a:r>
+          </a:p>
+          <a:p>
+            <a:pPr marL="231775" indent="-231775">
+              <a:lnSpc>
+                <a:spcPct val="95000"/>
+              </a:lnSpc>
+              <a:buSzPct val="90000"/>
+              <a:buFont typeface="Arial" panose="020B0604020202020204" pitchFamily="34" charset="0"/>
+              <a:buChar char="•"/>
+            </a:pPr>
+            <a:r>
+              <a:rPr lang="en-US" sz="2800" spc="-200" dirty="0">
+                <a:latin typeface="Segoe UI" panose="020B0502040204020203" pitchFamily="34" charset="0"/>
+                <a:cs typeface="Segoe UI" panose="020B0502040204020203" pitchFamily="34" charset="0"/>
+              </a:rPr>
+              <a:t>Publishing</a:t>
+            </a:r>
+            <a:endParaRPr lang="en-US" sz="2400" spc="-200" dirty="0">
+              <a:solidFill>
+                <a:srgbClr val="235888"/>
+              </a:solidFill>
+              <a:latin typeface="Segoe UI Light" panose="020B0502040204020203" pitchFamily="34" charset="0"/>
+              <a:cs typeface="Segoe UI Light" panose="020B0502040204020203" pitchFamily="34" charset="0"/>
+            </a:endParaRPr>
+          </a:p>
+        </p:txBody>
+      </p:sp>
+      <p:cxnSp>
+        <p:nvCxnSpPr>
+          <p:cNvPr id="15" name="Straight Connector 14"/>
+          <p:cNvCxnSpPr/>
+          <p:nvPr/>
+        </p:nvCxnSpPr>
+        <p:spPr>
+          <a:xfrm flipH="1">
+            <a:off x="6114042" y="1864096"/>
+            <a:ext cx="4673" cy="4343400"/>
+          </a:xfrm>
+          <a:prstGeom prst="line">
+            <a:avLst/>
+          </a:prstGeom>
+          <a:ln>
+            <a:solidFill>
+              <a:srgbClr val="212121"/>
+            </a:solidFill>
+          </a:ln>
+        </p:spPr>
+        <p:style>
+          <a:lnRef idx="1">
+            <a:schemeClr val="accent1"/>
+          </a:lnRef>
+          <a:fillRef idx="0">
+            <a:schemeClr val="accent1"/>
+          </a:fillRef>
+          <a:effectRef idx="0">
+            <a:schemeClr val="accent1"/>
+          </a:effectRef>
+          <a:fontRef idx="minor">
+            <a:schemeClr val="tx1"/>
+          </a:fontRef>
+        </p:style>
+      </p:cxnSp>
+      <p:sp>
+        <p:nvSpPr>
+          <p:cNvPr id="16" name="Rectangle 15"/>
+          <p:cNvSpPr/>
+          <p:nvPr/>
+        </p:nvSpPr>
+        <p:spPr>
+          <a:xfrm>
+            <a:off x="3442122" y="2807021"/>
+            <a:ext cx="2582958" cy="3016210"/>
+          </a:xfrm>
+          <a:prstGeom prst="rect">
+            <a:avLst/>
+          </a:prstGeom>
+        </p:spPr>
+        <p:txBody>
+          <a:bodyPr wrap="square" anchor="t" anchorCtr="0">
+            <a:spAutoFit/>
+          </a:bodyPr>
+          <a:lstStyle/>
+          <a:p>
+            <a:pPr marL="231775" indent="-231775">
+              <a:lnSpc>
+                <a:spcPct val="95000"/>
+              </a:lnSpc>
+              <a:buSzPct val="90000"/>
+              <a:buFont typeface="Arial" panose="020B0604020202020204" pitchFamily="34" charset="0"/>
+              <a:buChar char="•"/>
+            </a:pPr>
+            <a:r>
+              <a:rPr lang="en-US" sz="2800" spc="-200" dirty="0">
+                <a:latin typeface="Segoe UI" panose="020B0502040204020203" pitchFamily="34" charset="0"/>
+                <a:cs typeface="Segoe UI" panose="020B0502040204020203" pitchFamily="34" charset="0"/>
+              </a:rPr>
+              <a:t>Windows only</a:t>
+            </a:r>
+          </a:p>
+          <a:p>
+            <a:pPr marL="231775" indent="-231775">
+              <a:lnSpc>
+                <a:spcPct val="95000"/>
+              </a:lnSpc>
+              <a:buSzPct val="90000"/>
+              <a:buFont typeface="Arial" panose="020B0604020202020204" pitchFamily="34" charset="0"/>
+              <a:buChar char="•"/>
+            </a:pPr>
+            <a:r>
+              <a:rPr lang="en-US" sz="2800" spc="-200" dirty="0">
+                <a:latin typeface="Segoe UI" panose="020B0502040204020203" pitchFamily="34" charset="0"/>
+                <a:cs typeface="Segoe UI" panose="020B0502040204020203" pitchFamily="34" charset="0"/>
+              </a:rPr>
+              <a:t>Robust design tools</a:t>
+            </a:r>
+          </a:p>
+          <a:p>
+            <a:pPr marL="231775" indent="-231775">
+              <a:lnSpc>
+                <a:spcPct val="95000"/>
+              </a:lnSpc>
+              <a:buSzPct val="90000"/>
+              <a:buFont typeface="Arial" panose="020B0604020202020204" pitchFamily="34" charset="0"/>
+              <a:buChar char="•"/>
+            </a:pPr>
+            <a:r>
+              <a:rPr lang="en-US" sz="2800" spc="-200" dirty="0">
+                <a:latin typeface="Segoe UI" panose="020B0502040204020203" pitchFamily="34" charset="0"/>
+                <a:cs typeface="Segoe UI" panose="020B0502040204020203" pitchFamily="34" charset="0"/>
+              </a:rPr>
+              <a:t>Query and modeling tools</a:t>
+            </a:r>
+            <a:r>
+              <a:rPr lang="en-US" sz="3200" spc="-200" dirty="0">
+                <a:latin typeface="Segoe UI" panose="020B0502040204020203" pitchFamily="34" charset="0"/>
+                <a:cs typeface="Segoe UI" panose="020B0502040204020203" pitchFamily="34" charset="0"/>
+              </a:rPr>
+              <a:t> </a:t>
+            </a:r>
+          </a:p>
+          <a:p>
+            <a:pPr>
+              <a:lnSpc>
+                <a:spcPct val="95000"/>
+              </a:lnSpc>
+              <a:buSzPct val="90000"/>
+            </a:pPr>
+            <a:endParaRPr lang="en-US" sz="3200" spc="-200" dirty="0">
+              <a:solidFill>
+                <a:srgbClr val="235888"/>
+              </a:solidFill>
+              <a:latin typeface="Segoe UI Light" panose="020B0502040204020203" pitchFamily="34" charset="0"/>
+              <a:cs typeface="Segoe UI Light" panose="020B0502040204020203" pitchFamily="34" charset="0"/>
+            </a:endParaRPr>
+          </a:p>
+          <a:p>
+            <a:pPr>
+              <a:lnSpc>
+                <a:spcPct val="95000"/>
+              </a:lnSpc>
+              <a:buSzPct val="90000"/>
+            </a:pPr>
+            <a:endParaRPr lang="en-US" sz="2400" spc="-200" dirty="0">
+              <a:solidFill>
+                <a:srgbClr val="235888"/>
+              </a:solidFill>
+              <a:latin typeface="Segoe UI Light" panose="020B0502040204020203" pitchFamily="34" charset="0"/>
+              <a:cs typeface="Segoe UI Light" panose="020B0502040204020203" pitchFamily="34" charset="0"/>
+            </a:endParaRPr>
+          </a:p>
+        </p:txBody>
+      </p:sp>
+      <p:sp>
+        <p:nvSpPr>
+          <p:cNvPr id="17" name="Rectangle 16"/>
+          <p:cNvSpPr/>
+          <p:nvPr/>
+        </p:nvSpPr>
+        <p:spPr>
+          <a:xfrm>
+            <a:off x="6257802" y="2817071"/>
+            <a:ext cx="2509468" cy="1261884"/>
+          </a:xfrm>
+          <a:prstGeom prst="rect">
+            <a:avLst/>
+          </a:prstGeom>
+        </p:spPr>
+        <p:txBody>
+          <a:bodyPr wrap="square" anchor="t" anchorCtr="0">
+            <a:spAutoFit/>
+          </a:bodyPr>
+          <a:lstStyle/>
+          <a:p>
+            <a:pPr marL="231775" indent="-231775">
+              <a:lnSpc>
+                <a:spcPct val="95000"/>
+              </a:lnSpc>
+              <a:buSzPct val="90000"/>
+              <a:buFont typeface="Arial" panose="020B0604020202020204" pitchFamily="34" charset="0"/>
+              <a:buChar char="•"/>
+            </a:pPr>
+            <a:r>
+              <a:rPr lang="en-US" sz="2800" spc="-200" dirty="0">
+                <a:latin typeface="Segoe UI" panose="020B0502040204020203" pitchFamily="34" charset="0"/>
+                <a:cs typeface="Segoe UI" panose="020B0502040204020203" pitchFamily="34" charset="0"/>
+              </a:rPr>
+              <a:t>Cross-platform</a:t>
+            </a:r>
+          </a:p>
+          <a:p>
+            <a:pPr marL="231775" indent="-231775">
+              <a:lnSpc>
+                <a:spcPct val="95000"/>
+              </a:lnSpc>
+              <a:buSzPct val="90000"/>
+              <a:buFont typeface="Arial" panose="020B0604020202020204" pitchFamily="34" charset="0"/>
+              <a:buChar char="•"/>
+            </a:pPr>
+            <a:r>
+              <a:rPr lang="en-US" sz="2800" spc="-200" dirty="0">
+                <a:latin typeface="Segoe UI" panose="020B0502040204020203" pitchFamily="34" charset="0"/>
+                <a:cs typeface="Segoe UI" panose="020B0502040204020203" pitchFamily="34" charset="0"/>
+              </a:rPr>
+              <a:t>Report viewers</a:t>
+            </a:r>
+          </a:p>
+          <a:p>
+            <a:pPr>
+              <a:lnSpc>
+                <a:spcPct val="95000"/>
+              </a:lnSpc>
+              <a:buSzPct val="90000"/>
+            </a:pPr>
+            <a:endParaRPr lang="en-US" sz="2400" spc="-200" dirty="0">
+              <a:solidFill>
+                <a:srgbClr val="235888"/>
+              </a:solidFill>
+              <a:latin typeface="Segoe UI Light" panose="020B0502040204020203" pitchFamily="34" charset="0"/>
+              <a:cs typeface="Segoe UI Light" panose="020B0502040204020203" pitchFamily="34" charset="0"/>
+            </a:endParaRPr>
+          </a:p>
+        </p:txBody>
+      </p:sp>
+      <p:sp>
+        <p:nvSpPr>
+          <p:cNvPr id="18" name="Rectangle 17"/>
+          <p:cNvSpPr/>
+          <p:nvPr/>
+        </p:nvSpPr>
+        <p:spPr>
+          <a:xfrm>
+            <a:off x="8959211" y="2806149"/>
+            <a:ext cx="2613560" cy="2489912"/>
+          </a:xfrm>
+          <a:prstGeom prst="rect">
+            <a:avLst/>
+          </a:prstGeom>
+        </p:spPr>
+        <p:txBody>
+          <a:bodyPr wrap="square" anchor="t" anchorCtr="0">
+            <a:spAutoFit/>
+          </a:bodyPr>
+          <a:lstStyle/>
+          <a:p>
+            <a:pPr marL="231775" indent="-231775">
+              <a:lnSpc>
+                <a:spcPct val="95000"/>
+              </a:lnSpc>
+              <a:buSzPct val="90000"/>
+              <a:buFont typeface="Arial" panose="020B0604020202020204" pitchFamily="34" charset="0"/>
+              <a:buChar char="•"/>
+            </a:pPr>
+            <a:r>
+              <a:rPr lang="en-US" sz="2800" spc="-200" dirty="0">
+                <a:latin typeface="Segoe UI" panose="020B0502040204020203" pitchFamily="34" charset="0"/>
+                <a:cs typeface="Segoe UI" panose="020B0502040204020203" pitchFamily="34" charset="0"/>
+              </a:rPr>
+              <a:t>Report integration</a:t>
+            </a:r>
+          </a:p>
+          <a:p>
+            <a:pPr marL="231775" indent="-231775">
+              <a:lnSpc>
+                <a:spcPct val="95000"/>
+              </a:lnSpc>
+              <a:buSzPct val="90000"/>
+              <a:buFont typeface="Arial" panose="020B0604020202020204" pitchFamily="34" charset="0"/>
+              <a:buChar char="•"/>
+            </a:pPr>
+            <a:r>
+              <a:rPr lang="en-US" sz="2800" spc="-200" dirty="0">
+                <a:latin typeface="Segoe UI" panose="020B0502040204020203" pitchFamily="34" charset="0"/>
+                <a:cs typeface="Segoe UI" panose="020B0502040204020203" pitchFamily="34" charset="0"/>
+              </a:rPr>
+              <a:t>REST services</a:t>
+            </a:r>
+          </a:p>
+          <a:p>
+            <a:pPr marL="231775" indent="-231775">
+              <a:lnSpc>
+                <a:spcPct val="95000"/>
+              </a:lnSpc>
+              <a:buSzPct val="90000"/>
+              <a:buFont typeface="Arial" panose="020B0604020202020204" pitchFamily="34" charset="0"/>
+              <a:buChar char="•"/>
+            </a:pPr>
+            <a:r>
+              <a:rPr lang="en-US" sz="2800" spc="-200" dirty="0">
+                <a:latin typeface="Segoe UI" panose="020B0502040204020203" pitchFamily="34" charset="0"/>
+                <a:cs typeface="Segoe UI" panose="020B0502040204020203" pitchFamily="34" charset="0"/>
+              </a:rPr>
+              <a:t>Create custom visualizations</a:t>
+            </a:r>
+          </a:p>
+          <a:p>
+            <a:pPr>
+              <a:lnSpc>
+                <a:spcPct val="95000"/>
+              </a:lnSpc>
+              <a:buSzPct val="90000"/>
+            </a:pPr>
+            <a:endParaRPr lang="en-US" sz="2400" spc="-200" dirty="0">
+              <a:solidFill>
+                <a:srgbClr val="235888"/>
+              </a:solidFill>
+              <a:latin typeface="Segoe UI Light" panose="020B0502040204020203" pitchFamily="34" charset="0"/>
+              <a:cs typeface="Segoe UI Light" panose="020B0502040204020203" pitchFamily="34" charset="0"/>
+            </a:endParaRPr>
+          </a:p>
+        </p:txBody>
+      </p:sp>
+      <p:pic>
+        <p:nvPicPr>
+          <p:cNvPr id="19" name="Picture 2" descr="Image result for power bi"/>
+          <p:cNvPicPr>
+            <a:picLocks noChangeAspect="1" noChangeArrowheads="1"/>
+          </p:cNvPicPr>
+          <p:nvPr/>
+        </p:nvPicPr>
+        <p:blipFill>
+          <a:blip r:embed="rId3" cstate="screen">
+            <a:extLst>
+              <a:ext uri="{28A0092B-C50C-407E-A947-70E740481C1C}">
+                <a14:useLocalDpi xmlns:a14="http://schemas.microsoft.com/office/drawing/2010/main" val="0"/>
+              </a:ext>
+            </a:extLst>
+          </a:blip>
+          <a:srcRect/>
+          <a:stretch>
+            <a:fillRect/>
+          </a:stretch>
+        </p:blipFill>
+        <p:spPr bwMode="auto">
+          <a:xfrm>
+            <a:off x="10391885" y="5812278"/>
+            <a:ext cx="1421327" cy="1045722"/>
+          </a:xfrm>
+          <a:prstGeom prst="rect">
+            <a:avLst/>
+          </a:prstGeom>
+          <a:noFill/>
+          <a:extLst>
+            <a:ext uri="{909E8E84-426E-40DD-AFC4-6F175D3DCCD1}">
+              <a14:hiddenFill xmlns:a14="http://schemas.microsoft.com/office/drawing/2010/main">
+                <a:solidFill>
+                  <a:srgbClr val="FFFFFF"/>
+                </a:solidFill>
+              </a14:hiddenFill>
+            </a:ext>
+          </a:extLst>
+        </p:spPr>
+      </p:pic>
+    </p:spTree>
+    <p:extLst>
+      <p:ext uri="{BB962C8B-B14F-4D97-AF65-F5344CB8AC3E}">
+        <p14:creationId xmlns:p14="http://schemas.microsoft.com/office/powerpoint/2010/main" val="3070396282"/>
+      </p:ext>
+    </p:extLst>
+  </p:cSld>
+  <p:clrMapOvr>
+    <a:masterClrMapping/>
+  </p:clrMapOvr>
+</p:sld>
+</file>
+
+<file path=ppt/slides/slide11.xml><?xml version="1.0" encoding="utf-8"?>
+<p:sld xmlns:a="http://schemas.openxmlformats.org/drawingml/2006/main" xmlns:r="http://schemas.openxmlformats.org/officeDocument/2006/relationships" xmlns:p="http://schemas.openxmlformats.org/presentationml/2006/main">
+  <p:cSld>
+    <p:spTree>
+      <p:nvGrpSpPr>
+        <p:cNvPr id="1" name=""/>
+        <p:cNvGrpSpPr/>
+        <p:nvPr/>
+      </p:nvGrpSpPr>
+      <p:grpSpPr>
+        <a:xfrm>
+          <a:off x="0" y="0"/>
+          <a:ext cx="0" cy="0"/>
+          <a:chOff x="0" y="0"/>
+          <a:chExt cx="0" cy="0"/>
+        </a:xfrm>
+      </p:grpSpPr>
+      <p:sp>
+        <p:nvSpPr>
+          <p:cNvPr id="2" name="Title 1"/>
+          <p:cNvSpPr>
+            <a:spLocks noGrp="1"/>
+          </p:cNvSpPr>
+          <p:nvPr>
+            <p:ph type="title"/>
+          </p:nvPr>
+        </p:nvSpPr>
         <p:spPr/>
         <p:txBody>
           <a:bodyPr/>
@@ -18562,7 +19566,7 @@
 </p:sld>
 </file>
 
-<file path=ppt/slides/slide11.xml><?xml version="1.0" encoding="utf-8"?>
+<file path=ppt/slides/slide12.xml><?xml version="1.0" encoding="utf-8"?>
 <p:sld xmlns:a="http://schemas.openxmlformats.org/drawingml/2006/main" xmlns:r="http://schemas.openxmlformats.org/officeDocument/2006/relationships" xmlns:p="http://schemas.openxmlformats.org/presentationml/2006/main">
   <p:cSld>
     <p:spTree>
@@ -18953,7 +19957,7 @@
 </p:sld>
 </file>
 
-<file path=ppt/slides/slide12.xml><?xml version="1.0" encoding="utf-8"?>
+<file path=ppt/slides/slide13.xml><?xml version="1.0" encoding="utf-8"?>
 <p:sld xmlns:a="http://schemas.openxmlformats.org/drawingml/2006/main" xmlns:r="http://schemas.openxmlformats.org/officeDocument/2006/relationships" xmlns:p="http://schemas.openxmlformats.org/presentationml/2006/main">
   <p:cSld>
     <p:spTree>
@@ -19238,7 +20242,7 @@
 </p:sld>
 </file>
 
-<file path=ppt/slides/slide13.xml><?xml version="1.0" encoding="utf-8"?>
+<file path=ppt/slides/slide14.xml><?xml version="1.0" encoding="utf-8"?>
 <p:sld xmlns:a="http://schemas.openxmlformats.org/drawingml/2006/main" xmlns:r="http://schemas.openxmlformats.org/officeDocument/2006/relationships" xmlns:p="http://schemas.openxmlformats.org/presentationml/2006/main">
   <p:cSld>
     <p:spTree>
@@ -19329,132 +20333,6 @@
     <p:extLst>
       <p:ext uri="{BB962C8B-B14F-4D97-AF65-F5344CB8AC3E}">
         <p14:creationId xmlns:p14="http://schemas.microsoft.com/office/powerpoint/2010/main" val="2839868326"/>
-      </p:ext>
-    </p:extLst>
-  </p:cSld>
-  <p:clrMapOvr>
-    <a:masterClrMapping/>
-  </p:clrMapOvr>
-</p:sld>
-</file>
-
-<file path=ppt/slides/slide14.xml><?xml version="1.0" encoding="utf-8"?>
-<p:sld xmlns:a="http://schemas.openxmlformats.org/drawingml/2006/main" xmlns:r="http://schemas.openxmlformats.org/officeDocument/2006/relationships" xmlns:p="http://schemas.openxmlformats.org/presentationml/2006/main">
-  <p:cSld>
-    <p:spTree>
-      <p:nvGrpSpPr>
-        <p:cNvPr id="1" name=""/>
-        <p:cNvGrpSpPr/>
-        <p:nvPr/>
-      </p:nvGrpSpPr>
-      <p:grpSpPr>
-        <a:xfrm>
-          <a:off x="0" y="0"/>
-          <a:ext cx="0" cy="0"/>
-          <a:chOff x="0" y="0"/>
-          <a:chExt cx="0" cy="0"/>
-        </a:xfrm>
-      </p:grpSpPr>
-      <p:pic>
-        <p:nvPicPr>
-          <p:cNvPr id="23" name="Picture 2" descr="Image result for power bi"/>
-          <p:cNvPicPr>
-            <a:picLocks noChangeAspect="1" noChangeArrowheads="1"/>
-          </p:cNvPicPr>
-          <p:nvPr/>
-        </p:nvPicPr>
-        <p:blipFill>
-          <a:blip r:embed="rId3" cstate="screen">
-            <a:extLst>
-              <a:ext uri="{28A0092B-C50C-407E-A947-70E740481C1C}">
-                <a14:useLocalDpi xmlns:a14="http://schemas.microsoft.com/office/drawing/2010/main" val="0"/>
-              </a:ext>
-            </a:extLst>
-          </a:blip>
-          <a:srcRect/>
-          <a:stretch>
-            <a:fillRect/>
-          </a:stretch>
-        </p:blipFill>
-        <p:spPr bwMode="auto">
-          <a:xfrm>
-            <a:off x="10391885" y="5812278"/>
-            <a:ext cx="1421327" cy="1045722"/>
-          </a:xfrm>
-          <a:prstGeom prst="rect">
-            <a:avLst/>
-          </a:prstGeom>
-          <a:noFill/>
-          <a:extLst>
-            <a:ext uri="{909E8E84-426E-40DD-AFC4-6F175D3DCCD1}">
-              <a14:hiddenFill xmlns:a14="http://schemas.microsoft.com/office/drawing/2010/main">
-                <a:solidFill>
-                  <a:srgbClr val="FFFFFF"/>
-                </a:solidFill>
-              </a14:hiddenFill>
-            </a:ext>
-          </a:extLst>
-        </p:spPr>
-      </p:pic>
-      <p:sp>
-        <p:nvSpPr>
-          <p:cNvPr id="3" name="Título 2"/>
-          <p:cNvSpPr>
-            <a:spLocks noGrp="1"/>
-          </p:cNvSpPr>
-          <p:nvPr>
-            <p:ph type="title"/>
-          </p:nvPr>
-        </p:nvSpPr>
-        <p:spPr>
-          <a:xfrm>
-            <a:off x="396240" y="319405"/>
-            <a:ext cx="10515600" cy="1325563"/>
-          </a:xfrm>
-        </p:spPr>
-        <p:txBody>
-          <a:bodyPr/>
-          <a:lstStyle/>
-          <a:p>
-            <a:r>
-              <a:rPr lang="pt-BR" dirty="0"/>
-              <a:t>Projeto no Github</a:t>
-            </a:r>
-          </a:p>
-        </p:txBody>
-      </p:sp>
-      <p:sp>
-        <p:nvSpPr>
-          <p:cNvPr id="4" name="Retângulo 3"/>
-          <p:cNvSpPr/>
-          <p:nvPr/>
-        </p:nvSpPr>
-        <p:spPr>
-          <a:xfrm>
-            <a:off x="1461418" y="3174625"/>
-            <a:ext cx="9040745" cy="553998"/>
-          </a:xfrm>
-          <a:prstGeom prst="rect">
-            <a:avLst/>
-          </a:prstGeom>
-        </p:spPr>
-        <p:txBody>
-          <a:bodyPr wrap="none">
-            <a:spAutoFit/>
-          </a:bodyPr>
-          <a:lstStyle/>
-          <a:p>
-            <a:r>
-              <a:rPr lang="pt-BR" sz="3000" dirty="0"/>
-              <a:t>https://github.com/orlandogomes/madrugada-pbi</a:t>
-            </a:r>
-          </a:p>
-        </p:txBody>
-      </p:sp>
-    </p:spTree>
-    <p:extLst>
-      <p:ext uri="{BB962C8B-B14F-4D97-AF65-F5344CB8AC3E}">
-        <p14:creationId xmlns:p14="http://schemas.microsoft.com/office/powerpoint/2010/main" val="528110283"/>
       </p:ext>
     </p:extLst>
   </p:cSld>
@@ -19544,7 +20422,7 @@
           <a:p>
             <a:r>
               <a:rPr lang="pt-BR" dirty="0"/>
-              <a:t>Poke Projeto</a:t>
+              <a:t>Projeto no Github</a:t>
             </a:r>
           </a:p>
         </p:txBody>
@@ -19557,8 +20435,8 @@
         </p:nvSpPr>
         <p:spPr>
           <a:xfrm>
-            <a:off x="3096140" y="3075057"/>
-            <a:ext cx="5999719" cy="707886"/>
+            <a:off x="1461418" y="3174625"/>
+            <a:ext cx="9040745" cy="553998"/>
           </a:xfrm>
           <a:prstGeom prst="rect">
             <a:avLst/>
@@ -19571,8 +20449,8 @@
           <a:lstStyle/>
           <a:p>
             <a:r>
-              <a:rPr lang="pt-BR" sz="4000" dirty="0"/>
-              <a:t>http://bit.ly/pbi-pokemon</a:t>
+              <a:rPr lang="pt-BR" sz="3000" dirty="0"/>
+              <a:t>https://github.com/orlandogomes/madrugada-pbi</a:t>
             </a:r>
           </a:p>
         </p:txBody>
@@ -19580,7 +20458,7 @@
     </p:spTree>
     <p:extLst>
       <p:ext uri="{BB962C8B-B14F-4D97-AF65-F5344CB8AC3E}">
-        <p14:creationId xmlns:p14="http://schemas.microsoft.com/office/powerpoint/2010/main" val="2386910197"/>
+        <p14:creationId xmlns:p14="http://schemas.microsoft.com/office/powerpoint/2010/main" val="528110283"/>
       </p:ext>
     </p:extLst>
   </p:cSld>
@@ -19670,6 +20548,132 @@
           <a:p>
             <a:r>
               <a:rPr lang="pt-BR" dirty="0"/>
+              <a:t>Poke Projeto</a:t>
+            </a:r>
+          </a:p>
+        </p:txBody>
+      </p:sp>
+      <p:sp>
+        <p:nvSpPr>
+          <p:cNvPr id="4" name="Retângulo 3"/>
+          <p:cNvSpPr/>
+          <p:nvPr/>
+        </p:nvSpPr>
+        <p:spPr>
+          <a:xfrm>
+            <a:off x="3096140" y="3075057"/>
+            <a:ext cx="5999719" cy="707886"/>
+          </a:xfrm>
+          <a:prstGeom prst="rect">
+            <a:avLst/>
+          </a:prstGeom>
+        </p:spPr>
+        <p:txBody>
+          <a:bodyPr wrap="none">
+            <a:spAutoFit/>
+          </a:bodyPr>
+          <a:lstStyle/>
+          <a:p>
+            <a:r>
+              <a:rPr lang="pt-BR" sz="4000" dirty="0"/>
+              <a:t>http://bit.ly/pbi-pokemon</a:t>
+            </a:r>
+          </a:p>
+        </p:txBody>
+      </p:sp>
+    </p:spTree>
+    <p:extLst>
+      <p:ext uri="{BB962C8B-B14F-4D97-AF65-F5344CB8AC3E}">
+        <p14:creationId xmlns:p14="http://schemas.microsoft.com/office/powerpoint/2010/main" val="2386910197"/>
+      </p:ext>
+    </p:extLst>
+  </p:cSld>
+  <p:clrMapOvr>
+    <a:masterClrMapping/>
+  </p:clrMapOvr>
+</p:sld>
+</file>
+
+<file path=ppt/slides/slide17.xml><?xml version="1.0" encoding="utf-8"?>
+<p:sld xmlns:a="http://schemas.openxmlformats.org/drawingml/2006/main" xmlns:r="http://schemas.openxmlformats.org/officeDocument/2006/relationships" xmlns:p="http://schemas.openxmlformats.org/presentationml/2006/main">
+  <p:cSld>
+    <p:spTree>
+      <p:nvGrpSpPr>
+        <p:cNvPr id="1" name=""/>
+        <p:cNvGrpSpPr/>
+        <p:nvPr/>
+      </p:nvGrpSpPr>
+      <p:grpSpPr>
+        <a:xfrm>
+          <a:off x="0" y="0"/>
+          <a:ext cx="0" cy="0"/>
+          <a:chOff x="0" y="0"/>
+          <a:chExt cx="0" cy="0"/>
+        </a:xfrm>
+      </p:grpSpPr>
+      <p:pic>
+        <p:nvPicPr>
+          <p:cNvPr id="23" name="Picture 2" descr="Image result for power bi"/>
+          <p:cNvPicPr>
+            <a:picLocks noChangeAspect="1" noChangeArrowheads="1"/>
+          </p:cNvPicPr>
+          <p:nvPr/>
+        </p:nvPicPr>
+        <p:blipFill>
+          <a:blip r:embed="rId3" cstate="screen">
+            <a:extLst>
+              <a:ext uri="{28A0092B-C50C-407E-A947-70E740481C1C}">
+                <a14:useLocalDpi xmlns:a14="http://schemas.microsoft.com/office/drawing/2010/main" val="0"/>
+              </a:ext>
+            </a:extLst>
+          </a:blip>
+          <a:srcRect/>
+          <a:stretch>
+            <a:fillRect/>
+          </a:stretch>
+        </p:blipFill>
+        <p:spPr bwMode="auto">
+          <a:xfrm>
+            <a:off x="10391885" y="5812278"/>
+            <a:ext cx="1421327" cy="1045722"/>
+          </a:xfrm>
+          <a:prstGeom prst="rect">
+            <a:avLst/>
+          </a:prstGeom>
+          <a:noFill/>
+          <a:extLst>
+            <a:ext uri="{909E8E84-426E-40DD-AFC4-6F175D3DCCD1}">
+              <a14:hiddenFill xmlns:a14="http://schemas.microsoft.com/office/drawing/2010/main">
+                <a:solidFill>
+                  <a:srgbClr val="FFFFFF"/>
+                </a:solidFill>
+              </a14:hiddenFill>
+            </a:ext>
+          </a:extLst>
+        </p:spPr>
+      </p:pic>
+      <p:sp>
+        <p:nvSpPr>
+          <p:cNvPr id="3" name="Título 2"/>
+          <p:cNvSpPr>
+            <a:spLocks noGrp="1"/>
+          </p:cNvSpPr>
+          <p:nvPr>
+            <p:ph type="title"/>
+          </p:nvPr>
+        </p:nvSpPr>
+        <p:spPr>
+          <a:xfrm>
+            <a:off x="396240" y="319405"/>
+            <a:ext cx="10515600" cy="1325563"/>
+          </a:xfrm>
+        </p:spPr>
+        <p:txBody>
+          <a:bodyPr/>
+          <a:lstStyle/>
+          <a:p>
+            <a:r>
+              <a:rPr lang="pt-BR" dirty="0"/>
               <a:t>Consumo NodeRed</a:t>
             </a:r>
           </a:p>
@@ -19721,7 +20725,7 @@
 </p:sld>
 </file>
 
-<file path=ppt/slides/slide17.xml><?xml version="1.0" encoding="utf-8"?>
+<file path=ppt/slides/slide18.xml><?xml version="1.0" encoding="utf-8"?>
 <p:sld xmlns:a="http://schemas.openxmlformats.org/drawingml/2006/main" xmlns:r="http://schemas.openxmlformats.org/officeDocument/2006/relationships" xmlns:p="http://schemas.openxmlformats.org/presentationml/2006/main">
   <p:cSld>
     <p:spTree>
@@ -20957,7 +21961,7 @@
     </p:spTree>
     <p:extLst>
       <p:ext uri="{BB962C8B-B14F-4D97-AF65-F5344CB8AC3E}">
-        <p14:creationId xmlns:p14="http://schemas.microsoft.com/office/powerpoint/2010/main" val="2580223864"/>
+        <p14:creationId xmlns:p14="http://schemas.microsoft.com/office/powerpoint/2010/main" val="2299342069"/>
       </p:ext>
     </p:extLst>
   </p:cSld>
@@ -20968,6 +21972,2149 @@
 </file>
 
 <file path=ppt/slides/slide6.xml><?xml version="1.0" encoding="utf-8"?>
+<p:sld xmlns:a="http://schemas.openxmlformats.org/drawingml/2006/main" xmlns:r="http://schemas.openxmlformats.org/officeDocument/2006/relationships" xmlns:p="http://schemas.openxmlformats.org/presentationml/2006/main">
+  <p:cSld>
+    <p:spTree>
+      <p:nvGrpSpPr>
+        <p:cNvPr id="1" name=""/>
+        <p:cNvGrpSpPr/>
+        <p:nvPr/>
+      </p:nvGrpSpPr>
+      <p:grpSpPr>
+        <a:xfrm>
+          <a:off x="0" y="0"/>
+          <a:ext cx="0" cy="0"/>
+          <a:chOff x="0" y="0"/>
+          <a:chExt cx="0" cy="0"/>
+        </a:xfrm>
+      </p:grpSpPr>
+      <p:sp>
+        <p:nvSpPr>
+          <p:cNvPr id="2" name="Title 1"/>
+          <p:cNvSpPr>
+            <a:spLocks noGrp="1"/>
+          </p:cNvSpPr>
+          <p:nvPr>
+            <p:ph type="title"/>
+          </p:nvPr>
+        </p:nvSpPr>
+        <p:spPr>
+          <a:xfrm>
+            <a:off x="228600" y="198120"/>
+            <a:ext cx="10515600" cy="1325563"/>
+          </a:xfrm>
+        </p:spPr>
+        <p:txBody>
+          <a:bodyPr/>
+          <a:lstStyle/>
+          <a:p>
+            <a:r>
+              <a:rPr lang="en-US" dirty="0"/>
+              <a:t>E para que serve ?</a:t>
+            </a:r>
+          </a:p>
+        </p:txBody>
+      </p:sp>
+      <p:sp>
+        <p:nvSpPr>
+          <p:cNvPr id="8" name="Retângulo 7"/>
+          <p:cNvSpPr/>
+          <p:nvPr/>
+        </p:nvSpPr>
+        <p:spPr>
+          <a:xfrm>
+            <a:off x="652512" y="2072323"/>
+            <a:ext cx="10972800" cy="954107"/>
+          </a:xfrm>
+          <a:prstGeom prst="rect">
+            <a:avLst/>
+          </a:prstGeom>
+        </p:spPr>
+        <p:txBody>
+          <a:bodyPr wrap="square">
+            <a:spAutoFit/>
+          </a:bodyPr>
+          <a:lstStyle/>
+          <a:p>
+            <a:pPr algn="just"/>
+            <a:endParaRPr lang="pt-BR" sz="2800" i="1" dirty="0"/>
+          </a:p>
+          <a:p>
+            <a:pPr algn="just"/>
+            <a:endParaRPr lang="pt-BR" sz="2800" dirty="0"/>
+          </a:p>
+        </p:txBody>
+      </p:sp>
+      <p:pic>
+        <p:nvPicPr>
+          <p:cNvPr id="4" name="Picture 2" descr="Image result for power bi"/>
+          <p:cNvPicPr>
+            <a:picLocks noChangeAspect="1" noChangeArrowheads="1"/>
+          </p:cNvPicPr>
+          <p:nvPr/>
+        </p:nvPicPr>
+        <p:blipFill>
+          <a:blip r:embed="rId3" cstate="screen">
+            <a:extLst>
+              <a:ext uri="{28A0092B-C50C-407E-A947-70E740481C1C}">
+                <a14:useLocalDpi xmlns:a14="http://schemas.microsoft.com/office/drawing/2010/main" val="0"/>
+              </a:ext>
+            </a:extLst>
+          </a:blip>
+          <a:srcRect/>
+          <a:stretch>
+            <a:fillRect/>
+          </a:stretch>
+        </p:blipFill>
+        <p:spPr bwMode="auto">
+          <a:xfrm>
+            <a:off x="10391885" y="5812278"/>
+            <a:ext cx="1421327" cy="1045722"/>
+          </a:xfrm>
+          <a:prstGeom prst="rect">
+            <a:avLst/>
+          </a:prstGeom>
+          <a:noFill/>
+          <a:extLst>
+            <a:ext uri="{909E8E84-426E-40DD-AFC4-6F175D3DCCD1}">
+              <a14:hiddenFill xmlns:a14="http://schemas.microsoft.com/office/drawing/2010/main">
+                <a:solidFill>
+                  <a:srgbClr val="FFFFFF"/>
+                </a:solidFill>
+              </a14:hiddenFill>
+            </a:ext>
+          </a:extLst>
+        </p:spPr>
+      </p:pic>
+      <p:sp>
+        <p:nvSpPr>
+          <p:cNvPr id="3" name="Rectangle 2">
+            <a:extLst>
+              <a:ext uri="{FF2B5EF4-FFF2-40B4-BE49-F238E27FC236}">
+                <a16:creationId xmlns:a16="http://schemas.microsoft.com/office/drawing/2014/main" id="{F1B7FAB8-E965-49CC-94B6-2C9280A9F224}"/>
+              </a:ext>
+            </a:extLst>
+          </p:cNvPr>
+          <p:cNvSpPr/>
+          <p:nvPr/>
+        </p:nvSpPr>
+        <p:spPr>
+          <a:xfrm>
+            <a:off x="693254" y="3412333"/>
+            <a:ext cx="1748648" cy="507831"/>
+          </a:xfrm>
+          <a:prstGeom prst="rect">
+            <a:avLst/>
+          </a:prstGeom>
+        </p:spPr>
+        <p:txBody>
+          <a:bodyPr wrap="square">
+            <a:spAutoFit/>
+          </a:bodyPr>
+          <a:lstStyle/>
+          <a:p>
+            <a:pPr algn="just" fontAlgn="base"/>
+            <a:r>
+              <a:rPr lang="pt-BR" sz="2700" i="1" dirty="0"/>
+              <a:t>Joãozinho     </a:t>
+            </a:r>
+          </a:p>
+        </p:txBody>
+      </p:sp>
+      <p:pic>
+        <p:nvPicPr>
+          <p:cNvPr id="1026" name="Picture 2" descr="Image result for gif padeiro">
+            <a:extLst>
+              <a:ext uri="{FF2B5EF4-FFF2-40B4-BE49-F238E27FC236}">
+                <a16:creationId xmlns:a16="http://schemas.microsoft.com/office/drawing/2014/main" id="{5F855664-CBA1-424B-8336-1F4D58B8A851}"/>
+              </a:ext>
+            </a:extLst>
+          </p:cNvPr>
+          <p:cNvPicPr>
+            <a:picLocks noChangeAspect="1" noChangeArrowheads="1"/>
+          </p:cNvPicPr>
+          <p:nvPr/>
+        </p:nvPicPr>
+        <p:blipFill>
+          <a:blip r:embed="rId4">
+            <a:extLst>
+              <a:ext uri="{28A0092B-C50C-407E-A947-70E740481C1C}">
+                <a14:useLocalDpi xmlns:a14="http://schemas.microsoft.com/office/drawing/2010/main" val="0"/>
+              </a:ext>
+            </a:extLst>
+          </a:blip>
+          <a:srcRect/>
+          <a:stretch>
+            <a:fillRect/>
+          </a:stretch>
+        </p:blipFill>
+        <p:spPr bwMode="auto">
+          <a:xfrm>
+            <a:off x="566688" y="1621633"/>
+            <a:ext cx="2066563" cy="1524431"/>
+          </a:xfrm>
+          <a:prstGeom prst="rect">
+            <a:avLst/>
+          </a:prstGeom>
+          <a:noFill/>
+          <a:extLst>
+            <a:ext uri="{909E8E84-426E-40DD-AFC4-6F175D3DCCD1}">
+              <a14:hiddenFill xmlns:a14="http://schemas.microsoft.com/office/drawing/2010/main">
+                <a:solidFill>
+                  <a:srgbClr val="FFFFFF"/>
+                </a:solidFill>
+              </a14:hiddenFill>
+            </a:ext>
+          </a:extLst>
+        </p:spPr>
+      </p:pic>
+      <p:pic>
+        <p:nvPicPr>
+          <p:cNvPr id="7" name="Picture 6">
+            <a:extLst>
+              <a:ext uri="{FF2B5EF4-FFF2-40B4-BE49-F238E27FC236}">
+                <a16:creationId xmlns:a16="http://schemas.microsoft.com/office/drawing/2014/main" id="{EA4E4DF2-8F15-4EA0-AE41-4C6DA073F280}"/>
+              </a:ext>
+            </a:extLst>
+          </p:cNvPr>
+          <p:cNvPicPr>
+            <a:picLocks noChangeAspect="1"/>
+          </p:cNvPicPr>
+          <p:nvPr/>
+        </p:nvPicPr>
+        <p:blipFill>
+          <a:blip r:embed="rId5"/>
+          <a:stretch>
+            <a:fillRect/>
+          </a:stretch>
+        </p:blipFill>
+        <p:spPr>
+          <a:xfrm>
+            <a:off x="3041611" y="1523683"/>
+            <a:ext cx="6708487" cy="4600892"/>
+          </a:xfrm>
+          <a:prstGeom prst="rect">
+            <a:avLst/>
+          </a:prstGeom>
+        </p:spPr>
+      </p:pic>
+      <p:sp>
+        <p:nvSpPr>
+          <p:cNvPr id="11" name="TextBox 10">
+            <a:extLst>
+              <a:ext uri="{FF2B5EF4-FFF2-40B4-BE49-F238E27FC236}">
+                <a16:creationId xmlns:a16="http://schemas.microsoft.com/office/drawing/2014/main" id="{AB5E7D6A-D80E-4745-A653-34D56F0C417A}"/>
+              </a:ext>
+            </a:extLst>
+          </p:cNvPr>
+          <p:cNvSpPr txBox="1"/>
+          <p:nvPr/>
+        </p:nvSpPr>
+        <p:spPr>
+          <a:xfrm>
+            <a:off x="3212937" y="2087364"/>
+            <a:ext cx="6286499" cy="337502"/>
+          </a:xfrm>
+          <a:prstGeom prst="rect">
+            <a:avLst/>
+          </a:prstGeom>
+          <a:noFill/>
+          <a:ln w="57150">
+            <a:solidFill>
+              <a:srgbClr val="7030A0"/>
+            </a:solidFill>
+          </a:ln>
+        </p:spPr>
+        <p:txBody>
+          <a:bodyPr wrap="square" rtlCol="0">
+            <a:spAutoFit/>
+          </a:bodyPr>
+          <a:lstStyle/>
+          <a:p>
+            <a:endParaRPr lang="en-US" dirty="0"/>
+          </a:p>
+        </p:txBody>
+      </p:sp>
+      <p:cxnSp>
+        <p:nvCxnSpPr>
+          <p:cNvPr id="13" name="Straight Arrow Connector 12">
+            <a:extLst>
+              <a:ext uri="{FF2B5EF4-FFF2-40B4-BE49-F238E27FC236}">
+                <a16:creationId xmlns:a16="http://schemas.microsoft.com/office/drawing/2014/main" id="{1770D480-3468-4745-895A-C838D453435C}"/>
+              </a:ext>
+            </a:extLst>
+          </p:cNvPr>
+          <p:cNvCxnSpPr/>
+          <p:nvPr/>
+        </p:nvCxnSpPr>
+        <p:spPr>
+          <a:xfrm>
+            <a:off x="9610725" y="2265640"/>
+            <a:ext cx="571500" cy="0"/>
+          </a:xfrm>
+          <a:prstGeom prst="straightConnector1">
+            <a:avLst/>
+          </a:prstGeom>
+          <a:ln>
+            <a:tailEnd type="triangle"/>
+          </a:ln>
+        </p:spPr>
+        <p:style>
+          <a:lnRef idx="1">
+            <a:schemeClr val="accent1"/>
+          </a:lnRef>
+          <a:fillRef idx="0">
+            <a:schemeClr val="accent1"/>
+          </a:fillRef>
+          <a:effectRef idx="0">
+            <a:schemeClr val="accent1"/>
+          </a:effectRef>
+          <a:fontRef idx="minor">
+            <a:schemeClr val="tx1"/>
+          </a:fontRef>
+        </p:style>
+      </p:cxnSp>
+      <p:sp>
+        <p:nvSpPr>
+          <p:cNvPr id="14" name="TextBox 13">
+            <a:extLst>
+              <a:ext uri="{FF2B5EF4-FFF2-40B4-BE49-F238E27FC236}">
+                <a16:creationId xmlns:a16="http://schemas.microsoft.com/office/drawing/2014/main" id="{D3DE3E7E-4489-4ACE-8FD3-BB76D9166C4D}"/>
+              </a:ext>
+            </a:extLst>
+          </p:cNvPr>
+          <p:cNvSpPr txBox="1"/>
+          <p:nvPr/>
+        </p:nvSpPr>
+        <p:spPr>
+          <a:xfrm>
+            <a:off x="10247149" y="2087364"/>
+            <a:ext cx="1875214" cy="369332"/>
+          </a:xfrm>
+          <a:prstGeom prst="rect">
+            <a:avLst/>
+          </a:prstGeom>
+          <a:noFill/>
+        </p:spPr>
+        <p:txBody>
+          <a:bodyPr wrap="square" rtlCol="0">
+            <a:spAutoFit/>
+          </a:bodyPr>
+          <a:lstStyle/>
+          <a:p>
+            <a:r>
+              <a:rPr lang="pt-BR" dirty="0"/>
+              <a:t>Perdeu material!</a:t>
+            </a:r>
+            <a:endParaRPr lang="en-US" dirty="0"/>
+          </a:p>
+        </p:txBody>
+      </p:sp>
+      <p:cxnSp>
+        <p:nvCxnSpPr>
+          <p:cNvPr id="16" name="Straight Arrow Connector 15">
+            <a:extLst>
+              <a:ext uri="{FF2B5EF4-FFF2-40B4-BE49-F238E27FC236}">
+                <a16:creationId xmlns:a16="http://schemas.microsoft.com/office/drawing/2014/main" id="{8BFA4541-173E-4E09-A5AC-D6EAB5D0A0D6}"/>
+              </a:ext>
+            </a:extLst>
+          </p:cNvPr>
+          <p:cNvCxnSpPr/>
+          <p:nvPr/>
+        </p:nvCxnSpPr>
+        <p:spPr>
+          <a:xfrm>
+            <a:off x="9622411" y="2612671"/>
+            <a:ext cx="571500" cy="0"/>
+          </a:xfrm>
+          <a:prstGeom prst="straightConnector1">
+            <a:avLst/>
+          </a:prstGeom>
+          <a:ln>
+            <a:tailEnd type="triangle"/>
+          </a:ln>
+        </p:spPr>
+        <p:style>
+          <a:lnRef idx="1">
+            <a:schemeClr val="accent1"/>
+          </a:lnRef>
+          <a:fillRef idx="0">
+            <a:schemeClr val="accent1"/>
+          </a:fillRef>
+          <a:effectRef idx="0">
+            <a:schemeClr val="accent1"/>
+          </a:effectRef>
+          <a:fontRef idx="minor">
+            <a:schemeClr val="tx1"/>
+          </a:fontRef>
+        </p:style>
+      </p:cxnSp>
+      <p:sp>
+        <p:nvSpPr>
+          <p:cNvPr id="17" name="TextBox 16">
+            <a:extLst>
+              <a:ext uri="{FF2B5EF4-FFF2-40B4-BE49-F238E27FC236}">
+                <a16:creationId xmlns:a16="http://schemas.microsoft.com/office/drawing/2014/main" id="{31F541DE-5DFB-46F7-973F-0EE872FBAF85}"/>
+              </a:ext>
+            </a:extLst>
+          </p:cNvPr>
+          <p:cNvSpPr txBox="1"/>
+          <p:nvPr/>
+        </p:nvSpPr>
+        <p:spPr>
+          <a:xfrm>
+            <a:off x="10258835" y="2434395"/>
+            <a:ext cx="1875214" cy="369332"/>
+          </a:xfrm>
+          <a:prstGeom prst="rect">
+            <a:avLst/>
+          </a:prstGeom>
+          <a:noFill/>
+        </p:spPr>
+        <p:txBody>
+          <a:bodyPr wrap="square" rtlCol="0">
+            <a:spAutoFit/>
+          </a:bodyPr>
+          <a:lstStyle/>
+          <a:p>
+            <a:r>
+              <a:rPr lang="pt-BR" dirty="0"/>
+              <a:t>Perdeu cliente!</a:t>
+            </a:r>
+            <a:endParaRPr lang="en-US" dirty="0"/>
+          </a:p>
+        </p:txBody>
+      </p:sp>
+      <p:sp>
+        <p:nvSpPr>
+          <p:cNvPr id="18" name="TextBox 17">
+            <a:extLst>
+              <a:ext uri="{FF2B5EF4-FFF2-40B4-BE49-F238E27FC236}">
+                <a16:creationId xmlns:a16="http://schemas.microsoft.com/office/drawing/2014/main" id="{8A569D82-09C5-4B6B-AC5E-AB7B4E81D96B}"/>
+              </a:ext>
+            </a:extLst>
+          </p:cNvPr>
+          <p:cNvSpPr txBox="1"/>
+          <p:nvPr/>
+        </p:nvSpPr>
+        <p:spPr>
+          <a:xfrm>
+            <a:off x="3204672" y="2410995"/>
+            <a:ext cx="6286499" cy="337502"/>
+          </a:xfrm>
+          <a:prstGeom prst="rect">
+            <a:avLst/>
+          </a:prstGeom>
+          <a:noFill/>
+          <a:ln w="57150">
+            <a:solidFill>
+              <a:srgbClr val="7030A0"/>
+            </a:solidFill>
+          </a:ln>
+        </p:spPr>
+        <p:txBody>
+          <a:bodyPr wrap="square" rtlCol="0">
+            <a:spAutoFit/>
+          </a:bodyPr>
+          <a:lstStyle/>
+          <a:p>
+            <a:endParaRPr lang="en-US" dirty="0"/>
+          </a:p>
+        </p:txBody>
+      </p:sp>
+      <p:sp>
+        <p:nvSpPr>
+          <p:cNvPr id="19" name="TextBox 18">
+            <a:extLst>
+              <a:ext uri="{FF2B5EF4-FFF2-40B4-BE49-F238E27FC236}">
+                <a16:creationId xmlns:a16="http://schemas.microsoft.com/office/drawing/2014/main" id="{4F112E6E-5C61-4BA4-B404-B09C3846F73A}"/>
+              </a:ext>
+            </a:extLst>
+          </p:cNvPr>
+          <p:cNvSpPr txBox="1"/>
+          <p:nvPr/>
+        </p:nvSpPr>
+        <p:spPr>
+          <a:xfrm>
+            <a:off x="3204671" y="3412333"/>
+            <a:ext cx="6286500" cy="754743"/>
+          </a:xfrm>
+          <a:prstGeom prst="rect">
+            <a:avLst/>
+          </a:prstGeom>
+          <a:noFill/>
+          <a:ln w="57150">
+            <a:solidFill>
+              <a:srgbClr val="7030A0"/>
+            </a:solidFill>
+          </a:ln>
+        </p:spPr>
+        <p:txBody>
+          <a:bodyPr wrap="square" rtlCol="0">
+            <a:spAutoFit/>
+          </a:bodyPr>
+          <a:lstStyle/>
+          <a:p>
+            <a:endParaRPr lang="en-US" dirty="0"/>
+          </a:p>
+        </p:txBody>
+      </p:sp>
+      <p:cxnSp>
+        <p:nvCxnSpPr>
+          <p:cNvPr id="20" name="Straight Arrow Connector 19">
+            <a:extLst>
+              <a:ext uri="{FF2B5EF4-FFF2-40B4-BE49-F238E27FC236}">
+                <a16:creationId xmlns:a16="http://schemas.microsoft.com/office/drawing/2014/main" id="{6A88D8EC-BD49-4A28-AD76-0A5A6AA4518C}"/>
+              </a:ext>
+            </a:extLst>
+          </p:cNvPr>
+          <p:cNvCxnSpPr/>
+          <p:nvPr/>
+        </p:nvCxnSpPr>
+        <p:spPr>
+          <a:xfrm>
+            <a:off x="9624137" y="3749624"/>
+            <a:ext cx="571500" cy="0"/>
+          </a:xfrm>
+          <a:prstGeom prst="straightConnector1">
+            <a:avLst/>
+          </a:prstGeom>
+          <a:ln>
+            <a:tailEnd type="triangle"/>
+          </a:ln>
+        </p:spPr>
+        <p:style>
+          <a:lnRef idx="1">
+            <a:schemeClr val="accent1"/>
+          </a:lnRef>
+          <a:fillRef idx="0">
+            <a:schemeClr val="accent1"/>
+          </a:fillRef>
+          <a:effectRef idx="0">
+            <a:schemeClr val="accent1"/>
+          </a:effectRef>
+          <a:fontRef idx="minor">
+            <a:schemeClr val="tx1"/>
+          </a:fontRef>
+        </p:style>
+      </p:cxnSp>
+      <p:sp>
+        <p:nvSpPr>
+          <p:cNvPr id="21" name="TextBox 20">
+            <a:extLst>
+              <a:ext uri="{FF2B5EF4-FFF2-40B4-BE49-F238E27FC236}">
+                <a16:creationId xmlns:a16="http://schemas.microsoft.com/office/drawing/2014/main" id="{003CF1AD-32E2-435A-8DB6-13563B875CAA}"/>
+              </a:ext>
+            </a:extLst>
+          </p:cNvPr>
+          <p:cNvSpPr txBox="1"/>
+          <p:nvPr/>
+        </p:nvSpPr>
+        <p:spPr>
+          <a:xfrm>
+            <a:off x="10193911" y="3571348"/>
+            <a:ext cx="1941864" cy="923330"/>
+          </a:xfrm>
+          <a:prstGeom prst="rect">
+            <a:avLst/>
+          </a:prstGeom>
+          <a:noFill/>
+        </p:spPr>
+        <p:txBody>
+          <a:bodyPr wrap="square" rtlCol="0">
+            <a:spAutoFit/>
+          </a:bodyPr>
+          <a:lstStyle/>
+          <a:p>
+            <a:pPr algn="ctr"/>
+            <a:r>
+              <a:rPr lang="pt-BR" dirty="0"/>
+              <a:t>Redução de Perda! (Material/Cliente)</a:t>
+            </a:r>
+            <a:endParaRPr lang="en-US" dirty="0"/>
+          </a:p>
+        </p:txBody>
+      </p:sp>
+      <p:cxnSp>
+        <p:nvCxnSpPr>
+          <p:cNvPr id="22" name="Straight Arrow Connector 21">
+            <a:extLst>
+              <a:ext uri="{FF2B5EF4-FFF2-40B4-BE49-F238E27FC236}">
+                <a16:creationId xmlns:a16="http://schemas.microsoft.com/office/drawing/2014/main" id="{4E50759A-97B7-4945-A002-DA1B3477B5D9}"/>
+              </a:ext>
+            </a:extLst>
+          </p:cNvPr>
+          <p:cNvCxnSpPr/>
+          <p:nvPr/>
+        </p:nvCxnSpPr>
+        <p:spPr>
+          <a:xfrm>
+            <a:off x="11201400" y="4676775"/>
+            <a:ext cx="0" cy="304800"/>
+          </a:xfrm>
+          <a:prstGeom prst="straightConnector1">
+            <a:avLst/>
+          </a:prstGeom>
+          <a:ln>
+            <a:tailEnd type="triangle"/>
+          </a:ln>
+        </p:spPr>
+        <p:style>
+          <a:lnRef idx="1">
+            <a:schemeClr val="accent1"/>
+          </a:lnRef>
+          <a:fillRef idx="0">
+            <a:schemeClr val="accent1"/>
+          </a:fillRef>
+          <a:effectRef idx="0">
+            <a:schemeClr val="accent1"/>
+          </a:effectRef>
+          <a:fontRef idx="minor">
+            <a:schemeClr val="tx1"/>
+          </a:fontRef>
+        </p:style>
+      </p:cxnSp>
+      <p:sp>
+        <p:nvSpPr>
+          <p:cNvPr id="24" name="TextBox 23">
+            <a:extLst>
+              <a:ext uri="{FF2B5EF4-FFF2-40B4-BE49-F238E27FC236}">
+                <a16:creationId xmlns:a16="http://schemas.microsoft.com/office/drawing/2014/main" id="{31846E05-5B27-4ACD-A7C2-30BC78B34F27}"/>
+              </a:ext>
+            </a:extLst>
+          </p:cNvPr>
+          <p:cNvSpPr txBox="1"/>
+          <p:nvPr/>
+        </p:nvSpPr>
+        <p:spPr>
+          <a:xfrm>
+            <a:off x="10108987" y="5105399"/>
+            <a:ext cx="2083013" cy="646331"/>
+          </a:xfrm>
+          <a:prstGeom prst="rect">
+            <a:avLst/>
+          </a:prstGeom>
+          <a:noFill/>
+        </p:spPr>
+        <p:txBody>
+          <a:bodyPr wrap="square" rtlCol="0">
+            <a:spAutoFit/>
+          </a:bodyPr>
+          <a:lstStyle/>
+          <a:p>
+            <a:pPr algn="ctr"/>
+            <a:r>
+              <a:rPr lang="pt-BR" b="1" dirty="0"/>
+              <a:t>Valor do Negócio!</a:t>
+            </a:r>
+            <a:endParaRPr lang="en-US" b="1" dirty="0"/>
+          </a:p>
+        </p:txBody>
+      </p:sp>
+      <p:sp>
+        <p:nvSpPr>
+          <p:cNvPr id="25" name="Title 1">
+            <a:extLst>
+              <a:ext uri="{FF2B5EF4-FFF2-40B4-BE49-F238E27FC236}">
+                <a16:creationId xmlns:a16="http://schemas.microsoft.com/office/drawing/2014/main" id="{5DB69735-872D-48E7-BFD1-30F354B670E8}"/>
+              </a:ext>
+            </a:extLst>
+          </p:cNvPr>
+          <p:cNvSpPr txBox="1">
+            <a:spLocks/>
+          </p:cNvSpPr>
+          <p:nvPr/>
+        </p:nvSpPr>
+        <p:spPr>
+          <a:xfrm>
+            <a:off x="301951" y="6075225"/>
+            <a:ext cx="6512694" cy="492247"/>
+          </a:xfrm>
+          <a:prstGeom prst="rect">
+            <a:avLst/>
+          </a:prstGeom>
+        </p:spPr>
+        <p:txBody>
+          <a:bodyPr vert="horz" lIns="91440" tIns="45720" rIns="91440" bIns="45720" rtlCol="0" anchor="ctr">
+            <a:noAutofit/>
+          </a:bodyPr>
+          <a:lstStyle>
+            <a:lvl1pPr algn="l" defTabSz="914400" rtl="0" eaLnBrk="1" latinLnBrk="0" hangingPunct="1">
+              <a:lnSpc>
+                <a:spcPct val="90000"/>
+              </a:lnSpc>
+              <a:spcBef>
+                <a:spcPct val="0"/>
+              </a:spcBef>
+              <a:buNone/>
+              <a:defRPr sz="4400" kern="1200">
+                <a:solidFill>
+                  <a:schemeClr val="tx1"/>
+                </a:solidFill>
+                <a:latin typeface="+mj-lt"/>
+                <a:ea typeface="+mj-ea"/>
+                <a:cs typeface="+mj-cs"/>
+              </a:defRPr>
+            </a:lvl1pPr>
+          </a:lstStyle>
+          <a:p>
+            <a:r>
+              <a:rPr lang="en-US" sz="3000" dirty="0"/>
+              <a:t>Joãozinho fez BI de sua padoca! =D</a:t>
+            </a:r>
+          </a:p>
+        </p:txBody>
+      </p:sp>
+    </p:spTree>
+    <p:extLst>
+      <p:ext uri="{BB962C8B-B14F-4D97-AF65-F5344CB8AC3E}">
+        <p14:creationId xmlns:p14="http://schemas.microsoft.com/office/powerpoint/2010/main" val="2727167093"/>
+      </p:ext>
+    </p:extLst>
+  </p:cSld>
+  <p:clrMapOvr>
+    <a:masterClrMapping/>
+  </p:clrMapOvr>
+  <p:timing>
+    <p:tnLst>
+      <p:par>
+        <p:cTn id="1" dur="indefinite" restart="never" nodeType="tmRoot">
+          <p:childTnLst>
+            <p:seq concurrent="1" nextAc="seek">
+              <p:cTn id="2" dur="indefinite" nodeType="mainSeq">
+                <p:childTnLst>
+                  <p:par>
+                    <p:cTn id="3" fill="hold">
+                      <p:stCondLst>
+                        <p:cond delay="indefinite"/>
+                      </p:stCondLst>
+                      <p:childTnLst>
+                        <p:par>
+                          <p:cTn id="4" fill="hold">
+                            <p:stCondLst>
+                              <p:cond delay="0"/>
+                            </p:stCondLst>
+                            <p:childTnLst>
+                              <p:par>
+                                <p:cTn id="5" presetID="42" presetClass="entr" presetSubtype="0" fill="hold" grpId="0" nodeType="clickEffect">
+                                  <p:stCondLst>
+                                    <p:cond delay="0"/>
+                                  </p:stCondLst>
+                                  <p:childTnLst>
+                                    <p:set>
+                                      <p:cBhvr>
+                                        <p:cTn id="6" dur="1" fill="hold">
+                                          <p:stCondLst>
+                                            <p:cond delay="0"/>
+                                          </p:stCondLst>
+                                        </p:cTn>
+                                        <p:tgtEl>
+                                          <p:spTgt spid="3"/>
+                                        </p:tgtEl>
+                                        <p:attrNameLst>
+                                          <p:attrName>style.visibility</p:attrName>
+                                        </p:attrNameLst>
+                                      </p:cBhvr>
+                                      <p:to>
+                                        <p:strVal val="visible"/>
+                                      </p:to>
+                                    </p:set>
+                                    <p:animEffect transition="in" filter="fade">
+                                      <p:cBhvr>
+                                        <p:cTn id="7" dur="1000"/>
+                                        <p:tgtEl>
+                                          <p:spTgt spid="3"/>
+                                        </p:tgtEl>
+                                      </p:cBhvr>
+                                    </p:animEffect>
+                                    <p:anim calcmode="lin" valueType="num">
+                                      <p:cBhvr>
+                                        <p:cTn id="8" dur="1000" fill="hold"/>
+                                        <p:tgtEl>
+                                          <p:spTgt spid="3"/>
+                                        </p:tgtEl>
+                                        <p:attrNameLst>
+                                          <p:attrName>ppt_x</p:attrName>
+                                        </p:attrNameLst>
+                                      </p:cBhvr>
+                                      <p:tavLst>
+                                        <p:tav tm="0">
+                                          <p:val>
+                                            <p:strVal val="#ppt_x"/>
+                                          </p:val>
+                                        </p:tav>
+                                        <p:tav tm="100000">
+                                          <p:val>
+                                            <p:strVal val="#ppt_x"/>
+                                          </p:val>
+                                        </p:tav>
+                                      </p:tavLst>
+                                    </p:anim>
+                                    <p:anim calcmode="lin" valueType="num">
+                                      <p:cBhvr>
+                                        <p:cTn id="9" dur="1000" fill="hold"/>
+                                        <p:tgtEl>
+                                          <p:spTgt spid="3"/>
+                                        </p:tgtEl>
+                                        <p:attrNameLst>
+                                          <p:attrName>ppt_y</p:attrName>
+                                        </p:attrNameLst>
+                                      </p:cBhvr>
+                                      <p:tavLst>
+                                        <p:tav tm="0">
+                                          <p:val>
+                                            <p:strVal val="#ppt_y+.1"/>
+                                          </p:val>
+                                        </p:tav>
+                                        <p:tav tm="100000">
+                                          <p:val>
+                                            <p:strVal val="#ppt_y"/>
+                                          </p:val>
+                                        </p:tav>
+                                      </p:tavLst>
+                                    </p:anim>
+                                  </p:childTnLst>
+                                </p:cTn>
+                              </p:par>
+                              <p:par>
+                                <p:cTn id="10" presetID="42" presetClass="entr" presetSubtype="0" fill="hold" nodeType="withEffect">
+                                  <p:stCondLst>
+                                    <p:cond delay="0"/>
+                                  </p:stCondLst>
+                                  <p:childTnLst>
+                                    <p:set>
+                                      <p:cBhvr>
+                                        <p:cTn id="11" dur="1" fill="hold">
+                                          <p:stCondLst>
+                                            <p:cond delay="0"/>
+                                          </p:stCondLst>
+                                        </p:cTn>
+                                        <p:tgtEl>
+                                          <p:spTgt spid="1026"/>
+                                        </p:tgtEl>
+                                        <p:attrNameLst>
+                                          <p:attrName>style.visibility</p:attrName>
+                                        </p:attrNameLst>
+                                      </p:cBhvr>
+                                      <p:to>
+                                        <p:strVal val="visible"/>
+                                      </p:to>
+                                    </p:set>
+                                    <p:animEffect transition="in" filter="fade">
+                                      <p:cBhvr>
+                                        <p:cTn id="12" dur="1000"/>
+                                        <p:tgtEl>
+                                          <p:spTgt spid="1026"/>
+                                        </p:tgtEl>
+                                      </p:cBhvr>
+                                    </p:animEffect>
+                                    <p:anim calcmode="lin" valueType="num">
+                                      <p:cBhvr>
+                                        <p:cTn id="13" dur="1000" fill="hold"/>
+                                        <p:tgtEl>
+                                          <p:spTgt spid="1026"/>
+                                        </p:tgtEl>
+                                        <p:attrNameLst>
+                                          <p:attrName>ppt_x</p:attrName>
+                                        </p:attrNameLst>
+                                      </p:cBhvr>
+                                      <p:tavLst>
+                                        <p:tav tm="0">
+                                          <p:val>
+                                            <p:strVal val="#ppt_x"/>
+                                          </p:val>
+                                        </p:tav>
+                                        <p:tav tm="100000">
+                                          <p:val>
+                                            <p:strVal val="#ppt_x"/>
+                                          </p:val>
+                                        </p:tav>
+                                      </p:tavLst>
+                                    </p:anim>
+                                    <p:anim calcmode="lin" valueType="num">
+                                      <p:cBhvr>
+                                        <p:cTn id="14" dur="1000" fill="hold"/>
+                                        <p:tgtEl>
+                                          <p:spTgt spid="1026"/>
+                                        </p:tgtEl>
+                                        <p:attrNameLst>
+                                          <p:attrName>ppt_y</p:attrName>
+                                        </p:attrNameLst>
+                                      </p:cBhvr>
+                                      <p:tavLst>
+                                        <p:tav tm="0">
+                                          <p:val>
+                                            <p:strVal val="#ppt_y+.1"/>
+                                          </p:val>
+                                        </p:tav>
+                                        <p:tav tm="100000">
+                                          <p:val>
+                                            <p:strVal val="#ppt_y"/>
+                                          </p:val>
+                                        </p:tav>
+                                      </p:tavLst>
+                                    </p:anim>
+                                  </p:childTnLst>
+                                </p:cTn>
+                              </p:par>
+                            </p:childTnLst>
+                          </p:cTn>
+                        </p:par>
+                      </p:childTnLst>
+                    </p:cTn>
+                  </p:par>
+                  <p:par>
+                    <p:cTn id="15" fill="hold">
+                      <p:stCondLst>
+                        <p:cond delay="indefinite"/>
+                      </p:stCondLst>
+                      <p:childTnLst>
+                        <p:par>
+                          <p:cTn id="16" fill="hold">
+                            <p:stCondLst>
+                              <p:cond delay="0"/>
+                            </p:stCondLst>
+                            <p:childTnLst>
+                              <p:par>
+                                <p:cTn id="17" presetID="42" presetClass="entr" presetSubtype="0" fill="hold" nodeType="clickEffect">
+                                  <p:stCondLst>
+                                    <p:cond delay="0"/>
+                                  </p:stCondLst>
+                                  <p:childTnLst>
+                                    <p:set>
+                                      <p:cBhvr>
+                                        <p:cTn id="18" dur="1" fill="hold">
+                                          <p:stCondLst>
+                                            <p:cond delay="0"/>
+                                          </p:stCondLst>
+                                        </p:cTn>
+                                        <p:tgtEl>
+                                          <p:spTgt spid="7"/>
+                                        </p:tgtEl>
+                                        <p:attrNameLst>
+                                          <p:attrName>style.visibility</p:attrName>
+                                        </p:attrNameLst>
+                                      </p:cBhvr>
+                                      <p:to>
+                                        <p:strVal val="visible"/>
+                                      </p:to>
+                                    </p:set>
+                                    <p:animEffect transition="in" filter="fade">
+                                      <p:cBhvr>
+                                        <p:cTn id="19" dur="1000"/>
+                                        <p:tgtEl>
+                                          <p:spTgt spid="7"/>
+                                        </p:tgtEl>
+                                      </p:cBhvr>
+                                    </p:animEffect>
+                                    <p:anim calcmode="lin" valueType="num">
+                                      <p:cBhvr>
+                                        <p:cTn id="20" dur="1000" fill="hold"/>
+                                        <p:tgtEl>
+                                          <p:spTgt spid="7"/>
+                                        </p:tgtEl>
+                                        <p:attrNameLst>
+                                          <p:attrName>ppt_x</p:attrName>
+                                        </p:attrNameLst>
+                                      </p:cBhvr>
+                                      <p:tavLst>
+                                        <p:tav tm="0">
+                                          <p:val>
+                                            <p:strVal val="#ppt_x"/>
+                                          </p:val>
+                                        </p:tav>
+                                        <p:tav tm="100000">
+                                          <p:val>
+                                            <p:strVal val="#ppt_x"/>
+                                          </p:val>
+                                        </p:tav>
+                                      </p:tavLst>
+                                    </p:anim>
+                                    <p:anim calcmode="lin" valueType="num">
+                                      <p:cBhvr>
+                                        <p:cTn id="21" dur="1000" fill="hold"/>
+                                        <p:tgtEl>
+                                          <p:spTgt spid="7"/>
+                                        </p:tgtEl>
+                                        <p:attrNameLst>
+                                          <p:attrName>ppt_y</p:attrName>
+                                        </p:attrNameLst>
+                                      </p:cBhvr>
+                                      <p:tavLst>
+                                        <p:tav tm="0">
+                                          <p:val>
+                                            <p:strVal val="#ppt_y+.1"/>
+                                          </p:val>
+                                        </p:tav>
+                                        <p:tav tm="100000">
+                                          <p:val>
+                                            <p:strVal val="#ppt_y"/>
+                                          </p:val>
+                                        </p:tav>
+                                      </p:tavLst>
+                                    </p:anim>
+                                  </p:childTnLst>
+                                </p:cTn>
+                              </p:par>
+                            </p:childTnLst>
+                          </p:cTn>
+                        </p:par>
+                      </p:childTnLst>
+                    </p:cTn>
+                  </p:par>
+                  <p:par>
+                    <p:cTn id="22" fill="hold">
+                      <p:stCondLst>
+                        <p:cond delay="indefinite"/>
+                      </p:stCondLst>
+                      <p:childTnLst>
+                        <p:par>
+                          <p:cTn id="23" fill="hold">
+                            <p:stCondLst>
+                              <p:cond delay="0"/>
+                            </p:stCondLst>
+                            <p:childTnLst>
+                              <p:par>
+                                <p:cTn id="24" presetID="42" presetClass="entr" presetSubtype="0" fill="hold" grpId="0" nodeType="clickEffect">
+                                  <p:stCondLst>
+                                    <p:cond delay="0"/>
+                                  </p:stCondLst>
+                                  <p:childTnLst>
+                                    <p:set>
+                                      <p:cBhvr>
+                                        <p:cTn id="25" dur="1" fill="hold">
+                                          <p:stCondLst>
+                                            <p:cond delay="0"/>
+                                          </p:stCondLst>
+                                        </p:cTn>
+                                        <p:tgtEl>
+                                          <p:spTgt spid="11"/>
+                                        </p:tgtEl>
+                                        <p:attrNameLst>
+                                          <p:attrName>style.visibility</p:attrName>
+                                        </p:attrNameLst>
+                                      </p:cBhvr>
+                                      <p:to>
+                                        <p:strVal val="visible"/>
+                                      </p:to>
+                                    </p:set>
+                                    <p:animEffect transition="in" filter="fade">
+                                      <p:cBhvr>
+                                        <p:cTn id="26" dur="1000"/>
+                                        <p:tgtEl>
+                                          <p:spTgt spid="11"/>
+                                        </p:tgtEl>
+                                      </p:cBhvr>
+                                    </p:animEffect>
+                                    <p:anim calcmode="lin" valueType="num">
+                                      <p:cBhvr>
+                                        <p:cTn id="27" dur="1000" fill="hold"/>
+                                        <p:tgtEl>
+                                          <p:spTgt spid="11"/>
+                                        </p:tgtEl>
+                                        <p:attrNameLst>
+                                          <p:attrName>ppt_x</p:attrName>
+                                        </p:attrNameLst>
+                                      </p:cBhvr>
+                                      <p:tavLst>
+                                        <p:tav tm="0">
+                                          <p:val>
+                                            <p:strVal val="#ppt_x"/>
+                                          </p:val>
+                                        </p:tav>
+                                        <p:tav tm="100000">
+                                          <p:val>
+                                            <p:strVal val="#ppt_x"/>
+                                          </p:val>
+                                        </p:tav>
+                                      </p:tavLst>
+                                    </p:anim>
+                                    <p:anim calcmode="lin" valueType="num">
+                                      <p:cBhvr>
+                                        <p:cTn id="28" dur="1000" fill="hold"/>
+                                        <p:tgtEl>
+                                          <p:spTgt spid="11"/>
+                                        </p:tgtEl>
+                                        <p:attrNameLst>
+                                          <p:attrName>ppt_y</p:attrName>
+                                        </p:attrNameLst>
+                                      </p:cBhvr>
+                                      <p:tavLst>
+                                        <p:tav tm="0">
+                                          <p:val>
+                                            <p:strVal val="#ppt_y+.1"/>
+                                          </p:val>
+                                        </p:tav>
+                                        <p:tav tm="100000">
+                                          <p:val>
+                                            <p:strVal val="#ppt_y"/>
+                                          </p:val>
+                                        </p:tav>
+                                      </p:tavLst>
+                                    </p:anim>
+                                  </p:childTnLst>
+                                </p:cTn>
+                              </p:par>
+                            </p:childTnLst>
+                          </p:cTn>
+                        </p:par>
+                      </p:childTnLst>
+                    </p:cTn>
+                  </p:par>
+                  <p:par>
+                    <p:cTn id="29" fill="hold">
+                      <p:stCondLst>
+                        <p:cond delay="indefinite"/>
+                      </p:stCondLst>
+                      <p:childTnLst>
+                        <p:par>
+                          <p:cTn id="30" fill="hold">
+                            <p:stCondLst>
+                              <p:cond delay="0"/>
+                            </p:stCondLst>
+                            <p:childTnLst>
+                              <p:par>
+                                <p:cTn id="31" presetID="42" presetClass="entr" presetSubtype="0" fill="hold" nodeType="clickEffect">
+                                  <p:stCondLst>
+                                    <p:cond delay="0"/>
+                                  </p:stCondLst>
+                                  <p:childTnLst>
+                                    <p:set>
+                                      <p:cBhvr>
+                                        <p:cTn id="32" dur="1" fill="hold">
+                                          <p:stCondLst>
+                                            <p:cond delay="0"/>
+                                          </p:stCondLst>
+                                        </p:cTn>
+                                        <p:tgtEl>
+                                          <p:spTgt spid="13"/>
+                                        </p:tgtEl>
+                                        <p:attrNameLst>
+                                          <p:attrName>style.visibility</p:attrName>
+                                        </p:attrNameLst>
+                                      </p:cBhvr>
+                                      <p:to>
+                                        <p:strVal val="visible"/>
+                                      </p:to>
+                                    </p:set>
+                                    <p:animEffect transition="in" filter="fade">
+                                      <p:cBhvr>
+                                        <p:cTn id="33" dur="1000"/>
+                                        <p:tgtEl>
+                                          <p:spTgt spid="13"/>
+                                        </p:tgtEl>
+                                      </p:cBhvr>
+                                    </p:animEffect>
+                                    <p:anim calcmode="lin" valueType="num">
+                                      <p:cBhvr>
+                                        <p:cTn id="34" dur="1000" fill="hold"/>
+                                        <p:tgtEl>
+                                          <p:spTgt spid="13"/>
+                                        </p:tgtEl>
+                                        <p:attrNameLst>
+                                          <p:attrName>ppt_x</p:attrName>
+                                        </p:attrNameLst>
+                                      </p:cBhvr>
+                                      <p:tavLst>
+                                        <p:tav tm="0">
+                                          <p:val>
+                                            <p:strVal val="#ppt_x"/>
+                                          </p:val>
+                                        </p:tav>
+                                        <p:tav tm="100000">
+                                          <p:val>
+                                            <p:strVal val="#ppt_x"/>
+                                          </p:val>
+                                        </p:tav>
+                                      </p:tavLst>
+                                    </p:anim>
+                                    <p:anim calcmode="lin" valueType="num">
+                                      <p:cBhvr>
+                                        <p:cTn id="35" dur="1000" fill="hold"/>
+                                        <p:tgtEl>
+                                          <p:spTgt spid="13"/>
+                                        </p:tgtEl>
+                                        <p:attrNameLst>
+                                          <p:attrName>ppt_y</p:attrName>
+                                        </p:attrNameLst>
+                                      </p:cBhvr>
+                                      <p:tavLst>
+                                        <p:tav tm="0">
+                                          <p:val>
+                                            <p:strVal val="#ppt_y+.1"/>
+                                          </p:val>
+                                        </p:tav>
+                                        <p:tav tm="100000">
+                                          <p:val>
+                                            <p:strVal val="#ppt_y"/>
+                                          </p:val>
+                                        </p:tav>
+                                      </p:tavLst>
+                                    </p:anim>
+                                  </p:childTnLst>
+                                </p:cTn>
+                              </p:par>
+                              <p:par>
+                                <p:cTn id="36" presetID="42" presetClass="entr" presetSubtype="0" fill="hold" grpId="0" nodeType="withEffect">
+                                  <p:stCondLst>
+                                    <p:cond delay="0"/>
+                                  </p:stCondLst>
+                                  <p:childTnLst>
+                                    <p:set>
+                                      <p:cBhvr>
+                                        <p:cTn id="37" dur="1" fill="hold">
+                                          <p:stCondLst>
+                                            <p:cond delay="0"/>
+                                          </p:stCondLst>
+                                        </p:cTn>
+                                        <p:tgtEl>
+                                          <p:spTgt spid="14"/>
+                                        </p:tgtEl>
+                                        <p:attrNameLst>
+                                          <p:attrName>style.visibility</p:attrName>
+                                        </p:attrNameLst>
+                                      </p:cBhvr>
+                                      <p:to>
+                                        <p:strVal val="visible"/>
+                                      </p:to>
+                                    </p:set>
+                                    <p:animEffect transition="in" filter="fade">
+                                      <p:cBhvr>
+                                        <p:cTn id="38" dur="1000"/>
+                                        <p:tgtEl>
+                                          <p:spTgt spid="14"/>
+                                        </p:tgtEl>
+                                      </p:cBhvr>
+                                    </p:animEffect>
+                                    <p:anim calcmode="lin" valueType="num">
+                                      <p:cBhvr>
+                                        <p:cTn id="39" dur="1000" fill="hold"/>
+                                        <p:tgtEl>
+                                          <p:spTgt spid="14"/>
+                                        </p:tgtEl>
+                                        <p:attrNameLst>
+                                          <p:attrName>ppt_x</p:attrName>
+                                        </p:attrNameLst>
+                                      </p:cBhvr>
+                                      <p:tavLst>
+                                        <p:tav tm="0">
+                                          <p:val>
+                                            <p:strVal val="#ppt_x"/>
+                                          </p:val>
+                                        </p:tav>
+                                        <p:tav tm="100000">
+                                          <p:val>
+                                            <p:strVal val="#ppt_x"/>
+                                          </p:val>
+                                        </p:tav>
+                                      </p:tavLst>
+                                    </p:anim>
+                                    <p:anim calcmode="lin" valueType="num">
+                                      <p:cBhvr>
+                                        <p:cTn id="40" dur="1000" fill="hold"/>
+                                        <p:tgtEl>
+                                          <p:spTgt spid="14"/>
+                                        </p:tgtEl>
+                                        <p:attrNameLst>
+                                          <p:attrName>ppt_y</p:attrName>
+                                        </p:attrNameLst>
+                                      </p:cBhvr>
+                                      <p:tavLst>
+                                        <p:tav tm="0">
+                                          <p:val>
+                                            <p:strVal val="#ppt_y+.1"/>
+                                          </p:val>
+                                        </p:tav>
+                                        <p:tav tm="100000">
+                                          <p:val>
+                                            <p:strVal val="#ppt_y"/>
+                                          </p:val>
+                                        </p:tav>
+                                      </p:tavLst>
+                                    </p:anim>
+                                  </p:childTnLst>
+                                </p:cTn>
+                              </p:par>
+                            </p:childTnLst>
+                          </p:cTn>
+                        </p:par>
+                      </p:childTnLst>
+                    </p:cTn>
+                  </p:par>
+                  <p:par>
+                    <p:cTn id="41" fill="hold">
+                      <p:stCondLst>
+                        <p:cond delay="indefinite"/>
+                      </p:stCondLst>
+                      <p:childTnLst>
+                        <p:par>
+                          <p:cTn id="42" fill="hold">
+                            <p:stCondLst>
+                              <p:cond delay="0"/>
+                            </p:stCondLst>
+                            <p:childTnLst>
+                              <p:par>
+                                <p:cTn id="43" presetID="42" presetClass="entr" presetSubtype="0" fill="hold" grpId="0" nodeType="clickEffect">
+                                  <p:stCondLst>
+                                    <p:cond delay="0"/>
+                                  </p:stCondLst>
+                                  <p:childTnLst>
+                                    <p:set>
+                                      <p:cBhvr>
+                                        <p:cTn id="44" dur="1" fill="hold">
+                                          <p:stCondLst>
+                                            <p:cond delay="0"/>
+                                          </p:stCondLst>
+                                        </p:cTn>
+                                        <p:tgtEl>
+                                          <p:spTgt spid="18"/>
+                                        </p:tgtEl>
+                                        <p:attrNameLst>
+                                          <p:attrName>style.visibility</p:attrName>
+                                        </p:attrNameLst>
+                                      </p:cBhvr>
+                                      <p:to>
+                                        <p:strVal val="visible"/>
+                                      </p:to>
+                                    </p:set>
+                                    <p:animEffect transition="in" filter="fade">
+                                      <p:cBhvr>
+                                        <p:cTn id="45" dur="1000"/>
+                                        <p:tgtEl>
+                                          <p:spTgt spid="18"/>
+                                        </p:tgtEl>
+                                      </p:cBhvr>
+                                    </p:animEffect>
+                                    <p:anim calcmode="lin" valueType="num">
+                                      <p:cBhvr>
+                                        <p:cTn id="46" dur="1000" fill="hold"/>
+                                        <p:tgtEl>
+                                          <p:spTgt spid="18"/>
+                                        </p:tgtEl>
+                                        <p:attrNameLst>
+                                          <p:attrName>ppt_x</p:attrName>
+                                        </p:attrNameLst>
+                                      </p:cBhvr>
+                                      <p:tavLst>
+                                        <p:tav tm="0">
+                                          <p:val>
+                                            <p:strVal val="#ppt_x"/>
+                                          </p:val>
+                                        </p:tav>
+                                        <p:tav tm="100000">
+                                          <p:val>
+                                            <p:strVal val="#ppt_x"/>
+                                          </p:val>
+                                        </p:tav>
+                                      </p:tavLst>
+                                    </p:anim>
+                                    <p:anim calcmode="lin" valueType="num">
+                                      <p:cBhvr>
+                                        <p:cTn id="47" dur="1000" fill="hold"/>
+                                        <p:tgtEl>
+                                          <p:spTgt spid="18"/>
+                                        </p:tgtEl>
+                                        <p:attrNameLst>
+                                          <p:attrName>ppt_y</p:attrName>
+                                        </p:attrNameLst>
+                                      </p:cBhvr>
+                                      <p:tavLst>
+                                        <p:tav tm="0">
+                                          <p:val>
+                                            <p:strVal val="#ppt_y+.1"/>
+                                          </p:val>
+                                        </p:tav>
+                                        <p:tav tm="100000">
+                                          <p:val>
+                                            <p:strVal val="#ppt_y"/>
+                                          </p:val>
+                                        </p:tav>
+                                      </p:tavLst>
+                                    </p:anim>
+                                  </p:childTnLst>
+                                </p:cTn>
+                              </p:par>
+                            </p:childTnLst>
+                          </p:cTn>
+                        </p:par>
+                      </p:childTnLst>
+                    </p:cTn>
+                  </p:par>
+                  <p:par>
+                    <p:cTn id="48" fill="hold">
+                      <p:stCondLst>
+                        <p:cond delay="indefinite"/>
+                      </p:stCondLst>
+                      <p:childTnLst>
+                        <p:par>
+                          <p:cTn id="49" fill="hold">
+                            <p:stCondLst>
+                              <p:cond delay="0"/>
+                            </p:stCondLst>
+                            <p:childTnLst>
+                              <p:par>
+                                <p:cTn id="50" presetID="42" presetClass="entr" presetSubtype="0" fill="hold" nodeType="clickEffect">
+                                  <p:stCondLst>
+                                    <p:cond delay="0"/>
+                                  </p:stCondLst>
+                                  <p:childTnLst>
+                                    <p:set>
+                                      <p:cBhvr>
+                                        <p:cTn id="51" dur="1" fill="hold">
+                                          <p:stCondLst>
+                                            <p:cond delay="0"/>
+                                          </p:stCondLst>
+                                        </p:cTn>
+                                        <p:tgtEl>
+                                          <p:spTgt spid="16"/>
+                                        </p:tgtEl>
+                                        <p:attrNameLst>
+                                          <p:attrName>style.visibility</p:attrName>
+                                        </p:attrNameLst>
+                                      </p:cBhvr>
+                                      <p:to>
+                                        <p:strVal val="visible"/>
+                                      </p:to>
+                                    </p:set>
+                                    <p:animEffect transition="in" filter="fade">
+                                      <p:cBhvr>
+                                        <p:cTn id="52" dur="1000"/>
+                                        <p:tgtEl>
+                                          <p:spTgt spid="16"/>
+                                        </p:tgtEl>
+                                      </p:cBhvr>
+                                    </p:animEffect>
+                                    <p:anim calcmode="lin" valueType="num">
+                                      <p:cBhvr>
+                                        <p:cTn id="53" dur="1000" fill="hold"/>
+                                        <p:tgtEl>
+                                          <p:spTgt spid="16"/>
+                                        </p:tgtEl>
+                                        <p:attrNameLst>
+                                          <p:attrName>ppt_x</p:attrName>
+                                        </p:attrNameLst>
+                                      </p:cBhvr>
+                                      <p:tavLst>
+                                        <p:tav tm="0">
+                                          <p:val>
+                                            <p:strVal val="#ppt_x"/>
+                                          </p:val>
+                                        </p:tav>
+                                        <p:tav tm="100000">
+                                          <p:val>
+                                            <p:strVal val="#ppt_x"/>
+                                          </p:val>
+                                        </p:tav>
+                                      </p:tavLst>
+                                    </p:anim>
+                                    <p:anim calcmode="lin" valueType="num">
+                                      <p:cBhvr>
+                                        <p:cTn id="54" dur="1000" fill="hold"/>
+                                        <p:tgtEl>
+                                          <p:spTgt spid="16"/>
+                                        </p:tgtEl>
+                                        <p:attrNameLst>
+                                          <p:attrName>ppt_y</p:attrName>
+                                        </p:attrNameLst>
+                                      </p:cBhvr>
+                                      <p:tavLst>
+                                        <p:tav tm="0">
+                                          <p:val>
+                                            <p:strVal val="#ppt_y+.1"/>
+                                          </p:val>
+                                        </p:tav>
+                                        <p:tav tm="100000">
+                                          <p:val>
+                                            <p:strVal val="#ppt_y"/>
+                                          </p:val>
+                                        </p:tav>
+                                      </p:tavLst>
+                                    </p:anim>
+                                  </p:childTnLst>
+                                </p:cTn>
+                              </p:par>
+                              <p:par>
+                                <p:cTn id="55" presetID="42" presetClass="entr" presetSubtype="0" fill="hold" grpId="0" nodeType="withEffect">
+                                  <p:stCondLst>
+                                    <p:cond delay="0"/>
+                                  </p:stCondLst>
+                                  <p:childTnLst>
+                                    <p:set>
+                                      <p:cBhvr>
+                                        <p:cTn id="56" dur="1" fill="hold">
+                                          <p:stCondLst>
+                                            <p:cond delay="0"/>
+                                          </p:stCondLst>
+                                        </p:cTn>
+                                        <p:tgtEl>
+                                          <p:spTgt spid="17"/>
+                                        </p:tgtEl>
+                                        <p:attrNameLst>
+                                          <p:attrName>style.visibility</p:attrName>
+                                        </p:attrNameLst>
+                                      </p:cBhvr>
+                                      <p:to>
+                                        <p:strVal val="visible"/>
+                                      </p:to>
+                                    </p:set>
+                                    <p:animEffect transition="in" filter="fade">
+                                      <p:cBhvr>
+                                        <p:cTn id="57" dur="1000"/>
+                                        <p:tgtEl>
+                                          <p:spTgt spid="17"/>
+                                        </p:tgtEl>
+                                      </p:cBhvr>
+                                    </p:animEffect>
+                                    <p:anim calcmode="lin" valueType="num">
+                                      <p:cBhvr>
+                                        <p:cTn id="58" dur="1000" fill="hold"/>
+                                        <p:tgtEl>
+                                          <p:spTgt spid="17"/>
+                                        </p:tgtEl>
+                                        <p:attrNameLst>
+                                          <p:attrName>ppt_x</p:attrName>
+                                        </p:attrNameLst>
+                                      </p:cBhvr>
+                                      <p:tavLst>
+                                        <p:tav tm="0">
+                                          <p:val>
+                                            <p:strVal val="#ppt_x"/>
+                                          </p:val>
+                                        </p:tav>
+                                        <p:tav tm="100000">
+                                          <p:val>
+                                            <p:strVal val="#ppt_x"/>
+                                          </p:val>
+                                        </p:tav>
+                                      </p:tavLst>
+                                    </p:anim>
+                                    <p:anim calcmode="lin" valueType="num">
+                                      <p:cBhvr>
+                                        <p:cTn id="59" dur="1000" fill="hold"/>
+                                        <p:tgtEl>
+                                          <p:spTgt spid="17"/>
+                                        </p:tgtEl>
+                                        <p:attrNameLst>
+                                          <p:attrName>ppt_y</p:attrName>
+                                        </p:attrNameLst>
+                                      </p:cBhvr>
+                                      <p:tavLst>
+                                        <p:tav tm="0">
+                                          <p:val>
+                                            <p:strVal val="#ppt_y+.1"/>
+                                          </p:val>
+                                        </p:tav>
+                                        <p:tav tm="100000">
+                                          <p:val>
+                                            <p:strVal val="#ppt_y"/>
+                                          </p:val>
+                                        </p:tav>
+                                      </p:tavLst>
+                                    </p:anim>
+                                  </p:childTnLst>
+                                </p:cTn>
+                              </p:par>
+                            </p:childTnLst>
+                          </p:cTn>
+                        </p:par>
+                      </p:childTnLst>
+                    </p:cTn>
+                  </p:par>
+                  <p:par>
+                    <p:cTn id="60" fill="hold">
+                      <p:stCondLst>
+                        <p:cond delay="indefinite"/>
+                      </p:stCondLst>
+                      <p:childTnLst>
+                        <p:par>
+                          <p:cTn id="61" fill="hold">
+                            <p:stCondLst>
+                              <p:cond delay="0"/>
+                            </p:stCondLst>
+                            <p:childTnLst>
+                              <p:par>
+                                <p:cTn id="62" presetID="42" presetClass="entr" presetSubtype="0" fill="hold" grpId="0" nodeType="clickEffect">
+                                  <p:stCondLst>
+                                    <p:cond delay="0"/>
+                                  </p:stCondLst>
+                                  <p:childTnLst>
+                                    <p:set>
+                                      <p:cBhvr>
+                                        <p:cTn id="63" dur="1" fill="hold">
+                                          <p:stCondLst>
+                                            <p:cond delay="0"/>
+                                          </p:stCondLst>
+                                        </p:cTn>
+                                        <p:tgtEl>
+                                          <p:spTgt spid="19"/>
+                                        </p:tgtEl>
+                                        <p:attrNameLst>
+                                          <p:attrName>style.visibility</p:attrName>
+                                        </p:attrNameLst>
+                                      </p:cBhvr>
+                                      <p:to>
+                                        <p:strVal val="visible"/>
+                                      </p:to>
+                                    </p:set>
+                                    <p:animEffect transition="in" filter="fade">
+                                      <p:cBhvr>
+                                        <p:cTn id="64" dur="1000"/>
+                                        <p:tgtEl>
+                                          <p:spTgt spid="19"/>
+                                        </p:tgtEl>
+                                      </p:cBhvr>
+                                    </p:animEffect>
+                                    <p:anim calcmode="lin" valueType="num">
+                                      <p:cBhvr>
+                                        <p:cTn id="65" dur="1000" fill="hold"/>
+                                        <p:tgtEl>
+                                          <p:spTgt spid="19"/>
+                                        </p:tgtEl>
+                                        <p:attrNameLst>
+                                          <p:attrName>ppt_x</p:attrName>
+                                        </p:attrNameLst>
+                                      </p:cBhvr>
+                                      <p:tavLst>
+                                        <p:tav tm="0">
+                                          <p:val>
+                                            <p:strVal val="#ppt_x"/>
+                                          </p:val>
+                                        </p:tav>
+                                        <p:tav tm="100000">
+                                          <p:val>
+                                            <p:strVal val="#ppt_x"/>
+                                          </p:val>
+                                        </p:tav>
+                                      </p:tavLst>
+                                    </p:anim>
+                                    <p:anim calcmode="lin" valueType="num">
+                                      <p:cBhvr>
+                                        <p:cTn id="66" dur="1000" fill="hold"/>
+                                        <p:tgtEl>
+                                          <p:spTgt spid="19"/>
+                                        </p:tgtEl>
+                                        <p:attrNameLst>
+                                          <p:attrName>ppt_y</p:attrName>
+                                        </p:attrNameLst>
+                                      </p:cBhvr>
+                                      <p:tavLst>
+                                        <p:tav tm="0">
+                                          <p:val>
+                                            <p:strVal val="#ppt_y+.1"/>
+                                          </p:val>
+                                        </p:tav>
+                                        <p:tav tm="100000">
+                                          <p:val>
+                                            <p:strVal val="#ppt_y"/>
+                                          </p:val>
+                                        </p:tav>
+                                      </p:tavLst>
+                                    </p:anim>
+                                  </p:childTnLst>
+                                </p:cTn>
+                              </p:par>
+                            </p:childTnLst>
+                          </p:cTn>
+                        </p:par>
+                      </p:childTnLst>
+                    </p:cTn>
+                  </p:par>
+                  <p:par>
+                    <p:cTn id="67" fill="hold">
+                      <p:stCondLst>
+                        <p:cond delay="indefinite"/>
+                      </p:stCondLst>
+                      <p:childTnLst>
+                        <p:par>
+                          <p:cTn id="68" fill="hold">
+                            <p:stCondLst>
+                              <p:cond delay="0"/>
+                            </p:stCondLst>
+                            <p:childTnLst>
+                              <p:par>
+                                <p:cTn id="69" presetID="42" presetClass="entr" presetSubtype="0" fill="hold" nodeType="clickEffect">
+                                  <p:stCondLst>
+                                    <p:cond delay="0"/>
+                                  </p:stCondLst>
+                                  <p:childTnLst>
+                                    <p:set>
+                                      <p:cBhvr>
+                                        <p:cTn id="70" dur="1" fill="hold">
+                                          <p:stCondLst>
+                                            <p:cond delay="0"/>
+                                          </p:stCondLst>
+                                        </p:cTn>
+                                        <p:tgtEl>
+                                          <p:spTgt spid="20"/>
+                                        </p:tgtEl>
+                                        <p:attrNameLst>
+                                          <p:attrName>style.visibility</p:attrName>
+                                        </p:attrNameLst>
+                                      </p:cBhvr>
+                                      <p:to>
+                                        <p:strVal val="visible"/>
+                                      </p:to>
+                                    </p:set>
+                                    <p:animEffect transition="in" filter="fade">
+                                      <p:cBhvr>
+                                        <p:cTn id="71" dur="1000"/>
+                                        <p:tgtEl>
+                                          <p:spTgt spid="20"/>
+                                        </p:tgtEl>
+                                      </p:cBhvr>
+                                    </p:animEffect>
+                                    <p:anim calcmode="lin" valueType="num">
+                                      <p:cBhvr>
+                                        <p:cTn id="72" dur="1000" fill="hold"/>
+                                        <p:tgtEl>
+                                          <p:spTgt spid="20"/>
+                                        </p:tgtEl>
+                                        <p:attrNameLst>
+                                          <p:attrName>ppt_x</p:attrName>
+                                        </p:attrNameLst>
+                                      </p:cBhvr>
+                                      <p:tavLst>
+                                        <p:tav tm="0">
+                                          <p:val>
+                                            <p:strVal val="#ppt_x"/>
+                                          </p:val>
+                                        </p:tav>
+                                        <p:tav tm="100000">
+                                          <p:val>
+                                            <p:strVal val="#ppt_x"/>
+                                          </p:val>
+                                        </p:tav>
+                                      </p:tavLst>
+                                    </p:anim>
+                                    <p:anim calcmode="lin" valueType="num">
+                                      <p:cBhvr>
+                                        <p:cTn id="73" dur="1000" fill="hold"/>
+                                        <p:tgtEl>
+                                          <p:spTgt spid="20"/>
+                                        </p:tgtEl>
+                                        <p:attrNameLst>
+                                          <p:attrName>ppt_y</p:attrName>
+                                        </p:attrNameLst>
+                                      </p:cBhvr>
+                                      <p:tavLst>
+                                        <p:tav tm="0">
+                                          <p:val>
+                                            <p:strVal val="#ppt_y+.1"/>
+                                          </p:val>
+                                        </p:tav>
+                                        <p:tav tm="100000">
+                                          <p:val>
+                                            <p:strVal val="#ppt_y"/>
+                                          </p:val>
+                                        </p:tav>
+                                      </p:tavLst>
+                                    </p:anim>
+                                  </p:childTnLst>
+                                </p:cTn>
+                              </p:par>
+                              <p:par>
+                                <p:cTn id="74" presetID="42" presetClass="entr" presetSubtype="0" fill="hold" grpId="0" nodeType="withEffect">
+                                  <p:stCondLst>
+                                    <p:cond delay="0"/>
+                                  </p:stCondLst>
+                                  <p:childTnLst>
+                                    <p:set>
+                                      <p:cBhvr>
+                                        <p:cTn id="75" dur="1" fill="hold">
+                                          <p:stCondLst>
+                                            <p:cond delay="0"/>
+                                          </p:stCondLst>
+                                        </p:cTn>
+                                        <p:tgtEl>
+                                          <p:spTgt spid="21"/>
+                                        </p:tgtEl>
+                                        <p:attrNameLst>
+                                          <p:attrName>style.visibility</p:attrName>
+                                        </p:attrNameLst>
+                                      </p:cBhvr>
+                                      <p:to>
+                                        <p:strVal val="visible"/>
+                                      </p:to>
+                                    </p:set>
+                                    <p:animEffect transition="in" filter="fade">
+                                      <p:cBhvr>
+                                        <p:cTn id="76" dur="1000"/>
+                                        <p:tgtEl>
+                                          <p:spTgt spid="21"/>
+                                        </p:tgtEl>
+                                      </p:cBhvr>
+                                    </p:animEffect>
+                                    <p:anim calcmode="lin" valueType="num">
+                                      <p:cBhvr>
+                                        <p:cTn id="77" dur="1000" fill="hold"/>
+                                        <p:tgtEl>
+                                          <p:spTgt spid="21"/>
+                                        </p:tgtEl>
+                                        <p:attrNameLst>
+                                          <p:attrName>ppt_x</p:attrName>
+                                        </p:attrNameLst>
+                                      </p:cBhvr>
+                                      <p:tavLst>
+                                        <p:tav tm="0">
+                                          <p:val>
+                                            <p:strVal val="#ppt_x"/>
+                                          </p:val>
+                                        </p:tav>
+                                        <p:tav tm="100000">
+                                          <p:val>
+                                            <p:strVal val="#ppt_x"/>
+                                          </p:val>
+                                        </p:tav>
+                                      </p:tavLst>
+                                    </p:anim>
+                                    <p:anim calcmode="lin" valueType="num">
+                                      <p:cBhvr>
+                                        <p:cTn id="78" dur="1000" fill="hold"/>
+                                        <p:tgtEl>
+                                          <p:spTgt spid="21"/>
+                                        </p:tgtEl>
+                                        <p:attrNameLst>
+                                          <p:attrName>ppt_y</p:attrName>
+                                        </p:attrNameLst>
+                                      </p:cBhvr>
+                                      <p:tavLst>
+                                        <p:tav tm="0">
+                                          <p:val>
+                                            <p:strVal val="#ppt_y+.1"/>
+                                          </p:val>
+                                        </p:tav>
+                                        <p:tav tm="100000">
+                                          <p:val>
+                                            <p:strVal val="#ppt_y"/>
+                                          </p:val>
+                                        </p:tav>
+                                      </p:tavLst>
+                                    </p:anim>
+                                  </p:childTnLst>
+                                </p:cTn>
+                              </p:par>
+                            </p:childTnLst>
+                          </p:cTn>
+                        </p:par>
+                      </p:childTnLst>
+                    </p:cTn>
+                  </p:par>
+                  <p:par>
+                    <p:cTn id="79" fill="hold">
+                      <p:stCondLst>
+                        <p:cond delay="indefinite"/>
+                      </p:stCondLst>
+                      <p:childTnLst>
+                        <p:par>
+                          <p:cTn id="80" fill="hold">
+                            <p:stCondLst>
+                              <p:cond delay="0"/>
+                            </p:stCondLst>
+                            <p:childTnLst>
+                              <p:par>
+                                <p:cTn id="81" presetID="42" presetClass="entr" presetSubtype="0" fill="hold" grpId="0" nodeType="clickEffect">
+                                  <p:stCondLst>
+                                    <p:cond delay="0"/>
+                                  </p:stCondLst>
+                                  <p:childTnLst>
+                                    <p:set>
+                                      <p:cBhvr>
+                                        <p:cTn id="82" dur="1" fill="hold">
+                                          <p:stCondLst>
+                                            <p:cond delay="0"/>
+                                          </p:stCondLst>
+                                        </p:cTn>
+                                        <p:tgtEl>
+                                          <p:spTgt spid="24"/>
+                                        </p:tgtEl>
+                                        <p:attrNameLst>
+                                          <p:attrName>style.visibility</p:attrName>
+                                        </p:attrNameLst>
+                                      </p:cBhvr>
+                                      <p:to>
+                                        <p:strVal val="visible"/>
+                                      </p:to>
+                                    </p:set>
+                                    <p:animEffect transition="in" filter="fade">
+                                      <p:cBhvr>
+                                        <p:cTn id="83" dur="1000"/>
+                                        <p:tgtEl>
+                                          <p:spTgt spid="24"/>
+                                        </p:tgtEl>
+                                      </p:cBhvr>
+                                    </p:animEffect>
+                                    <p:anim calcmode="lin" valueType="num">
+                                      <p:cBhvr>
+                                        <p:cTn id="84" dur="1000" fill="hold"/>
+                                        <p:tgtEl>
+                                          <p:spTgt spid="24"/>
+                                        </p:tgtEl>
+                                        <p:attrNameLst>
+                                          <p:attrName>ppt_x</p:attrName>
+                                        </p:attrNameLst>
+                                      </p:cBhvr>
+                                      <p:tavLst>
+                                        <p:tav tm="0">
+                                          <p:val>
+                                            <p:strVal val="#ppt_x"/>
+                                          </p:val>
+                                        </p:tav>
+                                        <p:tav tm="100000">
+                                          <p:val>
+                                            <p:strVal val="#ppt_x"/>
+                                          </p:val>
+                                        </p:tav>
+                                      </p:tavLst>
+                                    </p:anim>
+                                    <p:anim calcmode="lin" valueType="num">
+                                      <p:cBhvr>
+                                        <p:cTn id="85" dur="1000" fill="hold"/>
+                                        <p:tgtEl>
+                                          <p:spTgt spid="24"/>
+                                        </p:tgtEl>
+                                        <p:attrNameLst>
+                                          <p:attrName>ppt_y</p:attrName>
+                                        </p:attrNameLst>
+                                      </p:cBhvr>
+                                      <p:tavLst>
+                                        <p:tav tm="0">
+                                          <p:val>
+                                            <p:strVal val="#ppt_y+.1"/>
+                                          </p:val>
+                                        </p:tav>
+                                        <p:tav tm="100000">
+                                          <p:val>
+                                            <p:strVal val="#ppt_y"/>
+                                          </p:val>
+                                        </p:tav>
+                                      </p:tavLst>
+                                    </p:anim>
+                                  </p:childTnLst>
+                                </p:cTn>
+                              </p:par>
+                              <p:par>
+                                <p:cTn id="86" presetID="42" presetClass="entr" presetSubtype="0" fill="hold" nodeType="withEffect">
+                                  <p:stCondLst>
+                                    <p:cond delay="0"/>
+                                  </p:stCondLst>
+                                  <p:childTnLst>
+                                    <p:set>
+                                      <p:cBhvr>
+                                        <p:cTn id="87" dur="1" fill="hold">
+                                          <p:stCondLst>
+                                            <p:cond delay="0"/>
+                                          </p:stCondLst>
+                                        </p:cTn>
+                                        <p:tgtEl>
+                                          <p:spTgt spid="22"/>
+                                        </p:tgtEl>
+                                        <p:attrNameLst>
+                                          <p:attrName>style.visibility</p:attrName>
+                                        </p:attrNameLst>
+                                      </p:cBhvr>
+                                      <p:to>
+                                        <p:strVal val="visible"/>
+                                      </p:to>
+                                    </p:set>
+                                    <p:animEffect transition="in" filter="fade">
+                                      <p:cBhvr>
+                                        <p:cTn id="88" dur="1000"/>
+                                        <p:tgtEl>
+                                          <p:spTgt spid="22"/>
+                                        </p:tgtEl>
+                                      </p:cBhvr>
+                                    </p:animEffect>
+                                    <p:anim calcmode="lin" valueType="num">
+                                      <p:cBhvr>
+                                        <p:cTn id="89" dur="1000" fill="hold"/>
+                                        <p:tgtEl>
+                                          <p:spTgt spid="22"/>
+                                        </p:tgtEl>
+                                        <p:attrNameLst>
+                                          <p:attrName>ppt_x</p:attrName>
+                                        </p:attrNameLst>
+                                      </p:cBhvr>
+                                      <p:tavLst>
+                                        <p:tav tm="0">
+                                          <p:val>
+                                            <p:strVal val="#ppt_x"/>
+                                          </p:val>
+                                        </p:tav>
+                                        <p:tav tm="100000">
+                                          <p:val>
+                                            <p:strVal val="#ppt_x"/>
+                                          </p:val>
+                                        </p:tav>
+                                      </p:tavLst>
+                                    </p:anim>
+                                    <p:anim calcmode="lin" valueType="num">
+                                      <p:cBhvr>
+                                        <p:cTn id="90" dur="1000" fill="hold"/>
+                                        <p:tgtEl>
+                                          <p:spTgt spid="22"/>
+                                        </p:tgtEl>
+                                        <p:attrNameLst>
+                                          <p:attrName>ppt_y</p:attrName>
+                                        </p:attrNameLst>
+                                      </p:cBhvr>
+                                      <p:tavLst>
+                                        <p:tav tm="0">
+                                          <p:val>
+                                            <p:strVal val="#ppt_y+.1"/>
+                                          </p:val>
+                                        </p:tav>
+                                        <p:tav tm="100000">
+                                          <p:val>
+                                            <p:strVal val="#ppt_y"/>
+                                          </p:val>
+                                        </p:tav>
+                                      </p:tavLst>
+                                    </p:anim>
+                                  </p:childTnLst>
+                                </p:cTn>
+                              </p:par>
+                            </p:childTnLst>
+                          </p:cTn>
+                        </p:par>
+                      </p:childTnLst>
+                    </p:cTn>
+                  </p:par>
+                  <p:par>
+                    <p:cTn id="91" fill="hold">
+                      <p:stCondLst>
+                        <p:cond delay="indefinite"/>
+                      </p:stCondLst>
+                      <p:childTnLst>
+                        <p:par>
+                          <p:cTn id="92" fill="hold">
+                            <p:stCondLst>
+                              <p:cond delay="0"/>
+                            </p:stCondLst>
+                            <p:childTnLst>
+                              <p:par>
+                                <p:cTn id="93" presetID="42" presetClass="entr" presetSubtype="0" fill="hold" grpId="0" nodeType="clickEffect">
+                                  <p:stCondLst>
+                                    <p:cond delay="0"/>
+                                  </p:stCondLst>
+                                  <p:childTnLst>
+                                    <p:set>
+                                      <p:cBhvr>
+                                        <p:cTn id="94" dur="1" fill="hold">
+                                          <p:stCondLst>
+                                            <p:cond delay="0"/>
+                                          </p:stCondLst>
+                                        </p:cTn>
+                                        <p:tgtEl>
+                                          <p:spTgt spid="25"/>
+                                        </p:tgtEl>
+                                        <p:attrNameLst>
+                                          <p:attrName>style.visibility</p:attrName>
+                                        </p:attrNameLst>
+                                      </p:cBhvr>
+                                      <p:to>
+                                        <p:strVal val="visible"/>
+                                      </p:to>
+                                    </p:set>
+                                    <p:animEffect transition="in" filter="fade">
+                                      <p:cBhvr>
+                                        <p:cTn id="95" dur="1000"/>
+                                        <p:tgtEl>
+                                          <p:spTgt spid="25"/>
+                                        </p:tgtEl>
+                                      </p:cBhvr>
+                                    </p:animEffect>
+                                    <p:anim calcmode="lin" valueType="num">
+                                      <p:cBhvr>
+                                        <p:cTn id="96" dur="1000" fill="hold"/>
+                                        <p:tgtEl>
+                                          <p:spTgt spid="25"/>
+                                        </p:tgtEl>
+                                        <p:attrNameLst>
+                                          <p:attrName>ppt_x</p:attrName>
+                                        </p:attrNameLst>
+                                      </p:cBhvr>
+                                      <p:tavLst>
+                                        <p:tav tm="0">
+                                          <p:val>
+                                            <p:strVal val="#ppt_x"/>
+                                          </p:val>
+                                        </p:tav>
+                                        <p:tav tm="100000">
+                                          <p:val>
+                                            <p:strVal val="#ppt_x"/>
+                                          </p:val>
+                                        </p:tav>
+                                      </p:tavLst>
+                                    </p:anim>
+                                    <p:anim calcmode="lin" valueType="num">
+                                      <p:cBhvr>
+                                        <p:cTn id="97" dur="1000" fill="hold"/>
+                                        <p:tgtEl>
+                                          <p:spTgt spid="25"/>
+                                        </p:tgtEl>
+                                        <p:attrNameLst>
+                                          <p:attrName>ppt_y</p:attrName>
+                                        </p:attrNameLst>
+                                      </p:cBhvr>
+                                      <p:tavLst>
+                                        <p:tav tm="0">
+                                          <p:val>
+                                            <p:strVal val="#ppt_y+.1"/>
+                                          </p:val>
+                                        </p:tav>
+                                        <p:tav tm="100000">
+                                          <p:val>
+                                            <p:strVal val="#ppt_y"/>
+                                          </p:val>
+                                        </p:tav>
+                                      </p:tavLst>
+                                    </p:anim>
+                                  </p:childTnLst>
+                                </p:cTn>
+                              </p:par>
+                            </p:childTnLst>
+                          </p:cTn>
+                        </p:par>
+                      </p:childTnLst>
+                    </p:cTn>
+                  </p:par>
+                </p:childTnLst>
+              </p:cTn>
+              <p:prevCondLst>
+                <p:cond evt="onPrev" delay="0">
+                  <p:tgtEl>
+                    <p:sldTgt/>
+                  </p:tgtEl>
+                </p:cond>
+              </p:prevCondLst>
+              <p:nextCondLst>
+                <p:cond evt="onNext" delay="0">
+                  <p:tgtEl>
+                    <p:sldTgt/>
+                  </p:tgtEl>
+                </p:cond>
+              </p:nextCondLst>
+            </p:seq>
+          </p:childTnLst>
+        </p:cTn>
+      </p:par>
+    </p:tnLst>
+    <p:bldLst>
+      <p:bldP spid="3" grpId="0"/>
+      <p:bldP spid="11" grpId="0" animBg="1"/>
+      <p:bldP spid="14" grpId="0"/>
+      <p:bldP spid="17" grpId="0"/>
+      <p:bldP spid="18" grpId="0" animBg="1"/>
+      <p:bldP spid="19" grpId="0" animBg="1"/>
+      <p:bldP spid="21" grpId="0"/>
+      <p:bldP spid="24" grpId="0"/>
+      <p:bldP spid="25" grpId="0"/>
+    </p:bldLst>
+  </p:timing>
+</p:sld>
+</file>
+
+<file path=ppt/slides/slide7.xml><?xml version="1.0" encoding="utf-8"?>
 <p:sld xmlns:a="http://schemas.openxmlformats.org/drawingml/2006/main" xmlns:r="http://schemas.openxmlformats.org/officeDocument/2006/relationships" xmlns:p="http://schemas.openxmlformats.org/presentationml/2006/main">
   <p:cSld>
     <p:spTree>
@@ -21095,7 +24242,7 @@
 </p:sld>
 </file>
 
-<file path=ppt/slides/slide7.xml><?xml version="1.0" encoding="utf-8"?>
+<file path=ppt/slides/slide8.xml><?xml version="1.0" encoding="utf-8"?>
 <p:sld xmlns:a="http://schemas.openxmlformats.org/drawingml/2006/main" xmlns:r="http://schemas.openxmlformats.org/officeDocument/2006/relationships" xmlns:p="http://schemas.openxmlformats.org/presentationml/2006/main">
   <p:cSld>
     <p:spTree>
@@ -21223,7 +24370,7 @@
 </p:sld>
 </file>
 
-<file path=ppt/slides/slide8.xml><?xml version="1.0" encoding="utf-8"?>
+<file path=ppt/slides/slide9.xml><?xml version="1.0" encoding="utf-8"?>
 <p:sld xmlns:a="http://schemas.openxmlformats.org/drawingml/2006/main" xmlns:r="http://schemas.openxmlformats.org/officeDocument/2006/relationships" xmlns:p="http://schemas.openxmlformats.org/presentationml/2006/main">
   <p:cSld>
     <p:spTree>
@@ -21368,869 +24515,6 @@
     <p:extLst>
       <p:ext uri="{BB962C8B-B14F-4D97-AF65-F5344CB8AC3E}">
         <p14:creationId xmlns:p14="http://schemas.microsoft.com/office/powerpoint/2010/main" val="4166902055"/>
-      </p:ext>
-    </p:extLst>
-  </p:cSld>
-  <p:clrMapOvr>
-    <a:masterClrMapping/>
-  </p:clrMapOvr>
-</p:sld>
-</file>
-
-<file path=ppt/slides/slide9.xml><?xml version="1.0" encoding="utf-8"?>
-<p:sld xmlns:a="http://schemas.openxmlformats.org/drawingml/2006/main" xmlns:r="http://schemas.openxmlformats.org/officeDocument/2006/relationships" xmlns:p="http://schemas.openxmlformats.org/presentationml/2006/main">
-  <p:cSld>
-    <p:spTree>
-      <p:nvGrpSpPr>
-        <p:cNvPr id="1" name=""/>
-        <p:cNvGrpSpPr/>
-        <p:nvPr/>
-      </p:nvGrpSpPr>
-      <p:grpSpPr>
-        <a:xfrm>
-          <a:off x="0" y="0"/>
-          <a:ext cx="0" cy="0"/>
-          <a:chOff x="0" y="0"/>
-          <a:chExt cx="0" cy="0"/>
-        </a:xfrm>
-      </p:grpSpPr>
-      <p:sp>
-        <p:nvSpPr>
-          <p:cNvPr id="2" name="Title 1"/>
-          <p:cNvSpPr>
-            <a:spLocks noGrp="1"/>
-          </p:cNvSpPr>
-          <p:nvPr>
-            <p:ph type="title"/>
-          </p:nvPr>
-        </p:nvSpPr>
-        <p:spPr>
-          <a:xfrm>
-            <a:off x="683728" y="386097"/>
-            <a:ext cx="10515600" cy="1325563"/>
-          </a:xfrm>
-        </p:spPr>
-        <p:txBody>
-          <a:bodyPr/>
-          <a:lstStyle/>
-          <a:p>
-            <a:r>
-              <a:rPr lang="en-US" dirty="0"/>
-              <a:t>Principais Elementos</a:t>
-            </a:r>
-          </a:p>
-        </p:txBody>
-      </p:sp>
-      <p:sp>
-        <p:nvSpPr>
-          <p:cNvPr id="7" name="Rectangle 6"/>
-          <p:cNvSpPr/>
-          <p:nvPr/>
-        </p:nvSpPr>
-        <p:spPr bwMode="auto">
-          <a:xfrm>
-            <a:off x="3426928" y="1853174"/>
-            <a:ext cx="2636991" cy="790489"/>
-          </a:xfrm>
-          <a:prstGeom prst="rect">
-            <a:avLst/>
-          </a:prstGeom>
-          <a:solidFill>
-            <a:srgbClr val="F2C811"/>
-          </a:solidFill>
-          <a:ln>
-            <a:noFill/>
-            <a:headEnd type="none" w="med" len="med"/>
-            <a:tailEnd type="none" w="med" len="med"/>
-          </a:ln>
-          <a:effectLst/>
-        </p:spPr>
-        <p:style>
-          <a:lnRef idx="1">
-            <a:schemeClr val="accent2"/>
-          </a:lnRef>
-          <a:fillRef idx="3">
-            <a:schemeClr val="accent2"/>
-          </a:fillRef>
-          <a:effectRef idx="2">
-            <a:schemeClr val="accent2"/>
-          </a:effectRef>
-          <a:fontRef idx="minor">
-            <a:schemeClr val="lt1"/>
-          </a:fontRef>
-        </p:style>
-        <p:txBody>
-          <a:bodyPr vert="horz" wrap="square" lIns="91436" tIns="45718" rIns="91436" bIns="45718" numCol="1" rtlCol="0" anchor="ctr" anchorCtr="0" compatLnSpc="1">
-            <a:prstTxWarp prst="textNoShape">
-              <a:avLst/>
-            </a:prstTxWarp>
-          </a:bodyPr>
-          <a:lstStyle/>
-          <a:p>
-            <a:pPr algn="ctr" defTabSz="914099" fontAlgn="base">
-              <a:spcBef>
-                <a:spcPct val="0"/>
-              </a:spcBef>
-              <a:spcAft>
-                <a:spcPct val="0"/>
-              </a:spcAft>
-            </a:pPr>
-            <a:r>
-              <a:rPr lang="en-US" sz="2800" dirty="0">
-                <a:solidFill>
-                  <a:schemeClr val="tx1"/>
-                </a:solidFill>
-              </a:rPr>
-              <a:t>Desktop</a:t>
-            </a:r>
-          </a:p>
-        </p:txBody>
-      </p:sp>
-      <p:sp>
-        <p:nvSpPr>
-          <p:cNvPr id="8" name="Rectangle 7"/>
-          <p:cNvSpPr/>
-          <p:nvPr/>
-        </p:nvSpPr>
-        <p:spPr bwMode="auto">
-          <a:xfrm>
-            <a:off x="6170128" y="1853174"/>
-            <a:ext cx="2648217" cy="790489"/>
-          </a:xfrm>
-          <a:prstGeom prst="rect">
-            <a:avLst/>
-          </a:prstGeom>
-          <a:solidFill>
-            <a:srgbClr val="F2C811"/>
-          </a:solidFill>
-          <a:ln>
-            <a:noFill/>
-            <a:headEnd type="none" w="med" len="med"/>
-            <a:tailEnd type="none" w="med" len="med"/>
-          </a:ln>
-          <a:effectLst/>
-        </p:spPr>
-        <p:style>
-          <a:lnRef idx="1">
-            <a:schemeClr val="accent2"/>
-          </a:lnRef>
-          <a:fillRef idx="3">
-            <a:schemeClr val="accent2"/>
-          </a:fillRef>
-          <a:effectRef idx="2">
-            <a:schemeClr val="accent2"/>
-          </a:effectRef>
-          <a:fontRef idx="minor">
-            <a:schemeClr val="lt1"/>
-          </a:fontRef>
-        </p:style>
-        <p:txBody>
-          <a:bodyPr vert="horz" wrap="square" lIns="91436" tIns="45718" rIns="91436" bIns="45718" numCol="1" rtlCol="0" anchor="ctr" anchorCtr="0" compatLnSpc="1">
-            <a:prstTxWarp prst="textNoShape">
-              <a:avLst/>
-            </a:prstTxWarp>
-          </a:bodyPr>
-          <a:lstStyle/>
-          <a:p>
-            <a:pPr algn="ctr" defTabSz="914099" fontAlgn="base">
-              <a:spcBef>
-                <a:spcPct val="0"/>
-              </a:spcBef>
-              <a:spcAft>
-                <a:spcPct val="0"/>
-              </a:spcAft>
-            </a:pPr>
-            <a:r>
-              <a:rPr lang="en-US" sz="2800" dirty="0">
-                <a:solidFill>
-                  <a:schemeClr val="tx1"/>
-                </a:solidFill>
-              </a:rPr>
-              <a:t>Mobile</a:t>
-            </a:r>
-          </a:p>
-        </p:txBody>
-      </p:sp>
-      <p:sp>
-        <p:nvSpPr>
-          <p:cNvPr id="9" name="Rectangle 8"/>
-          <p:cNvSpPr/>
-          <p:nvPr/>
-        </p:nvSpPr>
-        <p:spPr bwMode="auto">
-          <a:xfrm>
-            <a:off x="683728" y="1864096"/>
-            <a:ext cx="2636991" cy="790489"/>
-          </a:xfrm>
-          <a:prstGeom prst="rect">
-            <a:avLst/>
-          </a:prstGeom>
-          <a:solidFill>
-            <a:srgbClr val="F2C811"/>
-          </a:solidFill>
-          <a:ln>
-            <a:noFill/>
-            <a:headEnd type="none" w="med" len="med"/>
-            <a:tailEnd type="none" w="med" len="med"/>
-          </a:ln>
-          <a:effectLst/>
-        </p:spPr>
-        <p:style>
-          <a:lnRef idx="1">
-            <a:schemeClr val="accent2"/>
-          </a:lnRef>
-          <a:fillRef idx="3">
-            <a:schemeClr val="accent2"/>
-          </a:fillRef>
-          <a:effectRef idx="2">
-            <a:schemeClr val="accent2"/>
-          </a:effectRef>
-          <a:fontRef idx="minor">
-            <a:schemeClr val="lt1"/>
-          </a:fontRef>
-        </p:style>
-        <p:txBody>
-          <a:bodyPr vert="horz" wrap="square" lIns="91436" tIns="45718" rIns="91436" bIns="45718" numCol="1" rtlCol="0" anchor="ctr" anchorCtr="0" compatLnSpc="1">
-            <a:prstTxWarp prst="textNoShape">
-              <a:avLst/>
-            </a:prstTxWarp>
-          </a:bodyPr>
-          <a:lstStyle/>
-          <a:p>
-            <a:pPr algn="ctr" defTabSz="914099" fontAlgn="base">
-              <a:spcBef>
-                <a:spcPct val="0"/>
-              </a:spcBef>
-              <a:spcAft>
-                <a:spcPct val="0"/>
-              </a:spcAft>
-            </a:pPr>
-            <a:r>
-              <a:rPr lang="en-US" sz="2800" dirty="0">
-                <a:solidFill>
-                  <a:schemeClr val="tx1"/>
-                </a:solidFill>
-              </a:rPr>
-              <a:t>Services</a:t>
-            </a:r>
-          </a:p>
-        </p:txBody>
-      </p:sp>
-      <p:cxnSp>
-        <p:nvCxnSpPr>
-          <p:cNvPr id="10" name="Straight Connector 9"/>
-          <p:cNvCxnSpPr/>
-          <p:nvPr/>
-        </p:nvCxnSpPr>
-        <p:spPr>
-          <a:xfrm flipH="1">
-            <a:off x="3360170" y="1864096"/>
-            <a:ext cx="4673" cy="4343400"/>
-          </a:xfrm>
-          <a:prstGeom prst="line">
-            <a:avLst/>
-          </a:prstGeom>
-          <a:ln>
-            <a:solidFill>
-              <a:srgbClr val="212121"/>
-            </a:solidFill>
-          </a:ln>
-        </p:spPr>
-        <p:style>
-          <a:lnRef idx="1">
-            <a:schemeClr val="accent1"/>
-          </a:lnRef>
-          <a:fillRef idx="0">
-            <a:schemeClr val="accent1"/>
-          </a:fillRef>
-          <a:effectRef idx="0">
-            <a:schemeClr val="accent1"/>
-          </a:effectRef>
-          <a:fontRef idx="minor">
-            <a:schemeClr val="tx1"/>
-          </a:fontRef>
-        </p:style>
-      </p:cxnSp>
-      <p:cxnSp>
-        <p:nvCxnSpPr>
-          <p:cNvPr id="11" name="Straight Connector 10"/>
-          <p:cNvCxnSpPr/>
-          <p:nvPr/>
-        </p:nvCxnSpPr>
-        <p:spPr>
-          <a:xfrm flipH="1">
-            <a:off x="8860904" y="1864096"/>
-            <a:ext cx="4673" cy="4343400"/>
-          </a:xfrm>
-          <a:prstGeom prst="line">
-            <a:avLst/>
-          </a:prstGeom>
-          <a:ln>
-            <a:solidFill>
-              <a:srgbClr val="212121"/>
-            </a:solidFill>
-          </a:ln>
-        </p:spPr>
-        <p:style>
-          <a:lnRef idx="1">
-            <a:schemeClr val="accent1"/>
-          </a:lnRef>
-          <a:fillRef idx="0">
-            <a:schemeClr val="accent1"/>
-          </a:fillRef>
-          <a:effectRef idx="0">
-            <a:schemeClr val="accent1"/>
-          </a:effectRef>
-          <a:fontRef idx="minor">
-            <a:schemeClr val="tx1"/>
-          </a:fontRef>
-        </p:style>
-      </p:cxnSp>
-      <p:sp>
-        <p:nvSpPr>
-          <p:cNvPr id="13" name="Rectangle 12"/>
-          <p:cNvSpPr/>
-          <p:nvPr/>
-        </p:nvSpPr>
-        <p:spPr bwMode="auto">
-          <a:xfrm>
-            <a:off x="8924554" y="1853174"/>
-            <a:ext cx="2648217" cy="790489"/>
-          </a:xfrm>
-          <a:prstGeom prst="rect">
-            <a:avLst/>
-          </a:prstGeom>
-          <a:solidFill>
-            <a:srgbClr val="F2C811"/>
-          </a:solidFill>
-          <a:ln>
-            <a:noFill/>
-            <a:headEnd type="none" w="med" len="med"/>
-            <a:tailEnd type="none" w="med" len="med"/>
-          </a:ln>
-          <a:effectLst/>
-        </p:spPr>
-        <p:style>
-          <a:lnRef idx="1">
-            <a:schemeClr val="accent2"/>
-          </a:lnRef>
-          <a:fillRef idx="3">
-            <a:schemeClr val="accent2"/>
-          </a:fillRef>
-          <a:effectRef idx="2">
-            <a:schemeClr val="accent2"/>
-          </a:effectRef>
-          <a:fontRef idx="minor">
-            <a:schemeClr val="lt1"/>
-          </a:fontRef>
-        </p:style>
-        <p:txBody>
-          <a:bodyPr vert="horz" wrap="square" lIns="91436" tIns="45718" rIns="91436" bIns="45718" numCol="1" rtlCol="0" anchor="ctr" anchorCtr="0" compatLnSpc="1">
-            <a:prstTxWarp prst="textNoShape">
-              <a:avLst/>
-            </a:prstTxWarp>
-          </a:bodyPr>
-          <a:lstStyle/>
-          <a:p>
-            <a:pPr algn="ctr" defTabSz="914099" fontAlgn="base">
-              <a:spcBef>
-                <a:spcPct val="0"/>
-              </a:spcBef>
-              <a:spcAft>
-                <a:spcPct val="0"/>
-              </a:spcAft>
-            </a:pPr>
-            <a:r>
-              <a:rPr lang="en-US" sz="2800" dirty="0">
-                <a:solidFill>
-                  <a:schemeClr val="tx1"/>
-                </a:solidFill>
-              </a:rPr>
-              <a:t>Embedded</a:t>
-            </a:r>
-          </a:p>
-        </p:txBody>
-      </p:sp>
-      <p:sp>
-        <p:nvSpPr>
-          <p:cNvPr id="14" name="Rectangle 13"/>
-          <p:cNvSpPr/>
-          <p:nvPr/>
-        </p:nvSpPr>
-        <p:spPr>
-          <a:xfrm>
-            <a:off x="699933" y="2807021"/>
-            <a:ext cx="2582958" cy="3367076"/>
-          </a:xfrm>
-          <a:prstGeom prst="rect">
-            <a:avLst/>
-          </a:prstGeom>
-        </p:spPr>
-        <p:txBody>
-          <a:bodyPr wrap="square" anchor="t" anchorCtr="0">
-            <a:spAutoFit/>
-          </a:bodyPr>
-          <a:lstStyle/>
-          <a:p>
-            <a:pPr marL="231775" indent="-231775">
-              <a:lnSpc>
-                <a:spcPct val="95000"/>
-              </a:lnSpc>
-              <a:buSzPct val="90000"/>
-              <a:buFont typeface="Arial" panose="020B0604020202020204" pitchFamily="34" charset="0"/>
-              <a:buChar char="•"/>
-            </a:pPr>
-            <a:r>
-              <a:rPr lang="en-US" sz="2800" spc="-200" dirty="0">
-                <a:latin typeface="Segoe UI" panose="020B0502040204020203" pitchFamily="34" charset="0"/>
-                <a:cs typeface="Segoe UI" panose="020B0502040204020203" pitchFamily="34" charset="0"/>
-              </a:rPr>
-              <a:t>Web-based</a:t>
-            </a:r>
-          </a:p>
-          <a:p>
-            <a:pPr marL="231775" indent="-231775">
-              <a:lnSpc>
-                <a:spcPct val="95000"/>
-              </a:lnSpc>
-              <a:buSzPct val="90000"/>
-              <a:buFont typeface="Arial" panose="020B0604020202020204" pitchFamily="34" charset="0"/>
-              <a:buChar char="•"/>
-            </a:pPr>
-            <a:r>
-              <a:rPr lang="en-US" sz="2800" spc="-200" dirty="0">
-                <a:latin typeface="Segoe UI" panose="020B0502040204020203" pitchFamily="34" charset="0"/>
-                <a:cs typeface="Segoe UI" panose="020B0502040204020203" pitchFamily="34" charset="0"/>
-              </a:rPr>
-              <a:t>All platforms</a:t>
-            </a:r>
-          </a:p>
-          <a:p>
-            <a:pPr marL="231775" indent="-231775">
-              <a:lnSpc>
-                <a:spcPct val="95000"/>
-              </a:lnSpc>
-              <a:buSzPct val="90000"/>
-              <a:buFont typeface="Arial" panose="020B0604020202020204" pitchFamily="34" charset="0"/>
-              <a:buChar char="•"/>
-            </a:pPr>
-            <a:r>
-              <a:rPr lang="en-US" sz="2800" spc="-200" dirty="0">
-                <a:latin typeface="Segoe UI" panose="020B0502040204020203" pitchFamily="34" charset="0"/>
-                <a:cs typeface="Segoe UI" panose="020B0502040204020203" pitchFamily="34" charset="0"/>
-              </a:rPr>
-              <a:t>Limited design tools</a:t>
-            </a:r>
-          </a:p>
-          <a:p>
-            <a:pPr marL="231775" indent="-231775">
-              <a:lnSpc>
-                <a:spcPct val="95000"/>
-              </a:lnSpc>
-              <a:buSzPct val="90000"/>
-              <a:buFont typeface="Arial" panose="020B0604020202020204" pitchFamily="34" charset="0"/>
-              <a:buChar char="•"/>
-            </a:pPr>
-            <a:r>
-              <a:rPr lang="en-US" sz="2800" spc="-200" dirty="0">
-                <a:latin typeface="Segoe UI" panose="020B0502040204020203" pitchFamily="34" charset="0"/>
-                <a:cs typeface="Segoe UI" panose="020B0502040204020203" pitchFamily="34" charset="0"/>
-              </a:rPr>
-              <a:t>Limited data sources</a:t>
-            </a:r>
-          </a:p>
-          <a:p>
-            <a:pPr marL="231775" indent="-231775">
-              <a:lnSpc>
-                <a:spcPct val="95000"/>
-              </a:lnSpc>
-              <a:buSzPct val="90000"/>
-              <a:buFont typeface="Arial" panose="020B0604020202020204" pitchFamily="34" charset="0"/>
-              <a:buChar char="•"/>
-            </a:pPr>
-            <a:r>
-              <a:rPr lang="en-US" sz="2800" spc="-200" dirty="0">
-                <a:latin typeface="Segoe UI" panose="020B0502040204020203" pitchFamily="34" charset="0"/>
-                <a:cs typeface="Segoe UI" panose="020B0502040204020203" pitchFamily="34" charset="0"/>
-              </a:rPr>
-              <a:t>Dashboards</a:t>
-            </a:r>
-          </a:p>
-          <a:p>
-            <a:pPr marL="231775" indent="-231775">
-              <a:lnSpc>
-                <a:spcPct val="95000"/>
-              </a:lnSpc>
-              <a:buSzPct val="90000"/>
-              <a:buFont typeface="Arial" panose="020B0604020202020204" pitchFamily="34" charset="0"/>
-              <a:buChar char="•"/>
-            </a:pPr>
-            <a:r>
-              <a:rPr lang="en-US" sz="2800" spc="-200" dirty="0">
-                <a:latin typeface="Segoe UI" panose="020B0502040204020203" pitchFamily="34" charset="0"/>
-                <a:cs typeface="Segoe UI" panose="020B0502040204020203" pitchFamily="34" charset="0"/>
-              </a:rPr>
-              <a:t>Publishing</a:t>
-            </a:r>
-            <a:endParaRPr lang="en-US" sz="2400" spc="-200" dirty="0">
-              <a:solidFill>
-                <a:srgbClr val="235888"/>
-              </a:solidFill>
-              <a:latin typeface="Segoe UI Light" panose="020B0502040204020203" pitchFamily="34" charset="0"/>
-              <a:cs typeface="Segoe UI Light" panose="020B0502040204020203" pitchFamily="34" charset="0"/>
-            </a:endParaRPr>
-          </a:p>
-        </p:txBody>
-      </p:sp>
-      <p:cxnSp>
-        <p:nvCxnSpPr>
-          <p:cNvPr id="15" name="Straight Connector 14"/>
-          <p:cNvCxnSpPr/>
-          <p:nvPr/>
-        </p:nvCxnSpPr>
-        <p:spPr>
-          <a:xfrm flipH="1">
-            <a:off x="6114042" y="1864096"/>
-            <a:ext cx="4673" cy="4343400"/>
-          </a:xfrm>
-          <a:prstGeom prst="line">
-            <a:avLst/>
-          </a:prstGeom>
-          <a:ln>
-            <a:solidFill>
-              <a:srgbClr val="212121"/>
-            </a:solidFill>
-          </a:ln>
-        </p:spPr>
-        <p:style>
-          <a:lnRef idx="1">
-            <a:schemeClr val="accent1"/>
-          </a:lnRef>
-          <a:fillRef idx="0">
-            <a:schemeClr val="accent1"/>
-          </a:fillRef>
-          <a:effectRef idx="0">
-            <a:schemeClr val="accent1"/>
-          </a:effectRef>
-          <a:fontRef idx="minor">
-            <a:schemeClr val="tx1"/>
-          </a:fontRef>
-        </p:style>
-      </p:cxnSp>
-      <p:sp>
-        <p:nvSpPr>
-          <p:cNvPr id="16" name="Rectangle 15"/>
-          <p:cNvSpPr/>
-          <p:nvPr/>
-        </p:nvSpPr>
-        <p:spPr>
-          <a:xfrm>
-            <a:off x="3442122" y="2807021"/>
-            <a:ext cx="2582958" cy="3016210"/>
-          </a:xfrm>
-          <a:prstGeom prst="rect">
-            <a:avLst/>
-          </a:prstGeom>
-        </p:spPr>
-        <p:txBody>
-          <a:bodyPr wrap="square" anchor="t" anchorCtr="0">
-            <a:spAutoFit/>
-          </a:bodyPr>
-          <a:lstStyle/>
-          <a:p>
-            <a:pPr marL="231775" indent="-231775">
-              <a:lnSpc>
-                <a:spcPct val="95000"/>
-              </a:lnSpc>
-              <a:buSzPct val="90000"/>
-              <a:buFont typeface="Arial" panose="020B0604020202020204" pitchFamily="34" charset="0"/>
-              <a:buChar char="•"/>
-            </a:pPr>
-            <a:r>
-              <a:rPr lang="en-US" sz="2800" spc="-200" dirty="0">
-                <a:latin typeface="Segoe UI" panose="020B0502040204020203" pitchFamily="34" charset="0"/>
-                <a:cs typeface="Segoe UI" panose="020B0502040204020203" pitchFamily="34" charset="0"/>
-              </a:rPr>
-              <a:t>Windows only</a:t>
-            </a:r>
-          </a:p>
-          <a:p>
-            <a:pPr marL="231775" indent="-231775">
-              <a:lnSpc>
-                <a:spcPct val="95000"/>
-              </a:lnSpc>
-              <a:buSzPct val="90000"/>
-              <a:buFont typeface="Arial" panose="020B0604020202020204" pitchFamily="34" charset="0"/>
-              <a:buChar char="•"/>
-            </a:pPr>
-            <a:r>
-              <a:rPr lang="en-US" sz="2800" spc="-200" dirty="0">
-                <a:latin typeface="Segoe UI" panose="020B0502040204020203" pitchFamily="34" charset="0"/>
-                <a:cs typeface="Segoe UI" panose="020B0502040204020203" pitchFamily="34" charset="0"/>
-              </a:rPr>
-              <a:t>Robust design tools</a:t>
-            </a:r>
-          </a:p>
-          <a:p>
-            <a:pPr marL="231775" indent="-231775">
-              <a:lnSpc>
-                <a:spcPct val="95000"/>
-              </a:lnSpc>
-              <a:buSzPct val="90000"/>
-              <a:buFont typeface="Arial" panose="020B0604020202020204" pitchFamily="34" charset="0"/>
-              <a:buChar char="•"/>
-            </a:pPr>
-            <a:r>
-              <a:rPr lang="en-US" sz="2800" spc="-200" dirty="0">
-                <a:latin typeface="Segoe UI" panose="020B0502040204020203" pitchFamily="34" charset="0"/>
-                <a:cs typeface="Segoe UI" panose="020B0502040204020203" pitchFamily="34" charset="0"/>
-              </a:rPr>
-              <a:t>Query and modeling tools</a:t>
-            </a:r>
-            <a:r>
-              <a:rPr lang="en-US" sz="3200" spc="-200" dirty="0">
-                <a:latin typeface="Segoe UI" panose="020B0502040204020203" pitchFamily="34" charset="0"/>
-                <a:cs typeface="Segoe UI" panose="020B0502040204020203" pitchFamily="34" charset="0"/>
-              </a:rPr>
-              <a:t> </a:t>
-            </a:r>
-          </a:p>
-          <a:p>
-            <a:pPr>
-              <a:lnSpc>
-                <a:spcPct val="95000"/>
-              </a:lnSpc>
-              <a:buSzPct val="90000"/>
-            </a:pPr>
-            <a:endParaRPr lang="en-US" sz="3200" spc="-200" dirty="0">
-              <a:solidFill>
-                <a:srgbClr val="235888"/>
-              </a:solidFill>
-              <a:latin typeface="Segoe UI Light" panose="020B0502040204020203" pitchFamily="34" charset="0"/>
-              <a:cs typeface="Segoe UI Light" panose="020B0502040204020203" pitchFamily="34" charset="0"/>
-            </a:endParaRPr>
-          </a:p>
-          <a:p>
-            <a:pPr>
-              <a:lnSpc>
-                <a:spcPct val="95000"/>
-              </a:lnSpc>
-              <a:buSzPct val="90000"/>
-            </a:pPr>
-            <a:endParaRPr lang="en-US" sz="2400" spc="-200" dirty="0">
-              <a:solidFill>
-                <a:srgbClr val="235888"/>
-              </a:solidFill>
-              <a:latin typeface="Segoe UI Light" panose="020B0502040204020203" pitchFamily="34" charset="0"/>
-              <a:cs typeface="Segoe UI Light" panose="020B0502040204020203" pitchFamily="34" charset="0"/>
-            </a:endParaRPr>
-          </a:p>
-        </p:txBody>
-      </p:sp>
-      <p:sp>
-        <p:nvSpPr>
-          <p:cNvPr id="17" name="Rectangle 16"/>
-          <p:cNvSpPr/>
-          <p:nvPr/>
-        </p:nvSpPr>
-        <p:spPr>
-          <a:xfrm>
-            <a:off x="6257802" y="2817071"/>
-            <a:ext cx="2509468" cy="1261884"/>
-          </a:xfrm>
-          <a:prstGeom prst="rect">
-            <a:avLst/>
-          </a:prstGeom>
-        </p:spPr>
-        <p:txBody>
-          <a:bodyPr wrap="square" anchor="t" anchorCtr="0">
-            <a:spAutoFit/>
-          </a:bodyPr>
-          <a:lstStyle/>
-          <a:p>
-            <a:pPr marL="231775" indent="-231775">
-              <a:lnSpc>
-                <a:spcPct val="95000"/>
-              </a:lnSpc>
-              <a:buSzPct val="90000"/>
-              <a:buFont typeface="Arial" panose="020B0604020202020204" pitchFamily="34" charset="0"/>
-              <a:buChar char="•"/>
-            </a:pPr>
-            <a:r>
-              <a:rPr lang="en-US" sz="2800" spc="-200" dirty="0">
-                <a:latin typeface="Segoe UI" panose="020B0502040204020203" pitchFamily="34" charset="0"/>
-                <a:cs typeface="Segoe UI" panose="020B0502040204020203" pitchFamily="34" charset="0"/>
-              </a:rPr>
-              <a:t>Cross-platform</a:t>
-            </a:r>
-          </a:p>
-          <a:p>
-            <a:pPr marL="231775" indent="-231775">
-              <a:lnSpc>
-                <a:spcPct val="95000"/>
-              </a:lnSpc>
-              <a:buSzPct val="90000"/>
-              <a:buFont typeface="Arial" panose="020B0604020202020204" pitchFamily="34" charset="0"/>
-              <a:buChar char="•"/>
-            </a:pPr>
-            <a:r>
-              <a:rPr lang="en-US" sz="2800" spc="-200" dirty="0">
-                <a:latin typeface="Segoe UI" panose="020B0502040204020203" pitchFamily="34" charset="0"/>
-                <a:cs typeface="Segoe UI" panose="020B0502040204020203" pitchFamily="34" charset="0"/>
-              </a:rPr>
-              <a:t>Report viewers</a:t>
-            </a:r>
-          </a:p>
-          <a:p>
-            <a:pPr>
-              <a:lnSpc>
-                <a:spcPct val="95000"/>
-              </a:lnSpc>
-              <a:buSzPct val="90000"/>
-            </a:pPr>
-            <a:endParaRPr lang="en-US" sz="2400" spc="-200" dirty="0">
-              <a:solidFill>
-                <a:srgbClr val="235888"/>
-              </a:solidFill>
-              <a:latin typeface="Segoe UI Light" panose="020B0502040204020203" pitchFamily="34" charset="0"/>
-              <a:cs typeface="Segoe UI Light" panose="020B0502040204020203" pitchFamily="34" charset="0"/>
-            </a:endParaRPr>
-          </a:p>
-        </p:txBody>
-      </p:sp>
-      <p:sp>
-        <p:nvSpPr>
-          <p:cNvPr id="18" name="Rectangle 17"/>
-          <p:cNvSpPr/>
-          <p:nvPr/>
-        </p:nvSpPr>
-        <p:spPr>
-          <a:xfrm>
-            <a:off x="8959211" y="2806149"/>
-            <a:ext cx="2613560" cy="2489912"/>
-          </a:xfrm>
-          <a:prstGeom prst="rect">
-            <a:avLst/>
-          </a:prstGeom>
-        </p:spPr>
-        <p:txBody>
-          <a:bodyPr wrap="square" anchor="t" anchorCtr="0">
-            <a:spAutoFit/>
-          </a:bodyPr>
-          <a:lstStyle/>
-          <a:p>
-            <a:pPr marL="231775" indent="-231775">
-              <a:lnSpc>
-                <a:spcPct val="95000"/>
-              </a:lnSpc>
-              <a:buSzPct val="90000"/>
-              <a:buFont typeface="Arial" panose="020B0604020202020204" pitchFamily="34" charset="0"/>
-              <a:buChar char="•"/>
-            </a:pPr>
-            <a:r>
-              <a:rPr lang="en-US" sz="2800" spc="-200" dirty="0">
-                <a:latin typeface="Segoe UI" panose="020B0502040204020203" pitchFamily="34" charset="0"/>
-                <a:cs typeface="Segoe UI" panose="020B0502040204020203" pitchFamily="34" charset="0"/>
-              </a:rPr>
-              <a:t>Report integration</a:t>
-            </a:r>
-          </a:p>
-          <a:p>
-            <a:pPr marL="231775" indent="-231775">
-              <a:lnSpc>
-                <a:spcPct val="95000"/>
-              </a:lnSpc>
-              <a:buSzPct val="90000"/>
-              <a:buFont typeface="Arial" panose="020B0604020202020204" pitchFamily="34" charset="0"/>
-              <a:buChar char="•"/>
-            </a:pPr>
-            <a:r>
-              <a:rPr lang="en-US" sz="2800" spc="-200" dirty="0">
-                <a:latin typeface="Segoe UI" panose="020B0502040204020203" pitchFamily="34" charset="0"/>
-                <a:cs typeface="Segoe UI" panose="020B0502040204020203" pitchFamily="34" charset="0"/>
-              </a:rPr>
-              <a:t>REST services</a:t>
-            </a:r>
-          </a:p>
-          <a:p>
-            <a:pPr marL="231775" indent="-231775">
-              <a:lnSpc>
-                <a:spcPct val="95000"/>
-              </a:lnSpc>
-              <a:buSzPct val="90000"/>
-              <a:buFont typeface="Arial" panose="020B0604020202020204" pitchFamily="34" charset="0"/>
-              <a:buChar char="•"/>
-            </a:pPr>
-            <a:r>
-              <a:rPr lang="en-US" sz="2800" spc="-200" dirty="0">
-                <a:latin typeface="Segoe UI" panose="020B0502040204020203" pitchFamily="34" charset="0"/>
-                <a:cs typeface="Segoe UI" panose="020B0502040204020203" pitchFamily="34" charset="0"/>
-              </a:rPr>
-              <a:t>Create custom visualizations</a:t>
-            </a:r>
-          </a:p>
-          <a:p>
-            <a:pPr>
-              <a:lnSpc>
-                <a:spcPct val="95000"/>
-              </a:lnSpc>
-              <a:buSzPct val="90000"/>
-            </a:pPr>
-            <a:endParaRPr lang="en-US" sz="2400" spc="-200" dirty="0">
-              <a:solidFill>
-                <a:srgbClr val="235888"/>
-              </a:solidFill>
-              <a:latin typeface="Segoe UI Light" panose="020B0502040204020203" pitchFamily="34" charset="0"/>
-              <a:cs typeface="Segoe UI Light" panose="020B0502040204020203" pitchFamily="34" charset="0"/>
-            </a:endParaRPr>
-          </a:p>
-        </p:txBody>
-      </p:sp>
-      <p:pic>
-        <p:nvPicPr>
-          <p:cNvPr id="19" name="Picture 2" descr="Image result for power bi"/>
-          <p:cNvPicPr>
-            <a:picLocks noChangeAspect="1" noChangeArrowheads="1"/>
-          </p:cNvPicPr>
-          <p:nvPr/>
-        </p:nvPicPr>
-        <p:blipFill>
-          <a:blip r:embed="rId3" cstate="screen">
-            <a:extLst>
-              <a:ext uri="{28A0092B-C50C-407E-A947-70E740481C1C}">
-                <a14:useLocalDpi xmlns:a14="http://schemas.microsoft.com/office/drawing/2010/main" val="0"/>
-              </a:ext>
-            </a:extLst>
-          </a:blip>
-          <a:srcRect/>
-          <a:stretch>
-            <a:fillRect/>
-          </a:stretch>
-        </p:blipFill>
-        <p:spPr bwMode="auto">
-          <a:xfrm>
-            <a:off x="10391885" y="5812278"/>
-            <a:ext cx="1421327" cy="1045722"/>
-          </a:xfrm>
-          <a:prstGeom prst="rect">
-            <a:avLst/>
-          </a:prstGeom>
-          <a:noFill/>
-          <a:extLst>
-            <a:ext uri="{909E8E84-426E-40DD-AFC4-6F175D3DCCD1}">
-              <a14:hiddenFill xmlns:a14="http://schemas.microsoft.com/office/drawing/2010/main">
-                <a:solidFill>
-                  <a:srgbClr val="FFFFFF"/>
-                </a:solidFill>
-              </a14:hiddenFill>
-            </a:ext>
-          </a:extLst>
-        </p:spPr>
-      </p:pic>
-    </p:spTree>
-    <p:extLst>
-      <p:ext uri="{BB962C8B-B14F-4D97-AF65-F5344CB8AC3E}">
-        <p14:creationId xmlns:p14="http://schemas.microsoft.com/office/powerpoint/2010/main" val="3070396282"/>
       </p:ext>
     </p:extLst>
   </p:cSld>

</xml_diff>

<commit_message>
adicao relatorios de exemplo
</commit_message>
<xml_diff>
--- a/Apresentação/MadrugadaNerdzao_Trilha PBI.pptx
+++ b/Apresentação/MadrugadaNerdzao_Trilha PBI.pptx
@@ -6,7 +6,7 @@
     <p:sldMasterId id="2147483663" r:id="rId2"/>
   </p:sldMasterIdLst>
   <p:notesMasterIdLst>
-    <p:notesMasterId r:id="rId20"/>
+    <p:notesMasterId r:id="rId24"/>
   </p:notesMasterIdLst>
   <p:sldIdLst>
     <p:sldId id="256" r:id="rId3"/>
@@ -24,8 +24,12 @@
     <p:sldId id="332" r:id="rId15"/>
     <p:sldId id="333" r:id="rId16"/>
     <p:sldId id="341" r:id="rId17"/>
-    <p:sldId id="342" r:id="rId18"/>
-    <p:sldId id="330" r:id="rId19"/>
+    <p:sldId id="344" r:id="rId18"/>
+    <p:sldId id="342" r:id="rId19"/>
+    <p:sldId id="345" r:id="rId20"/>
+    <p:sldId id="346" r:id="rId21"/>
+    <p:sldId id="347" r:id="rId22"/>
+    <p:sldId id="330" r:id="rId23"/>
   </p:sldIdLst>
   <p:sldSz cx="12192000" cy="6858000"/>
   <p:notesSz cx="6858000" cy="9144000"/>
@@ -1432,7 +1436,7 @@
     </p:spTree>
     <p:extLst>
       <p:ext uri="{BB962C8B-B14F-4D97-AF65-F5344CB8AC3E}">
-        <p14:creationId xmlns:p14="http://schemas.microsoft.com/office/powerpoint/2010/main" val="145020510"/>
+        <p14:creationId xmlns:p14="http://schemas.microsoft.com/office/powerpoint/2010/main" val="3989889761"/>
       </p:ext>
     </p:extLst>
   </p:cSld>
@@ -1557,7 +1561,257 @@
     </p:spTree>
     <p:extLst>
       <p:ext uri="{BB962C8B-B14F-4D97-AF65-F5344CB8AC3E}">
-        <p14:creationId xmlns:p14="http://schemas.microsoft.com/office/powerpoint/2010/main" val="4178489984"/>
+        <p14:creationId xmlns:p14="http://schemas.microsoft.com/office/powerpoint/2010/main" val="145020510"/>
+      </p:ext>
+    </p:extLst>
+  </p:cSld>
+  <p:clrMapOvr>
+    <a:masterClrMapping/>
+  </p:clrMapOvr>
+</p:notes>
+</file>
+
+<file path=ppt/notesSlides/notesSlide18.xml><?xml version="1.0" encoding="utf-8"?>
+<p:notes xmlns:a="http://schemas.openxmlformats.org/drawingml/2006/main" xmlns:r="http://schemas.openxmlformats.org/officeDocument/2006/relationships" xmlns:p="http://schemas.openxmlformats.org/presentationml/2006/main">
+  <p:cSld>
+    <p:spTree>
+      <p:nvGrpSpPr>
+        <p:cNvPr id="1" name=""/>
+        <p:cNvGrpSpPr/>
+        <p:nvPr/>
+      </p:nvGrpSpPr>
+      <p:grpSpPr>
+        <a:xfrm>
+          <a:off x="0" y="0"/>
+          <a:ext cx="0" cy="0"/>
+          <a:chOff x="0" y="0"/>
+          <a:chExt cx="0" cy="0"/>
+        </a:xfrm>
+      </p:grpSpPr>
+      <p:sp>
+        <p:nvSpPr>
+          <p:cNvPr id="2" name="Slide Image Placeholder 1"/>
+          <p:cNvSpPr>
+            <a:spLocks noGrp="1" noRot="1" noChangeAspect="1"/>
+          </p:cNvSpPr>
+          <p:nvPr>
+            <p:ph type="sldImg"/>
+          </p:nvPr>
+        </p:nvSpPr>
+        <p:spPr/>
+      </p:sp>
+      <p:sp>
+        <p:nvSpPr>
+          <p:cNvPr id="3" name="Notes Placeholder 2"/>
+          <p:cNvSpPr>
+            <a:spLocks noGrp="1"/>
+          </p:cNvSpPr>
+          <p:nvPr>
+            <p:ph type="body" idx="1"/>
+          </p:nvPr>
+        </p:nvSpPr>
+        <p:spPr/>
+        <p:txBody>
+          <a:bodyPr/>
+          <a:lstStyle/>
+          <a:p>
+            <a:pPr marL="0" marR="0" indent="0" algn="l" defTabSz="914400" rtl="0" eaLnBrk="1" fontAlgn="auto" latinLnBrk="0" hangingPunct="1">
+              <a:lnSpc>
+                <a:spcPct val="100000"/>
+              </a:lnSpc>
+              <a:spcBef>
+                <a:spcPts val="0"/>
+              </a:spcBef>
+              <a:spcAft>
+                <a:spcPts val="0"/>
+              </a:spcAft>
+              <a:buClrTx/>
+              <a:buSzTx/>
+              <a:buFontTx/>
+              <a:buNone/>
+              <a:tabLst/>
+              <a:defRPr/>
+            </a:pPr>
+            <a:r>
+              <a:rPr lang="en-US" sz="1200" kern="1200" dirty="0">
+                <a:solidFill>
+                  <a:schemeClr val="tx1"/>
+                </a:solidFill>
+                <a:effectLst/>
+                <a:latin typeface="+mn-lt"/>
+                <a:ea typeface="+mn-ea"/>
+                <a:cs typeface="+mn-cs"/>
+              </a:rPr>
+              <a:t>The basic building block for all</a:t>
+            </a:r>
+            <a:r>
+              <a:rPr lang="en-US" sz="1200" kern="1200" baseline="0" dirty="0">
+                <a:solidFill>
+                  <a:schemeClr val="tx1"/>
+                </a:solidFill>
+                <a:effectLst/>
+                <a:latin typeface="+mn-lt"/>
+                <a:ea typeface="+mn-ea"/>
+                <a:cs typeface="+mn-cs"/>
+              </a:rPr>
+              <a:t> Business Intelligence elements in Power BI begins with the data itself. Data from various sources is filtered, cleaned, and combined into Reports via Visualizations, and optionally published to Dashboards. Dashboard data is surfaced to users on any device, based on permissions and organization needs.</a:t>
+            </a:r>
+            <a:endParaRPr lang="en-US" dirty="0"/>
+          </a:p>
+        </p:txBody>
+      </p:sp>
+      <p:sp>
+        <p:nvSpPr>
+          <p:cNvPr id="4" name="Slide Number Placeholder 3"/>
+          <p:cNvSpPr>
+            <a:spLocks noGrp="1"/>
+          </p:cNvSpPr>
+          <p:nvPr>
+            <p:ph type="sldNum" sz="quarter" idx="10"/>
+          </p:nvPr>
+        </p:nvSpPr>
+        <p:spPr/>
+        <p:txBody>
+          <a:bodyPr/>
+          <a:lstStyle/>
+          <a:p>
+            <a:fld id="{01283FAC-A721-45A3-BBDE-EAF2B09B7CD9}" type="slidenum">
+              <a:rPr lang="en-US" smtClean="0"/>
+              <a:t>18</a:t>
+            </a:fld>
+            <a:endParaRPr lang="en-US" dirty="0"/>
+          </a:p>
+        </p:txBody>
+      </p:sp>
+    </p:spTree>
+    <p:extLst>
+      <p:ext uri="{BB962C8B-B14F-4D97-AF65-F5344CB8AC3E}">
+        <p14:creationId xmlns:p14="http://schemas.microsoft.com/office/powerpoint/2010/main" val="1605853562"/>
+      </p:ext>
+    </p:extLst>
+  </p:cSld>
+  <p:clrMapOvr>
+    <a:masterClrMapping/>
+  </p:clrMapOvr>
+</p:notes>
+</file>
+
+<file path=ppt/notesSlides/notesSlide19.xml><?xml version="1.0" encoding="utf-8"?>
+<p:notes xmlns:a="http://schemas.openxmlformats.org/drawingml/2006/main" xmlns:r="http://schemas.openxmlformats.org/officeDocument/2006/relationships" xmlns:p="http://schemas.openxmlformats.org/presentationml/2006/main">
+  <p:cSld>
+    <p:spTree>
+      <p:nvGrpSpPr>
+        <p:cNvPr id="1" name=""/>
+        <p:cNvGrpSpPr/>
+        <p:nvPr/>
+      </p:nvGrpSpPr>
+      <p:grpSpPr>
+        <a:xfrm>
+          <a:off x="0" y="0"/>
+          <a:ext cx="0" cy="0"/>
+          <a:chOff x="0" y="0"/>
+          <a:chExt cx="0" cy="0"/>
+        </a:xfrm>
+      </p:grpSpPr>
+      <p:sp>
+        <p:nvSpPr>
+          <p:cNvPr id="2" name="Slide Image Placeholder 1"/>
+          <p:cNvSpPr>
+            <a:spLocks noGrp="1" noRot="1" noChangeAspect="1"/>
+          </p:cNvSpPr>
+          <p:nvPr>
+            <p:ph type="sldImg"/>
+          </p:nvPr>
+        </p:nvSpPr>
+        <p:spPr/>
+      </p:sp>
+      <p:sp>
+        <p:nvSpPr>
+          <p:cNvPr id="3" name="Notes Placeholder 2"/>
+          <p:cNvSpPr>
+            <a:spLocks noGrp="1"/>
+          </p:cNvSpPr>
+          <p:nvPr>
+            <p:ph type="body" idx="1"/>
+          </p:nvPr>
+        </p:nvSpPr>
+        <p:spPr/>
+        <p:txBody>
+          <a:bodyPr/>
+          <a:lstStyle/>
+          <a:p>
+            <a:pPr marL="0" marR="0" indent="0" algn="l" defTabSz="914400" rtl="0" eaLnBrk="1" fontAlgn="auto" latinLnBrk="0" hangingPunct="1">
+              <a:lnSpc>
+                <a:spcPct val="100000"/>
+              </a:lnSpc>
+              <a:spcBef>
+                <a:spcPts val="0"/>
+              </a:spcBef>
+              <a:spcAft>
+                <a:spcPts val="0"/>
+              </a:spcAft>
+              <a:buClrTx/>
+              <a:buSzTx/>
+              <a:buFontTx/>
+              <a:buNone/>
+              <a:tabLst/>
+              <a:defRPr/>
+            </a:pPr>
+            <a:r>
+              <a:rPr lang="en-US" sz="1200" kern="1200" dirty="0">
+                <a:solidFill>
+                  <a:schemeClr val="tx1"/>
+                </a:solidFill>
+                <a:effectLst/>
+                <a:latin typeface="+mn-lt"/>
+                <a:ea typeface="+mn-ea"/>
+                <a:cs typeface="+mn-cs"/>
+              </a:rPr>
+              <a:t>The basic building block for all</a:t>
+            </a:r>
+            <a:r>
+              <a:rPr lang="en-US" sz="1200" kern="1200" baseline="0" dirty="0">
+                <a:solidFill>
+                  <a:schemeClr val="tx1"/>
+                </a:solidFill>
+                <a:effectLst/>
+                <a:latin typeface="+mn-lt"/>
+                <a:ea typeface="+mn-ea"/>
+                <a:cs typeface="+mn-cs"/>
+              </a:rPr>
+              <a:t> Business Intelligence elements in Power BI begins with the data itself. Data from various sources is filtered, cleaned, and combined into Reports via Visualizations, and optionally published to Dashboards. Dashboard data is surfaced to users on any device, based on permissions and organization needs.</a:t>
+            </a:r>
+            <a:endParaRPr lang="en-US" dirty="0"/>
+          </a:p>
+        </p:txBody>
+      </p:sp>
+      <p:sp>
+        <p:nvSpPr>
+          <p:cNvPr id="4" name="Slide Number Placeholder 3"/>
+          <p:cNvSpPr>
+            <a:spLocks noGrp="1"/>
+          </p:cNvSpPr>
+          <p:nvPr>
+            <p:ph type="sldNum" sz="quarter" idx="10"/>
+          </p:nvPr>
+        </p:nvSpPr>
+        <p:spPr/>
+        <p:txBody>
+          <a:bodyPr/>
+          <a:lstStyle/>
+          <a:p>
+            <a:fld id="{01283FAC-A721-45A3-BBDE-EAF2B09B7CD9}" type="slidenum">
+              <a:rPr lang="en-US" smtClean="0"/>
+              <a:t>19</a:t>
+            </a:fld>
+            <a:endParaRPr lang="en-US" dirty="0"/>
+          </a:p>
+        </p:txBody>
+      </p:sp>
+    </p:spTree>
+    <p:extLst>
+      <p:ext uri="{BB962C8B-B14F-4D97-AF65-F5344CB8AC3E}">
+        <p14:creationId xmlns:p14="http://schemas.microsoft.com/office/powerpoint/2010/main" val="3705831186"/>
       </p:ext>
     </p:extLst>
   </p:cSld>
@@ -1698,6 +1952,256 @@
     <p:extLst>
       <p:ext uri="{BB962C8B-B14F-4D97-AF65-F5344CB8AC3E}">
         <p14:creationId xmlns:p14="http://schemas.microsoft.com/office/powerpoint/2010/main" val="1410746633"/>
+      </p:ext>
+    </p:extLst>
+  </p:cSld>
+  <p:clrMapOvr>
+    <a:masterClrMapping/>
+  </p:clrMapOvr>
+</p:notes>
+</file>
+
+<file path=ppt/notesSlides/notesSlide20.xml><?xml version="1.0" encoding="utf-8"?>
+<p:notes xmlns:a="http://schemas.openxmlformats.org/drawingml/2006/main" xmlns:r="http://schemas.openxmlformats.org/officeDocument/2006/relationships" xmlns:p="http://schemas.openxmlformats.org/presentationml/2006/main">
+  <p:cSld>
+    <p:spTree>
+      <p:nvGrpSpPr>
+        <p:cNvPr id="1" name=""/>
+        <p:cNvGrpSpPr/>
+        <p:nvPr/>
+      </p:nvGrpSpPr>
+      <p:grpSpPr>
+        <a:xfrm>
+          <a:off x="0" y="0"/>
+          <a:ext cx="0" cy="0"/>
+          <a:chOff x="0" y="0"/>
+          <a:chExt cx="0" cy="0"/>
+        </a:xfrm>
+      </p:grpSpPr>
+      <p:sp>
+        <p:nvSpPr>
+          <p:cNvPr id="2" name="Slide Image Placeholder 1"/>
+          <p:cNvSpPr>
+            <a:spLocks noGrp="1" noRot="1" noChangeAspect="1"/>
+          </p:cNvSpPr>
+          <p:nvPr>
+            <p:ph type="sldImg"/>
+          </p:nvPr>
+        </p:nvSpPr>
+        <p:spPr/>
+      </p:sp>
+      <p:sp>
+        <p:nvSpPr>
+          <p:cNvPr id="3" name="Notes Placeholder 2"/>
+          <p:cNvSpPr>
+            <a:spLocks noGrp="1"/>
+          </p:cNvSpPr>
+          <p:nvPr>
+            <p:ph type="body" idx="1"/>
+          </p:nvPr>
+        </p:nvSpPr>
+        <p:spPr/>
+        <p:txBody>
+          <a:bodyPr/>
+          <a:lstStyle/>
+          <a:p>
+            <a:pPr marL="0" marR="0" indent="0" algn="l" defTabSz="914400" rtl="0" eaLnBrk="1" fontAlgn="auto" latinLnBrk="0" hangingPunct="1">
+              <a:lnSpc>
+                <a:spcPct val="100000"/>
+              </a:lnSpc>
+              <a:spcBef>
+                <a:spcPts val="0"/>
+              </a:spcBef>
+              <a:spcAft>
+                <a:spcPts val="0"/>
+              </a:spcAft>
+              <a:buClrTx/>
+              <a:buSzTx/>
+              <a:buFontTx/>
+              <a:buNone/>
+              <a:tabLst/>
+              <a:defRPr/>
+            </a:pPr>
+            <a:r>
+              <a:rPr lang="en-US" sz="1200" kern="1200" dirty="0">
+                <a:solidFill>
+                  <a:schemeClr val="tx1"/>
+                </a:solidFill>
+                <a:effectLst/>
+                <a:latin typeface="+mn-lt"/>
+                <a:ea typeface="+mn-ea"/>
+                <a:cs typeface="+mn-cs"/>
+              </a:rPr>
+              <a:t>The basic building block for all</a:t>
+            </a:r>
+            <a:r>
+              <a:rPr lang="en-US" sz="1200" kern="1200" baseline="0" dirty="0">
+                <a:solidFill>
+                  <a:schemeClr val="tx1"/>
+                </a:solidFill>
+                <a:effectLst/>
+                <a:latin typeface="+mn-lt"/>
+                <a:ea typeface="+mn-ea"/>
+                <a:cs typeface="+mn-cs"/>
+              </a:rPr>
+              <a:t> Business Intelligence elements in Power BI begins with the data itself. Data from various sources is filtered, cleaned, and combined into Reports via Visualizations, and optionally published to Dashboards. Dashboard data is surfaced to users on any device, based on permissions and organization needs.</a:t>
+            </a:r>
+            <a:endParaRPr lang="en-US" dirty="0"/>
+          </a:p>
+        </p:txBody>
+      </p:sp>
+      <p:sp>
+        <p:nvSpPr>
+          <p:cNvPr id="4" name="Slide Number Placeholder 3"/>
+          <p:cNvSpPr>
+            <a:spLocks noGrp="1"/>
+          </p:cNvSpPr>
+          <p:nvPr>
+            <p:ph type="sldNum" sz="quarter" idx="10"/>
+          </p:nvPr>
+        </p:nvSpPr>
+        <p:spPr/>
+        <p:txBody>
+          <a:bodyPr/>
+          <a:lstStyle/>
+          <a:p>
+            <a:fld id="{01283FAC-A721-45A3-BBDE-EAF2B09B7CD9}" type="slidenum">
+              <a:rPr lang="en-US" smtClean="0"/>
+              <a:t>20</a:t>
+            </a:fld>
+            <a:endParaRPr lang="en-US" dirty="0"/>
+          </a:p>
+        </p:txBody>
+      </p:sp>
+    </p:spTree>
+    <p:extLst>
+      <p:ext uri="{BB962C8B-B14F-4D97-AF65-F5344CB8AC3E}">
+        <p14:creationId xmlns:p14="http://schemas.microsoft.com/office/powerpoint/2010/main" val="2632078344"/>
+      </p:ext>
+    </p:extLst>
+  </p:cSld>
+  <p:clrMapOvr>
+    <a:masterClrMapping/>
+  </p:clrMapOvr>
+</p:notes>
+</file>
+
+<file path=ppt/notesSlides/notesSlide21.xml><?xml version="1.0" encoding="utf-8"?>
+<p:notes xmlns:a="http://schemas.openxmlformats.org/drawingml/2006/main" xmlns:r="http://schemas.openxmlformats.org/officeDocument/2006/relationships" xmlns:p="http://schemas.openxmlformats.org/presentationml/2006/main">
+  <p:cSld>
+    <p:spTree>
+      <p:nvGrpSpPr>
+        <p:cNvPr id="1" name=""/>
+        <p:cNvGrpSpPr/>
+        <p:nvPr/>
+      </p:nvGrpSpPr>
+      <p:grpSpPr>
+        <a:xfrm>
+          <a:off x="0" y="0"/>
+          <a:ext cx="0" cy="0"/>
+          <a:chOff x="0" y="0"/>
+          <a:chExt cx="0" cy="0"/>
+        </a:xfrm>
+      </p:grpSpPr>
+      <p:sp>
+        <p:nvSpPr>
+          <p:cNvPr id="2" name="Slide Image Placeholder 1"/>
+          <p:cNvSpPr>
+            <a:spLocks noGrp="1" noRot="1" noChangeAspect="1"/>
+          </p:cNvSpPr>
+          <p:nvPr>
+            <p:ph type="sldImg"/>
+          </p:nvPr>
+        </p:nvSpPr>
+        <p:spPr/>
+      </p:sp>
+      <p:sp>
+        <p:nvSpPr>
+          <p:cNvPr id="3" name="Notes Placeholder 2"/>
+          <p:cNvSpPr>
+            <a:spLocks noGrp="1"/>
+          </p:cNvSpPr>
+          <p:nvPr>
+            <p:ph type="body" idx="1"/>
+          </p:nvPr>
+        </p:nvSpPr>
+        <p:spPr/>
+        <p:txBody>
+          <a:bodyPr/>
+          <a:lstStyle/>
+          <a:p>
+            <a:pPr marL="0" marR="0" indent="0" algn="l" defTabSz="914400" rtl="0" eaLnBrk="1" fontAlgn="auto" latinLnBrk="0" hangingPunct="1">
+              <a:lnSpc>
+                <a:spcPct val="100000"/>
+              </a:lnSpc>
+              <a:spcBef>
+                <a:spcPts val="0"/>
+              </a:spcBef>
+              <a:spcAft>
+                <a:spcPts val="0"/>
+              </a:spcAft>
+              <a:buClrTx/>
+              <a:buSzTx/>
+              <a:buFontTx/>
+              <a:buNone/>
+              <a:tabLst/>
+              <a:defRPr/>
+            </a:pPr>
+            <a:r>
+              <a:rPr lang="en-US" sz="1200" kern="1200" dirty="0">
+                <a:solidFill>
+                  <a:schemeClr val="tx1"/>
+                </a:solidFill>
+                <a:effectLst/>
+                <a:latin typeface="+mn-lt"/>
+                <a:ea typeface="+mn-ea"/>
+                <a:cs typeface="+mn-cs"/>
+              </a:rPr>
+              <a:t>The basic building block for all</a:t>
+            </a:r>
+            <a:r>
+              <a:rPr lang="en-US" sz="1200" kern="1200" baseline="0" dirty="0">
+                <a:solidFill>
+                  <a:schemeClr val="tx1"/>
+                </a:solidFill>
+                <a:effectLst/>
+                <a:latin typeface="+mn-lt"/>
+                <a:ea typeface="+mn-ea"/>
+                <a:cs typeface="+mn-cs"/>
+              </a:rPr>
+              <a:t> Business Intelligence elements in Power BI begins with the data itself. Data from various sources is filtered, cleaned, and combined into Reports via Visualizations, and optionally published to Dashboards. Dashboard data is surfaced to users on any device, based on permissions and organization needs.</a:t>
+            </a:r>
+            <a:endParaRPr lang="en-US" dirty="0"/>
+          </a:p>
+        </p:txBody>
+      </p:sp>
+      <p:sp>
+        <p:nvSpPr>
+          <p:cNvPr id="4" name="Slide Number Placeholder 3"/>
+          <p:cNvSpPr>
+            <a:spLocks noGrp="1"/>
+          </p:cNvSpPr>
+          <p:nvPr>
+            <p:ph type="sldNum" sz="quarter" idx="10"/>
+          </p:nvPr>
+        </p:nvSpPr>
+        <p:spPr/>
+        <p:txBody>
+          <a:bodyPr/>
+          <a:lstStyle/>
+          <a:p>
+            <a:fld id="{01283FAC-A721-45A3-BBDE-EAF2B09B7CD9}" type="slidenum">
+              <a:rPr lang="en-US" smtClean="0"/>
+              <a:t>21</a:t>
+            </a:fld>
+            <a:endParaRPr lang="en-US" dirty="0"/>
+          </a:p>
+        </p:txBody>
+      </p:sp>
+    </p:spTree>
+    <p:extLst>
+      <p:ext uri="{BB962C8B-B14F-4D97-AF65-F5344CB8AC3E}">
+        <p14:creationId xmlns:p14="http://schemas.microsoft.com/office/powerpoint/2010/main" val="4178489984"/>
       </p:ext>
     </p:extLst>
   </p:cSld>
@@ -19670,7 +20174,7 @@
           <a:p>
             <a:r>
               <a:rPr lang="pt-BR" dirty="0"/>
-              <a:t>Consumo NodeRed</a:t>
+              <a:t>Painel MVP BR</a:t>
             </a:r>
           </a:p>
         </p:txBody>
@@ -19684,7 +20188,7 @@
         <p:spPr>
           <a:xfrm>
             <a:off x="3096140" y="3075057"/>
-            <a:ext cx="5751575" cy="707886"/>
+            <a:ext cx="4839786" cy="707886"/>
           </a:xfrm>
           <a:prstGeom prst="rect">
             <a:avLst/>
@@ -19698,20 +20202,15 @@
           <a:p>
             <a:r>
               <a:rPr lang="pt-BR" sz="4000" dirty="0"/>
-              <a:t>http://bit.ly</a:t>
-            </a:r>
-            <a:r>
-              <a:rPr lang="pt-BR" sz="4000"/>
-              <a:t>/pbi-nodered</a:t>
-            </a:r>
-            <a:endParaRPr lang="pt-BR" sz="4000" dirty="0"/>
+              <a:t>http://bit.ly/pbi-mvp</a:t>
+            </a:r>
           </a:p>
         </p:txBody>
       </p:sp>
     </p:spTree>
     <p:extLst>
       <p:ext uri="{BB962C8B-B14F-4D97-AF65-F5344CB8AC3E}">
-        <p14:creationId xmlns:p14="http://schemas.microsoft.com/office/powerpoint/2010/main" val="2958778647"/>
+        <p14:creationId xmlns:p14="http://schemas.microsoft.com/office/powerpoint/2010/main" val="1419917395"/>
       </p:ext>
     </p:extLst>
   </p:cSld>
@@ -19738,33 +20237,6 @@
           <a:chExt cx="0" cy="0"/>
         </a:xfrm>
       </p:grpSpPr>
-      <p:sp>
-        <p:nvSpPr>
-          <p:cNvPr id="2" name="Title 1"/>
-          <p:cNvSpPr>
-            <a:spLocks noGrp="1"/>
-          </p:cNvSpPr>
-          <p:nvPr>
-            <p:ph type="title"/>
-          </p:nvPr>
-        </p:nvSpPr>
-        <p:spPr>
-          <a:xfrm>
-            <a:off x="586948" y="2513965"/>
-            <a:ext cx="10515600" cy="1325563"/>
-          </a:xfrm>
-        </p:spPr>
-        <p:txBody>
-          <a:bodyPr/>
-          <a:lstStyle/>
-          <a:p>
-            <a:r>
-              <a:rPr lang="en-US" dirty="0"/>
-              <a:t>Obrigado =D</a:t>
-            </a:r>
-          </a:p>
-        </p:txBody>
-      </p:sp>
       <p:pic>
         <p:nvPicPr>
           <p:cNvPr id="23" name="Picture 2" descr="Image result for power bi"/>
@@ -19806,10 +20278,322 @@
           </a:extLst>
         </p:spPr>
       </p:pic>
+      <p:sp>
+        <p:nvSpPr>
+          <p:cNvPr id="3" name="Título 2"/>
+          <p:cNvSpPr>
+            <a:spLocks noGrp="1"/>
+          </p:cNvSpPr>
+          <p:nvPr>
+            <p:ph type="title"/>
+          </p:nvPr>
+        </p:nvSpPr>
+        <p:spPr>
+          <a:xfrm>
+            <a:off x="396240" y="319405"/>
+            <a:ext cx="10515600" cy="1325563"/>
+          </a:xfrm>
+        </p:spPr>
+        <p:txBody>
+          <a:bodyPr/>
+          <a:lstStyle/>
+          <a:p>
+            <a:r>
+              <a:rPr lang="pt-BR" dirty="0"/>
+              <a:t>Consumo NodeRed</a:t>
+            </a:r>
+          </a:p>
+        </p:txBody>
+      </p:sp>
+      <p:sp>
+        <p:nvSpPr>
+          <p:cNvPr id="4" name="Retângulo 3"/>
+          <p:cNvSpPr/>
+          <p:nvPr/>
+        </p:nvSpPr>
+        <p:spPr>
+          <a:xfrm>
+            <a:off x="3096140" y="3075057"/>
+            <a:ext cx="5751575" cy="707886"/>
+          </a:xfrm>
+          <a:prstGeom prst="rect">
+            <a:avLst/>
+          </a:prstGeom>
+        </p:spPr>
+        <p:txBody>
+          <a:bodyPr wrap="none">
+            <a:spAutoFit/>
+          </a:bodyPr>
+          <a:lstStyle/>
+          <a:p>
+            <a:r>
+              <a:rPr lang="pt-BR" sz="4000" dirty="0"/>
+              <a:t>http://bit.ly</a:t>
+            </a:r>
+            <a:r>
+              <a:rPr lang="pt-BR" sz="4000"/>
+              <a:t>/pbi-nodered</a:t>
+            </a:r>
+            <a:endParaRPr lang="pt-BR" sz="4000" dirty="0"/>
+          </a:p>
+        </p:txBody>
+      </p:sp>
     </p:spTree>
     <p:extLst>
       <p:ext uri="{BB962C8B-B14F-4D97-AF65-F5344CB8AC3E}">
-        <p14:creationId xmlns:p14="http://schemas.microsoft.com/office/powerpoint/2010/main" val="2222928756"/>
+        <p14:creationId xmlns:p14="http://schemas.microsoft.com/office/powerpoint/2010/main" val="2958778647"/>
+      </p:ext>
+    </p:extLst>
+  </p:cSld>
+  <p:clrMapOvr>
+    <a:masterClrMapping/>
+  </p:clrMapOvr>
+</p:sld>
+</file>
+
+<file path=ppt/slides/slide18.xml><?xml version="1.0" encoding="utf-8"?>
+<p:sld xmlns:a="http://schemas.openxmlformats.org/drawingml/2006/main" xmlns:r="http://schemas.openxmlformats.org/officeDocument/2006/relationships" xmlns:p="http://schemas.openxmlformats.org/presentationml/2006/main">
+  <p:cSld>
+    <p:spTree>
+      <p:nvGrpSpPr>
+        <p:cNvPr id="1" name=""/>
+        <p:cNvGrpSpPr/>
+        <p:nvPr/>
+      </p:nvGrpSpPr>
+      <p:grpSpPr>
+        <a:xfrm>
+          <a:off x="0" y="0"/>
+          <a:ext cx="0" cy="0"/>
+          <a:chOff x="0" y="0"/>
+          <a:chExt cx="0" cy="0"/>
+        </a:xfrm>
+      </p:grpSpPr>
+      <p:pic>
+        <p:nvPicPr>
+          <p:cNvPr id="23" name="Picture 2" descr="Image result for power bi"/>
+          <p:cNvPicPr>
+            <a:picLocks noChangeAspect="1" noChangeArrowheads="1"/>
+          </p:cNvPicPr>
+          <p:nvPr/>
+        </p:nvPicPr>
+        <p:blipFill>
+          <a:blip r:embed="rId3" cstate="screen">
+            <a:extLst>
+              <a:ext uri="{28A0092B-C50C-407E-A947-70E740481C1C}">
+                <a14:useLocalDpi xmlns:a14="http://schemas.microsoft.com/office/drawing/2010/main" val="0"/>
+              </a:ext>
+            </a:extLst>
+          </a:blip>
+          <a:srcRect/>
+          <a:stretch>
+            <a:fillRect/>
+          </a:stretch>
+        </p:blipFill>
+        <p:spPr bwMode="auto">
+          <a:xfrm>
+            <a:off x="10391885" y="5812278"/>
+            <a:ext cx="1421327" cy="1045722"/>
+          </a:xfrm>
+          <a:prstGeom prst="rect">
+            <a:avLst/>
+          </a:prstGeom>
+          <a:noFill/>
+          <a:extLst>
+            <a:ext uri="{909E8E84-426E-40DD-AFC4-6F175D3DCCD1}">
+              <a14:hiddenFill xmlns:a14="http://schemas.microsoft.com/office/drawing/2010/main">
+                <a:solidFill>
+                  <a:srgbClr val="FFFFFF"/>
+                </a:solidFill>
+              </a14:hiddenFill>
+            </a:ext>
+          </a:extLst>
+        </p:spPr>
+      </p:pic>
+      <p:sp>
+        <p:nvSpPr>
+          <p:cNvPr id="3" name="Título 2"/>
+          <p:cNvSpPr>
+            <a:spLocks noGrp="1"/>
+          </p:cNvSpPr>
+          <p:nvPr>
+            <p:ph type="title"/>
+          </p:nvPr>
+        </p:nvSpPr>
+        <p:spPr>
+          <a:xfrm>
+            <a:off x="396240" y="319405"/>
+            <a:ext cx="10515600" cy="1325563"/>
+          </a:xfrm>
+        </p:spPr>
+        <p:txBody>
+          <a:bodyPr/>
+          <a:lstStyle/>
+          <a:p>
+            <a:r>
+              <a:rPr lang="pt-BR" dirty="0"/>
+              <a:t>Consumo NodeJS</a:t>
+            </a:r>
+          </a:p>
+        </p:txBody>
+      </p:sp>
+      <p:sp>
+        <p:nvSpPr>
+          <p:cNvPr id="4" name="Retângulo 3"/>
+          <p:cNvSpPr/>
+          <p:nvPr/>
+        </p:nvSpPr>
+        <p:spPr>
+          <a:xfrm>
+            <a:off x="3096140" y="3075057"/>
+            <a:ext cx="5064207" cy="707886"/>
+          </a:xfrm>
+          <a:prstGeom prst="rect">
+            <a:avLst/>
+          </a:prstGeom>
+        </p:spPr>
+        <p:txBody>
+          <a:bodyPr wrap="none">
+            <a:spAutoFit/>
+          </a:bodyPr>
+          <a:lstStyle/>
+          <a:p>
+            <a:r>
+              <a:rPr lang="pt-BR" sz="4000" dirty="0"/>
+              <a:t>http://bit.ly/pbi-crush</a:t>
+            </a:r>
+          </a:p>
+        </p:txBody>
+      </p:sp>
+    </p:spTree>
+    <p:extLst>
+      <p:ext uri="{BB962C8B-B14F-4D97-AF65-F5344CB8AC3E}">
+        <p14:creationId xmlns:p14="http://schemas.microsoft.com/office/powerpoint/2010/main" val="2008285525"/>
+      </p:ext>
+    </p:extLst>
+  </p:cSld>
+  <p:clrMapOvr>
+    <a:masterClrMapping/>
+  </p:clrMapOvr>
+</p:sld>
+</file>
+
+<file path=ppt/slides/slide19.xml><?xml version="1.0" encoding="utf-8"?>
+<p:sld xmlns:a="http://schemas.openxmlformats.org/drawingml/2006/main" xmlns:r="http://schemas.openxmlformats.org/officeDocument/2006/relationships" xmlns:p="http://schemas.openxmlformats.org/presentationml/2006/main">
+  <p:cSld>
+    <p:spTree>
+      <p:nvGrpSpPr>
+        <p:cNvPr id="1" name=""/>
+        <p:cNvGrpSpPr/>
+        <p:nvPr/>
+      </p:nvGrpSpPr>
+      <p:grpSpPr>
+        <a:xfrm>
+          <a:off x="0" y="0"/>
+          <a:ext cx="0" cy="0"/>
+          <a:chOff x="0" y="0"/>
+          <a:chExt cx="0" cy="0"/>
+        </a:xfrm>
+      </p:grpSpPr>
+      <p:pic>
+        <p:nvPicPr>
+          <p:cNvPr id="23" name="Picture 2" descr="Image result for power bi"/>
+          <p:cNvPicPr>
+            <a:picLocks noChangeAspect="1" noChangeArrowheads="1"/>
+          </p:cNvPicPr>
+          <p:nvPr/>
+        </p:nvPicPr>
+        <p:blipFill>
+          <a:blip r:embed="rId3" cstate="screen">
+            <a:extLst>
+              <a:ext uri="{28A0092B-C50C-407E-A947-70E740481C1C}">
+                <a14:useLocalDpi xmlns:a14="http://schemas.microsoft.com/office/drawing/2010/main" val="0"/>
+              </a:ext>
+            </a:extLst>
+          </a:blip>
+          <a:srcRect/>
+          <a:stretch>
+            <a:fillRect/>
+          </a:stretch>
+        </p:blipFill>
+        <p:spPr bwMode="auto">
+          <a:xfrm>
+            <a:off x="10391885" y="5812278"/>
+            <a:ext cx="1421327" cy="1045722"/>
+          </a:xfrm>
+          <a:prstGeom prst="rect">
+            <a:avLst/>
+          </a:prstGeom>
+          <a:noFill/>
+          <a:extLst>
+            <a:ext uri="{909E8E84-426E-40DD-AFC4-6F175D3DCCD1}">
+              <a14:hiddenFill xmlns:a14="http://schemas.microsoft.com/office/drawing/2010/main">
+                <a:solidFill>
+                  <a:srgbClr val="FFFFFF"/>
+                </a:solidFill>
+              </a14:hiddenFill>
+            </a:ext>
+          </a:extLst>
+        </p:spPr>
+      </p:pic>
+      <p:sp>
+        <p:nvSpPr>
+          <p:cNvPr id="3" name="Título 2"/>
+          <p:cNvSpPr>
+            <a:spLocks noGrp="1"/>
+          </p:cNvSpPr>
+          <p:nvPr>
+            <p:ph type="title"/>
+          </p:nvPr>
+        </p:nvSpPr>
+        <p:spPr>
+          <a:xfrm>
+            <a:off x="396240" y="319405"/>
+            <a:ext cx="10515600" cy="1325563"/>
+          </a:xfrm>
+        </p:spPr>
+        <p:txBody>
+          <a:bodyPr/>
+          <a:lstStyle/>
+          <a:p>
+            <a:r>
+              <a:rPr lang="pt-BR" dirty="0"/>
+              <a:t>Consumo Facebook API</a:t>
+            </a:r>
+          </a:p>
+        </p:txBody>
+      </p:sp>
+      <p:sp>
+        <p:nvSpPr>
+          <p:cNvPr id="4" name="Retângulo 3"/>
+          <p:cNvSpPr/>
+          <p:nvPr/>
+        </p:nvSpPr>
+        <p:spPr>
+          <a:xfrm>
+            <a:off x="3096140" y="3075057"/>
+            <a:ext cx="4777270" cy="707886"/>
+          </a:xfrm>
+          <a:prstGeom prst="rect">
+            <a:avLst/>
+          </a:prstGeom>
+        </p:spPr>
+        <p:txBody>
+          <a:bodyPr wrap="none">
+            <a:spAutoFit/>
+          </a:bodyPr>
+          <a:lstStyle/>
+          <a:p>
+            <a:r>
+              <a:rPr lang="pt-BR" sz="4000" dirty="0"/>
+              <a:t>http://bit.ly/pbi-face</a:t>
+            </a:r>
+          </a:p>
+        </p:txBody>
+      </p:sp>
+    </p:spTree>
+    <p:extLst>
+      <p:ext uri="{BB962C8B-B14F-4D97-AF65-F5344CB8AC3E}">
+        <p14:creationId xmlns:p14="http://schemas.microsoft.com/office/powerpoint/2010/main" val="904299571"/>
       </p:ext>
     </p:extLst>
   </p:cSld>
@@ -20029,6 +20813,643 @@
     <p:extLst>
       <p:ext uri="{BB962C8B-B14F-4D97-AF65-F5344CB8AC3E}">
         <p14:creationId xmlns:p14="http://schemas.microsoft.com/office/powerpoint/2010/main" val="2139786303"/>
+      </p:ext>
+    </p:extLst>
+  </p:cSld>
+  <p:clrMapOvr>
+    <a:masterClrMapping/>
+  </p:clrMapOvr>
+</p:sld>
+</file>
+
+<file path=ppt/slides/slide20.xml><?xml version="1.0" encoding="utf-8"?>
+<p:sld xmlns:a="http://schemas.openxmlformats.org/drawingml/2006/main" xmlns:r="http://schemas.openxmlformats.org/officeDocument/2006/relationships" xmlns:p="http://schemas.openxmlformats.org/presentationml/2006/main">
+  <p:cSld>
+    <p:spTree>
+      <p:nvGrpSpPr>
+        <p:cNvPr id="1" name=""/>
+        <p:cNvGrpSpPr/>
+        <p:nvPr/>
+      </p:nvGrpSpPr>
+      <p:grpSpPr>
+        <a:xfrm>
+          <a:off x="0" y="0"/>
+          <a:ext cx="0" cy="0"/>
+          <a:chOff x="0" y="0"/>
+          <a:chExt cx="0" cy="0"/>
+        </a:xfrm>
+      </p:grpSpPr>
+      <p:sp>
+        <p:nvSpPr>
+          <p:cNvPr id="7" name="Title 17">
+            <a:extLst>
+              <a:ext uri="{FF2B5EF4-FFF2-40B4-BE49-F238E27FC236}">
+                <a16:creationId xmlns:a16="http://schemas.microsoft.com/office/drawing/2014/main" id="{D87F02AE-3935-4BF1-AE45-717088A140F7}"/>
+              </a:ext>
+            </a:extLst>
+          </p:cNvPr>
+          <p:cNvSpPr>
+            <a:spLocks noGrp="1"/>
+          </p:cNvSpPr>
+          <p:nvPr/>
+        </p:nvSpPr>
+        <p:spPr>
+          <a:xfrm>
+            <a:off x="731006" y="562515"/>
+            <a:ext cx="10800000" cy="720000"/>
+          </a:xfrm>
+          <a:prstGeom prst="rect">
+            <a:avLst/>
+          </a:prstGeom>
+        </p:spPr>
+        <p:txBody>
+          <a:bodyPr vert="horz" lIns="0" tIns="0" rIns="0" bIns="0" rtlCol="0" anchor="ctr">
+            <a:noAutofit/>
+          </a:bodyPr>
+          <a:lstStyle>
+            <a:lvl1pPr algn="l" defTabSz="576026" rtl="0" eaLnBrk="1" latinLnBrk="0" hangingPunct="1">
+              <a:spcBef>
+                <a:spcPct val="0"/>
+              </a:spcBef>
+              <a:buNone/>
+              <a:defRPr sz="4400" kern="1200">
+                <a:solidFill>
+                  <a:schemeClr val="accent1"/>
+                </a:solidFill>
+                <a:latin typeface="+mj-lt"/>
+                <a:ea typeface="+mj-ea"/>
+                <a:cs typeface="+mj-cs"/>
+              </a:defRPr>
+            </a:lvl1pPr>
+          </a:lstStyle>
+          <a:p>
+            <a:r>
+              <a:rPr lang="en-US" sz="3500" spc="-100" dirty="0">
+                <a:ln w="3175">
+                  <a:noFill/>
+                </a:ln>
+                <a:solidFill>
+                  <a:schemeClr val="tx1"/>
+                </a:solidFill>
+              </a:rPr>
+              <a:t>Contatos</a:t>
+            </a:r>
+          </a:p>
+        </p:txBody>
+      </p:sp>
+      <p:sp>
+        <p:nvSpPr>
+          <p:cNvPr id="8" name="Content Placeholder 18">
+            <a:extLst>
+              <a:ext uri="{FF2B5EF4-FFF2-40B4-BE49-F238E27FC236}">
+                <a16:creationId xmlns:a16="http://schemas.microsoft.com/office/drawing/2014/main" id="{E04DF68C-EC3A-43AC-8514-244C372C4802}"/>
+              </a:ext>
+            </a:extLst>
+          </p:cNvPr>
+          <p:cNvSpPr>
+            <a:spLocks noGrp="1"/>
+          </p:cNvSpPr>
+          <p:nvPr/>
+        </p:nvSpPr>
+        <p:spPr>
+          <a:xfrm>
+            <a:off x="785589" y="1615484"/>
+            <a:ext cx="10800000" cy="4680000"/>
+          </a:xfrm>
+          <a:prstGeom prst="rect">
+            <a:avLst/>
+          </a:prstGeom>
+        </p:spPr>
+        <p:txBody>
+          <a:bodyPr vert="horz" lIns="0" tIns="0" rIns="0" bIns="0" rtlCol="0" anchor="t">
+            <a:noAutofit/>
+          </a:bodyPr>
+          <a:lstStyle>
+            <a:lvl1pPr marL="0" indent="0" algn="l" defTabSz="576026" rtl="0" eaLnBrk="1" latinLnBrk="0" hangingPunct="1">
+              <a:spcBef>
+                <a:spcPct val="20000"/>
+              </a:spcBef>
+              <a:buFont typeface="Wingdings" charset="2"/>
+              <a:buNone/>
+              <a:defRPr sz="3600" kern="1200">
+                <a:solidFill>
+                  <a:schemeClr val="tx2"/>
+                </a:solidFill>
+                <a:latin typeface="+mn-lt"/>
+                <a:ea typeface="+mn-ea"/>
+                <a:cs typeface="+mn-cs"/>
+              </a:defRPr>
+            </a:lvl1pPr>
+            <a:lvl2pPr marL="576027" indent="0" algn="l" defTabSz="576026" rtl="0" eaLnBrk="1" latinLnBrk="0" hangingPunct="1">
+              <a:spcBef>
+                <a:spcPct val="20000"/>
+              </a:spcBef>
+              <a:buFont typeface="Wingdings" charset="2"/>
+              <a:buNone/>
+              <a:defRPr sz="3200" kern="1200">
+                <a:solidFill>
+                  <a:srgbClr val="474947"/>
+                </a:solidFill>
+                <a:latin typeface="+mn-lt"/>
+                <a:ea typeface="+mn-ea"/>
+                <a:cs typeface="+mn-cs"/>
+              </a:defRPr>
+            </a:lvl2pPr>
+            <a:lvl3pPr marL="1152053" indent="0" algn="l" defTabSz="576026" rtl="0" eaLnBrk="1" latinLnBrk="0" hangingPunct="1">
+              <a:spcBef>
+                <a:spcPct val="20000"/>
+              </a:spcBef>
+              <a:buFont typeface="Wingdings" charset="2"/>
+              <a:buNone/>
+              <a:defRPr sz="2400" kern="1200">
+                <a:solidFill>
+                  <a:srgbClr val="474947"/>
+                </a:solidFill>
+                <a:latin typeface="+mn-lt"/>
+                <a:ea typeface="+mn-ea"/>
+                <a:cs typeface="+mn-cs"/>
+              </a:defRPr>
+            </a:lvl3pPr>
+            <a:lvl4pPr marL="1728079" indent="0" algn="l" defTabSz="576026" rtl="0" eaLnBrk="1" latinLnBrk="0" hangingPunct="1">
+              <a:spcBef>
+                <a:spcPct val="20000"/>
+              </a:spcBef>
+              <a:buFont typeface="Wingdings" charset="2"/>
+              <a:buNone/>
+              <a:defRPr sz="2400" kern="1200">
+                <a:solidFill>
+                  <a:srgbClr val="474947"/>
+                </a:solidFill>
+                <a:latin typeface="+mn-lt"/>
+                <a:ea typeface="+mn-ea"/>
+                <a:cs typeface="+mn-cs"/>
+              </a:defRPr>
+            </a:lvl4pPr>
+            <a:lvl5pPr marL="2304105" indent="0" algn="l" defTabSz="576026" rtl="0" eaLnBrk="1" latinLnBrk="0" hangingPunct="1">
+              <a:spcBef>
+                <a:spcPct val="20000"/>
+              </a:spcBef>
+              <a:buFont typeface="Wingdings" charset="2"/>
+              <a:buNone/>
+              <a:defRPr sz="2000" kern="1200">
+                <a:solidFill>
+                  <a:srgbClr val="474947"/>
+                </a:solidFill>
+                <a:latin typeface="+mn-lt"/>
+                <a:ea typeface="+mn-ea"/>
+                <a:cs typeface="+mn-cs"/>
+              </a:defRPr>
+            </a:lvl5pPr>
+            <a:lvl6pPr marL="3168145" indent="-288013" algn="l" defTabSz="576026" rtl="0" eaLnBrk="1" latinLnBrk="0" hangingPunct="1">
+              <a:spcBef>
+                <a:spcPct val="20000"/>
+              </a:spcBef>
+              <a:buFont typeface="Arial"/>
+              <a:buChar char="•"/>
+              <a:defRPr sz="2520" kern="1200">
+                <a:solidFill>
+                  <a:schemeClr val="tx1"/>
+                </a:solidFill>
+                <a:latin typeface="+mn-lt"/>
+                <a:ea typeface="+mn-ea"/>
+                <a:cs typeface="+mn-cs"/>
+              </a:defRPr>
+            </a:lvl6pPr>
+            <a:lvl7pPr marL="3744171" indent="-288013" algn="l" defTabSz="576026" rtl="0" eaLnBrk="1" latinLnBrk="0" hangingPunct="1">
+              <a:spcBef>
+                <a:spcPct val="20000"/>
+              </a:spcBef>
+              <a:buFont typeface="Arial"/>
+              <a:buChar char="•"/>
+              <a:defRPr sz="2520" kern="1200">
+                <a:solidFill>
+                  <a:schemeClr val="tx1"/>
+                </a:solidFill>
+                <a:latin typeface="+mn-lt"/>
+                <a:ea typeface="+mn-ea"/>
+                <a:cs typeface="+mn-cs"/>
+              </a:defRPr>
+            </a:lvl7pPr>
+            <a:lvl8pPr marL="4320197" indent="-288013" algn="l" defTabSz="576026" rtl="0" eaLnBrk="1" latinLnBrk="0" hangingPunct="1">
+              <a:spcBef>
+                <a:spcPct val="20000"/>
+              </a:spcBef>
+              <a:buFont typeface="Arial"/>
+              <a:buChar char="•"/>
+              <a:defRPr sz="2520" kern="1200">
+                <a:solidFill>
+                  <a:schemeClr val="tx1"/>
+                </a:solidFill>
+                <a:latin typeface="+mn-lt"/>
+                <a:ea typeface="+mn-ea"/>
+                <a:cs typeface="+mn-cs"/>
+              </a:defRPr>
+            </a:lvl8pPr>
+            <a:lvl9pPr marL="4896223" indent="-288013" algn="l" defTabSz="576026" rtl="0" eaLnBrk="1" latinLnBrk="0" hangingPunct="1">
+              <a:spcBef>
+                <a:spcPct val="20000"/>
+              </a:spcBef>
+              <a:buFont typeface="Arial"/>
+              <a:buChar char="•"/>
+              <a:defRPr sz="2520" kern="1200">
+                <a:solidFill>
+                  <a:schemeClr val="tx1"/>
+                </a:solidFill>
+                <a:latin typeface="+mn-lt"/>
+                <a:ea typeface="+mn-ea"/>
+                <a:cs typeface="+mn-cs"/>
+              </a:defRPr>
+            </a:lvl9pPr>
+          </a:lstStyle>
+          <a:p>
+            <a:pPr marL="342900" indent="-342900">
+              <a:buFont typeface="Wingdings" panose="05000000000000000000" pitchFamily="2" charset="2"/>
+              <a:buChar char="ü"/>
+            </a:pPr>
+            <a:endParaRPr lang="pt-BR" sz="2000" dirty="0">
+              <a:solidFill>
+                <a:schemeClr val="tx1"/>
+              </a:solidFill>
+            </a:endParaRPr>
+          </a:p>
+          <a:p>
+            <a:r>
+              <a:rPr lang="en-US" sz="2000" dirty="0">
+                <a:solidFill>
+                  <a:schemeClr val="tx1"/>
+                </a:solidFill>
+              </a:rPr>
+              <a:t>            medium.com/@_orlandogomes</a:t>
+            </a:r>
+          </a:p>
+          <a:p>
+            <a:endParaRPr lang="en-US" sz="2000" dirty="0">
+              <a:solidFill>
+                <a:schemeClr val="tx1"/>
+              </a:solidFill>
+            </a:endParaRPr>
+          </a:p>
+          <a:p>
+            <a:r>
+              <a:rPr lang="pt-BR" sz="2000" b="1" dirty="0">
+                <a:solidFill>
+                  <a:schemeClr val="tx1"/>
+                </a:solidFill>
+              </a:rPr>
+              <a:t>           </a:t>
+            </a:r>
+            <a:r>
+              <a:rPr lang="pt-BR" sz="2000" dirty="0">
+                <a:solidFill>
+                  <a:schemeClr val="tx1"/>
+                </a:solidFill>
+              </a:rPr>
+              <a:t> </a:t>
+            </a:r>
+          </a:p>
+          <a:p>
+            <a:r>
+              <a:rPr lang="pt-BR" sz="2000" dirty="0">
+                <a:solidFill>
+                  <a:schemeClr val="tx1"/>
+                </a:solidFill>
+              </a:rPr>
+              <a:t>            linkedin.com/in/</a:t>
+            </a:r>
+            <a:r>
+              <a:rPr lang="pt-BR" sz="2000" dirty="0" err="1">
+                <a:solidFill>
+                  <a:schemeClr val="tx1"/>
+                </a:solidFill>
+              </a:rPr>
+              <a:t>orlandomariano</a:t>
+            </a:r>
+            <a:endParaRPr lang="pt-BR" sz="2000" dirty="0">
+              <a:solidFill>
+                <a:schemeClr val="tx1"/>
+              </a:solidFill>
+            </a:endParaRPr>
+          </a:p>
+          <a:p>
+            <a:endParaRPr lang="pt-BR" sz="2000" b="1" dirty="0">
+              <a:solidFill>
+                <a:schemeClr val="tx1"/>
+              </a:solidFill>
+            </a:endParaRPr>
+          </a:p>
+          <a:p>
+            <a:endParaRPr lang="pt-BR" sz="2000" b="1" dirty="0">
+              <a:solidFill>
+                <a:schemeClr val="tx1"/>
+              </a:solidFill>
+            </a:endParaRPr>
+          </a:p>
+          <a:p>
+            <a:r>
+              <a:rPr lang="pt-BR" sz="2000" b="1" dirty="0">
+                <a:solidFill>
+                  <a:schemeClr val="tx1"/>
+                </a:solidFill>
+              </a:rPr>
+              <a:t>            </a:t>
+            </a:r>
+            <a:r>
+              <a:rPr lang="pt-BR" sz="2000" dirty="0">
+                <a:solidFill>
+                  <a:schemeClr val="tx1"/>
+                </a:solidFill>
+              </a:rPr>
+              <a:t>facebook.com/</a:t>
+            </a:r>
+            <a:r>
+              <a:rPr lang="pt-BR" sz="2000" dirty="0" err="1">
+                <a:solidFill>
+                  <a:schemeClr val="tx1"/>
+                </a:solidFill>
+              </a:rPr>
+              <a:t>page.orlandomaiuri</a:t>
+            </a:r>
+            <a:endParaRPr lang="pt-BR" sz="2000" dirty="0">
+              <a:solidFill>
+                <a:schemeClr val="tx1"/>
+              </a:solidFill>
+            </a:endParaRPr>
+          </a:p>
+          <a:p>
+            <a:endParaRPr lang="pt-BR" sz="2000" b="1" dirty="0">
+              <a:solidFill>
+                <a:schemeClr val="tx1"/>
+              </a:solidFill>
+            </a:endParaRPr>
+          </a:p>
+          <a:p>
+            <a:r>
+              <a:rPr lang="pt-BR" sz="2000" dirty="0">
+                <a:solidFill>
+                  <a:schemeClr val="tx1"/>
+                </a:solidFill>
+              </a:rPr>
+              <a:t>               </a:t>
+            </a:r>
+          </a:p>
+          <a:p>
+            <a:r>
+              <a:rPr lang="pt-BR" sz="2000" dirty="0">
+                <a:solidFill>
+                  <a:schemeClr val="tx1"/>
+                </a:solidFill>
+              </a:rPr>
+              <a:t>            orlando.mariano@studentpartner.com</a:t>
+            </a:r>
+          </a:p>
+          <a:p>
+            <a:endParaRPr lang="en-US" sz="2000" dirty="0">
+              <a:solidFill>
+                <a:schemeClr val="tx1"/>
+              </a:solidFill>
+            </a:endParaRPr>
+          </a:p>
+        </p:txBody>
+      </p:sp>
+      <p:pic>
+        <p:nvPicPr>
+          <p:cNvPr id="9" name="Imagem 1">
+            <a:extLst>
+              <a:ext uri="{FF2B5EF4-FFF2-40B4-BE49-F238E27FC236}">
+                <a16:creationId xmlns:a16="http://schemas.microsoft.com/office/drawing/2014/main" id="{5B6A0637-A5DF-4DAE-BDE6-FF46DB984215}"/>
+              </a:ext>
+            </a:extLst>
+          </p:cNvPr>
+          <p:cNvPicPr>
+            <a:picLocks noChangeAspect="1"/>
+          </p:cNvPicPr>
+          <p:nvPr/>
+        </p:nvPicPr>
+        <p:blipFill>
+          <a:blip r:embed="rId3"/>
+          <a:stretch>
+            <a:fillRect/>
+          </a:stretch>
+        </p:blipFill>
+        <p:spPr>
+          <a:xfrm>
+            <a:off x="606411" y="1615484"/>
+            <a:ext cx="1019592" cy="964914"/>
+          </a:xfrm>
+          <a:prstGeom prst="rect">
+            <a:avLst/>
+          </a:prstGeom>
+        </p:spPr>
+      </p:pic>
+      <p:pic>
+        <p:nvPicPr>
+          <p:cNvPr id="10" name="Imagem 2">
+            <a:extLst>
+              <a:ext uri="{FF2B5EF4-FFF2-40B4-BE49-F238E27FC236}">
+                <a16:creationId xmlns:a16="http://schemas.microsoft.com/office/drawing/2014/main" id="{59E7FEB3-7A06-44F4-BB66-DD2774C44D5A}"/>
+              </a:ext>
+            </a:extLst>
+          </p:cNvPr>
+          <p:cNvPicPr>
+            <a:picLocks noChangeAspect="1"/>
+          </p:cNvPicPr>
+          <p:nvPr/>
+        </p:nvPicPr>
+        <p:blipFill>
+          <a:blip r:embed="rId4"/>
+          <a:stretch>
+            <a:fillRect/>
+          </a:stretch>
+        </p:blipFill>
+        <p:spPr>
+          <a:xfrm>
+            <a:off x="785589" y="2858993"/>
+            <a:ext cx="664212" cy="666042"/>
+          </a:xfrm>
+          <a:prstGeom prst="rect">
+            <a:avLst/>
+          </a:prstGeom>
+        </p:spPr>
+      </p:pic>
+      <p:pic>
+        <p:nvPicPr>
+          <p:cNvPr id="11" name="Imagem 3">
+            <a:extLst>
+              <a:ext uri="{FF2B5EF4-FFF2-40B4-BE49-F238E27FC236}">
+                <a16:creationId xmlns:a16="http://schemas.microsoft.com/office/drawing/2014/main" id="{A0F57F29-7580-4307-B672-3D8A4DAF776C}"/>
+              </a:ext>
+            </a:extLst>
+          </p:cNvPr>
+          <p:cNvPicPr>
+            <a:picLocks noChangeAspect="1"/>
+          </p:cNvPicPr>
+          <p:nvPr/>
+        </p:nvPicPr>
+        <p:blipFill>
+          <a:blip r:embed="rId5"/>
+          <a:stretch>
+            <a:fillRect/>
+          </a:stretch>
+        </p:blipFill>
+        <p:spPr>
+          <a:xfrm>
+            <a:off x="785589" y="3955484"/>
+            <a:ext cx="664212" cy="660572"/>
+          </a:xfrm>
+          <a:prstGeom prst="rect">
+            <a:avLst/>
+          </a:prstGeom>
+        </p:spPr>
+      </p:pic>
+      <p:pic>
+        <p:nvPicPr>
+          <p:cNvPr id="12" name="Picture 11" descr="Image result for email">
+            <a:extLst>
+              <a:ext uri="{FF2B5EF4-FFF2-40B4-BE49-F238E27FC236}">
+                <a16:creationId xmlns:a16="http://schemas.microsoft.com/office/drawing/2014/main" id="{046CCAA8-E9C0-4876-A639-3B793FB054F4}"/>
+              </a:ext>
+            </a:extLst>
+          </p:cNvPr>
+          <p:cNvPicPr>
+            <a:picLocks noChangeAspect="1" noChangeArrowheads="1"/>
+          </p:cNvPicPr>
+          <p:nvPr/>
+        </p:nvPicPr>
+        <p:blipFill>
+          <a:blip r:embed="rId6">
+            <a:extLst>
+              <a:ext uri="{28A0092B-C50C-407E-A947-70E740481C1C}">
+                <a14:useLocalDpi xmlns:a14="http://schemas.microsoft.com/office/drawing/2010/main" val="0"/>
+              </a:ext>
+            </a:extLst>
+          </a:blip>
+          <a:srcRect/>
+          <a:stretch>
+            <a:fillRect/>
+          </a:stretch>
+        </p:blipFill>
+        <p:spPr bwMode="auto">
+          <a:xfrm>
+            <a:off x="785589" y="5046505"/>
+            <a:ext cx="664212" cy="664212"/>
+          </a:xfrm>
+          <a:prstGeom prst="rect">
+            <a:avLst/>
+          </a:prstGeom>
+          <a:noFill/>
+          <a:extLst>
+            <a:ext uri="{909E8E84-426E-40DD-AFC4-6F175D3DCCD1}">
+              <a14:hiddenFill xmlns:a14="http://schemas.microsoft.com/office/drawing/2010/main">
+                <a:solidFill>
+                  <a:srgbClr val="FFFFFF"/>
+                </a:solidFill>
+              </a14:hiddenFill>
+            </a:ext>
+          </a:extLst>
+        </p:spPr>
+      </p:pic>
+    </p:spTree>
+    <p:extLst>
+      <p:ext uri="{BB962C8B-B14F-4D97-AF65-F5344CB8AC3E}">
+        <p14:creationId xmlns:p14="http://schemas.microsoft.com/office/powerpoint/2010/main" val="1575949421"/>
+      </p:ext>
+    </p:extLst>
+  </p:cSld>
+  <p:clrMapOvr>
+    <a:masterClrMapping/>
+  </p:clrMapOvr>
+</p:sld>
+</file>
+
+<file path=ppt/slides/slide21.xml><?xml version="1.0" encoding="utf-8"?>
+<p:sld xmlns:a="http://schemas.openxmlformats.org/drawingml/2006/main" xmlns:r="http://schemas.openxmlformats.org/officeDocument/2006/relationships" xmlns:p="http://schemas.openxmlformats.org/presentationml/2006/main">
+  <p:cSld>
+    <p:spTree>
+      <p:nvGrpSpPr>
+        <p:cNvPr id="1" name=""/>
+        <p:cNvGrpSpPr/>
+        <p:nvPr/>
+      </p:nvGrpSpPr>
+      <p:grpSpPr>
+        <a:xfrm>
+          <a:off x="0" y="0"/>
+          <a:ext cx="0" cy="0"/>
+          <a:chOff x="0" y="0"/>
+          <a:chExt cx="0" cy="0"/>
+        </a:xfrm>
+      </p:grpSpPr>
+      <p:sp>
+        <p:nvSpPr>
+          <p:cNvPr id="2" name="Title 1"/>
+          <p:cNvSpPr>
+            <a:spLocks noGrp="1"/>
+          </p:cNvSpPr>
+          <p:nvPr>
+            <p:ph type="title"/>
+          </p:nvPr>
+        </p:nvSpPr>
+        <p:spPr>
+          <a:xfrm>
+            <a:off x="586948" y="2513965"/>
+            <a:ext cx="10515600" cy="1325563"/>
+          </a:xfrm>
+        </p:spPr>
+        <p:txBody>
+          <a:bodyPr/>
+          <a:lstStyle/>
+          <a:p>
+            <a:r>
+              <a:rPr lang="en-US" dirty="0"/>
+              <a:t>Obrigado =D</a:t>
+            </a:r>
+          </a:p>
+        </p:txBody>
+      </p:sp>
+      <p:pic>
+        <p:nvPicPr>
+          <p:cNvPr id="23" name="Picture 2" descr="Image result for power bi"/>
+          <p:cNvPicPr>
+            <a:picLocks noChangeAspect="1" noChangeArrowheads="1"/>
+          </p:cNvPicPr>
+          <p:nvPr/>
+        </p:nvPicPr>
+        <p:blipFill>
+          <a:blip r:embed="rId3" cstate="screen">
+            <a:extLst>
+              <a:ext uri="{28A0092B-C50C-407E-A947-70E740481C1C}">
+                <a14:useLocalDpi xmlns:a14="http://schemas.microsoft.com/office/drawing/2010/main" val="0"/>
+              </a:ext>
+            </a:extLst>
+          </a:blip>
+          <a:srcRect/>
+          <a:stretch>
+            <a:fillRect/>
+          </a:stretch>
+        </p:blipFill>
+        <p:spPr bwMode="auto">
+          <a:xfrm>
+            <a:off x="10391885" y="5812278"/>
+            <a:ext cx="1421327" cy="1045722"/>
+          </a:xfrm>
+          <a:prstGeom prst="rect">
+            <a:avLst/>
+          </a:prstGeom>
+          <a:noFill/>
+          <a:extLst>
+            <a:ext uri="{909E8E84-426E-40DD-AFC4-6F175D3DCCD1}">
+              <a14:hiddenFill xmlns:a14="http://schemas.microsoft.com/office/drawing/2010/main">
+                <a:solidFill>
+                  <a:srgbClr val="FFFFFF"/>
+                </a:solidFill>
+              </a14:hiddenFill>
+            </a:ext>
+          </a:extLst>
+        </p:spPr>
+      </p:pic>
+    </p:spTree>
+    <p:extLst>
+      <p:ext uri="{BB962C8B-B14F-4D97-AF65-F5344CB8AC3E}">
+        <p14:creationId xmlns:p14="http://schemas.microsoft.com/office/powerpoint/2010/main" val="2222928756"/>
       </p:ext>
     </p:extLst>
   </p:cSld>

</xml_diff>

<commit_message>
alteracao slide para madrugada
</commit_message>
<xml_diff>
--- a/Apresentação/MadrugadaNerdzao_Trilha PBI.pptx
+++ b/Apresentação/MadrugadaNerdzao_Trilha PBI.pptx
@@ -9,7 +9,7 @@
     <p:notesMasterId r:id="rId24"/>
   </p:notesMasterIdLst>
   <p:sldIdLst>
-    <p:sldId id="256" r:id="rId3"/>
+    <p:sldId id="348" r:id="rId3"/>
     <p:sldId id="327" r:id="rId4"/>
     <p:sldId id="335" r:id="rId5"/>
     <p:sldId id="336" r:id="rId6"/>
@@ -229,7 +229,7 @@
           <a:p>
             <a:fld id="{49B60EF2-7028-489F-85D8-FE86CD7CF2A0}" type="datetimeFigureOut">
               <a:rPr lang="en-US" smtClean="0"/>
-              <a:t>4/9/2019</a:t>
+              <a:t>4/10/2019</a:t>
             </a:fld>
             <a:endParaRPr lang="en-US" dirty="0"/>
           </a:p>
@@ -3306,7 +3306,7 @@
           <a:p>
             <a:fld id="{0459C166-16D3-4A25-A2F8-C51E0E346B22}" type="datetimeFigureOut">
               <a:rPr lang="en-US" smtClean="0"/>
-              <a:t>4/9/2019</a:t>
+              <a:t>4/10/2019</a:t>
             </a:fld>
             <a:endParaRPr lang="en-US" dirty="0"/>
           </a:p>
@@ -3401,7 +3401,7 @@
           <a:p>
             <a:fld id="{0459C166-16D3-4A25-A2F8-C51E0E346B22}" type="datetimeFigureOut">
               <a:rPr lang="en-US" smtClean="0"/>
-              <a:t>4/9/2019</a:t>
+              <a:t>4/10/2019</a:t>
             </a:fld>
             <a:endParaRPr lang="en-US" dirty="0"/>
           </a:p>
@@ -3676,7 +3676,7 @@
           <a:p>
             <a:fld id="{0459C166-16D3-4A25-A2F8-C51E0E346B22}" type="datetimeFigureOut">
               <a:rPr lang="en-US" smtClean="0"/>
-              <a:t>4/9/2019</a:t>
+              <a:t>4/10/2019</a:t>
             </a:fld>
             <a:endParaRPr lang="en-US" dirty="0"/>
           </a:p>
@@ -3928,7 +3928,7 @@
           <a:p>
             <a:fld id="{0459C166-16D3-4A25-A2F8-C51E0E346B22}" type="datetimeFigureOut">
               <a:rPr lang="en-US" smtClean="0"/>
-              <a:t>4/9/2019</a:t>
+              <a:t>4/10/2019</a:t>
             </a:fld>
             <a:endParaRPr lang="en-US" dirty="0"/>
           </a:p>
@@ -4096,7 +4096,7 @@
           <a:p>
             <a:fld id="{0459C166-16D3-4A25-A2F8-C51E0E346B22}" type="datetimeFigureOut">
               <a:rPr lang="en-US" smtClean="0"/>
-              <a:t>4/9/2019</a:t>
+              <a:t>4/10/2019</a:t>
             </a:fld>
             <a:endParaRPr lang="en-US" dirty="0"/>
           </a:p>
@@ -4274,7 +4274,7 @@
           <a:p>
             <a:fld id="{0459C166-16D3-4A25-A2F8-C51E0E346B22}" type="datetimeFigureOut">
               <a:rPr lang="en-US" smtClean="0"/>
-              <a:t>4/9/2019</a:t>
+              <a:t>4/10/2019</a:t>
             </a:fld>
             <a:endParaRPr lang="en-US" dirty="0"/>
           </a:p>
@@ -6179,7 +6179,7 @@
           <a:p>
             <a:fld id="{0459C166-16D3-4A25-A2F8-C51E0E346B22}" type="datetimeFigureOut">
               <a:rPr lang="en-US" smtClean="0"/>
-              <a:t>4/9/2019</a:t>
+              <a:t>4/10/2019</a:t>
             </a:fld>
             <a:endParaRPr lang="en-US" dirty="0"/>
           </a:p>
@@ -11743,7 +11743,7 @@
             <a:fld id="{0459C166-16D3-4A25-A2F8-C51E0E346B22}" type="datetimeFigureOut">
               <a:rPr lang="en-US" smtClean="0"/>
               <a:pPr/>
-              <a:t>4/9/2019</a:t>
+              <a:t>4/10/2019</a:t>
             </a:fld>
             <a:endParaRPr lang="en-US" dirty="0"/>
           </a:p>
@@ -14961,7 +14961,7 @@
             <a:fld id="{96DFF08F-DC6B-4601-B491-B0F83F6DD2DA}" type="datetimeFigureOut">
               <a:rPr lang="en-US" dirty="0"/>
               <a:pPr/>
-              <a:t>4/9/2019</a:t>
+              <a:t>4/10/2019</a:t>
             </a:fld>
             <a:endParaRPr lang="en-US" dirty="0"/>
           </a:p>
@@ -15836,7 +15836,7 @@
           <a:p>
             <a:fld id="{0459C166-16D3-4A25-A2F8-C51E0E346B22}" type="datetimeFigureOut">
               <a:rPr lang="en-US" smtClean="0"/>
-              <a:t>4/9/2019</a:t>
+              <a:t>4/10/2019</a:t>
             </a:fld>
             <a:endParaRPr lang="en-US" dirty="0"/>
           </a:p>
@@ -16200,7 +16200,7 @@
           <a:p>
             <a:fld id="{0459C166-16D3-4A25-A2F8-C51E0E346B22}" type="datetimeFigureOut">
               <a:rPr lang="en-US" smtClean="0"/>
-              <a:t>4/9/2019</a:t>
+              <a:t>4/10/2019</a:t>
             </a:fld>
             <a:endParaRPr lang="en-US" dirty="0"/>
           </a:p>
@@ -16317,7 +16317,7 @@
           <a:p>
             <a:fld id="{0459C166-16D3-4A25-A2F8-C51E0E346B22}" type="datetimeFigureOut">
               <a:rPr lang="en-US" smtClean="0"/>
-              <a:t>4/9/2019</a:t>
+              <a:t>4/10/2019</a:t>
             </a:fld>
             <a:endParaRPr lang="en-US" dirty="0"/>
           </a:p>
@@ -16528,7 +16528,7 @@
           <a:p>
             <a:fld id="{0459C166-16D3-4A25-A2F8-C51E0E346B22}" type="datetimeFigureOut">
               <a:rPr lang="en-US" smtClean="0"/>
-              <a:t>4/9/2019</a:t>
+              <a:t>4/10/2019</a:t>
             </a:fld>
             <a:endParaRPr lang="en-US" dirty="0"/>
           </a:p>
@@ -17796,6 +17796,100 @@
           <a:chExt cx="0" cy="0"/>
         </a:xfrm>
       </p:grpSpPr>
+      <p:sp>
+        <p:nvSpPr>
+          <p:cNvPr id="2" name="Título 1"/>
+          <p:cNvSpPr>
+            <a:spLocks noGrp="1"/>
+          </p:cNvSpPr>
+          <p:nvPr>
+            <p:ph type="ctrTitle"/>
+          </p:nvPr>
+        </p:nvSpPr>
+        <p:spPr>
+          <a:xfrm>
+            <a:off x="189159" y="5048960"/>
+            <a:ext cx="5709145" cy="1463040"/>
+          </a:xfrm>
+        </p:spPr>
+        <p:txBody>
+          <a:bodyPr>
+            <a:normAutofit/>
+          </a:bodyPr>
+          <a:lstStyle/>
+          <a:p>
+            <a:pPr algn="l"/>
+            <a:r>
+              <a:rPr lang="pt-BR" sz="2300" cap="all" spc="-150" dirty="0">
+                <a:solidFill>
+                  <a:schemeClr val="tx1">
+                    <a:lumMod val="90000"/>
+                    <a:lumOff val="10000"/>
+                  </a:schemeClr>
+                </a:solidFill>
+                <a:latin typeface="+mn-lt"/>
+                <a:ea typeface="+mj-ea"/>
+                <a:cs typeface="+mj-cs"/>
+              </a:rPr>
+              <a:t>Viviane Martins</a:t>
+            </a:r>
+            <a:br>
+              <a:rPr lang="pt-BR" sz="2300" cap="all" spc="-150" dirty="0">
+                <a:solidFill>
+                  <a:schemeClr val="tx1">
+                    <a:lumMod val="90000"/>
+                    <a:lumOff val="10000"/>
+                  </a:schemeClr>
+                </a:solidFill>
+                <a:latin typeface="+mn-lt"/>
+                <a:ea typeface="+mj-ea"/>
+                <a:cs typeface="+mj-cs"/>
+              </a:rPr>
+            </a:br>
+            <a:r>
+              <a:rPr lang="pt-BR" sz="2300" cap="all" spc="-150" dirty="0">
+                <a:solidFill>
+                  <a:schemeClr val="tx1">
+                    <a:lumMod val="90000"/>
+                    <a:lumOff val="10000"/>
+                  </a:schemeClr>
+                </a:solidFill>
+                <a:latin typeface="+mn-lt"/>
+                <a:ea typeface="+mj-ea"/>
+                <a:cs typeface="+mj-cs"/>
+              </a:rPr>
+              <a:t>VBA na Veia</a:t>
+            </a:r>
+            <a:br>
+              <a:rPr lang="pt-BR" sz="2300" cap="all" spc="-150" dirty="0">
+                <a:solidFill>
+                  <a:schemeClr val="tx1">
+                    <a:lumMod val="90000"/>
+                    <a:lumOff val="10000"/>
+                  </a:schemeClr>
+                </a:solidFill>
+                <a:latin typeface="+mn-lt"/>
+                <a:ea typeface="+mj-ea"/>
+                <a:cs typeface="+mj-cs"/>
+              </a:rPr>
+            </a:br>
+            <a:r>
+              <a:rPr lang="pt-BR" sz="2300" cap="all" spc="-150" dirty="0">
+                <a:solidFill>
+                  <a:schemeClr val="tx1">
+                    <a:lumMod val="90000"/>
+                    <a:lumOff val="10000"/>
+                  </a:schemeClr>
+                </a:solidFill>
+                <a:latin typeface="+mn-lt"/>
+                <a:ea typeface="+mj-ea"/>
+                <a:cs typeface="+mj-cs"/>
+              </a:rPr>
+              <a:t>facebook.com/VBANaVeia.Oficial</a:t>
+            </a:r>
+          </a:p>
+        </p:txBody>
+      </p:sp>
       <p:pic>
         <p:nvPicPr>
           <p:cNvPr id="12" name="Picture 11">
@@ -17862,7 +17956,7 @@
                 </a:solidFill>
                 <a:latin typeface="+mj-lt"/>
               </a:rPr>
-              <a:t>School of AI São Paulo</a:t>
+              <a:t>Madrugada Nerdzão </a:t>
             </a:r>
             <a:br>
               <a:rPr lang="pt-BR" sz="7000" dirty="0">
@@ -17900,7 +17994,7 @@
         </p:nvSpPr>
         <p:spPr>
           <a:xfrm>
-            <a:off x="104775" y="4972759"/>
+            <a:off x="6931922" y="5048960"/>
             <a:ext cx="6102551" cy="1463040"/>
           </a:xfrm>
           <a:prstGeom prst="rect">
@@ -17950,16 +18044,7 @@
               <a:rPr lang="pt-BR" sz="2300" spc="-150" dirty="0">
                 <a:latin typeface="+mn-lt"/>
               </a:rPr>
-              <a:t>Microsoft MVP Data Platform</a:t>
-            </a:r>
-          </a:p>
-          <a:p>
-            <a:pPr algn="l"/>
-            <a:r>
-              <a:rPr lang="pt-BR" sz="2300" spc="-150" dirty="0">
-                <a:latin typeface="+mn-lt"/>
-              </a:rPr>
-              <a:t>Microsoft Student Partner</a:t>
+              <a:t>Microsoft MVP/MSP</a:t>
             </a:r>
             <a:br>
               <a:rPr lang="pt-BR" sz="2300" spc="-150" dirty="0">
@@ -17977,15 +18062,15 @@
       </p:sp>
       <p:pic>
         <p:nvPicPr>
-          <p:cNvPr id="10" name="Picture 2" descr="Image result for mvp logo ms">
+          <p:cNvPr id="6" name="Picture 5">
             <a:extLst>
               <a:ext uri="{FF2B5EF4-FFF2-40B4-BE49-F238E27FC236}">
-                <a16:creationId xmlns:a16="http://schemas.microsoft.com/office/drawing/2014/main" id="{D6C315D7-D3BF-449E-A18E-3B06BE99E01D}"/>
+                <a16:creationId xmlns:a16="http://schemas.microsoft.com/office/drawing/2014/main" id="{DB331064-BD6A-4982-9B2F-E25988421B2E}"/>
               </a:ext>
             </a:extLst>
           </p:cNvPr>
           <p:cNvPicPr>
-            <a:picLocks noChangeAspect="1" noChangeArrowheads="1"/>
+            <a:picLocks noChangeAspect="1"/>
           </p:cNvPicPr>
           <p:nvPr/>
         </p:nvPicPr>
@@ -17997,37 +18082,26 @@
               </a:ext>
             </a:extLst>
           </a:blip>
-          <a:srcRect/>
           <a:stretch>
             <a:fillRect/>
           </a:stretch>
         </p:blipFill>
-        <p:spPr bwMode="auto">
+        <p:spPr>
           <a:xfrm>
-            <a:off x="5336033" y="5222532"/>
-            <a:ext cx="2388068" cy="963495"/>
+            <a:off x="4772037" y="5209076"/>
+            <a:ext cx="976040" cy="974034"/>
           </a:xfrm>
           <a:prstGeom prst="rect">
             <a:avLst/>
           </a:prstGeom>
-          <a:noFill/>
-          <a:extLst>
-            <a:ext uri="{909E8E84-426E-40DD-AFC4-6F175D3DCCD1}">
-              <a14:hiddenFill xmlns:a14="http://schemas.microsoft.com/office/drawing/2010/main">
-                <a:solidFill>
-                  <a:srgbClr val="FFFFFF"/>
-                </a:solidFill>
-              </a14:hiddenFill>
-            </a:ext>
-          </a:extLst>
         </p:spPr>
       </p:pic>
       <p:pic>
         <p:nvPicPr>
-          <p:cNvPr id="11" name="Picture 2" descr="Image result for microsoft student partners">
+          <p:cNvPr id="1026" name="Picture 2" descr="Image result for mvp logo ms">
             <a:extLst>
               <a:ext uri="{FF2B5EF4-FFF2-40B4-BE49-F238E27FC236}">
-                <a16:creationId xmlns:a16="http://schemas.microsoft.com/office/drawing/2014/main" id="{CB88257B-A06C-4698-ACC1-A2AB04A91ED3}"/>
+                <a16:creationId xmlns:a16="http://schemas.microsoft.com/office/drawing/2014/main" id="{B7F8AD80-3C60-47F5-8AB7-75993067CD91}"/>
               </a:ext>
             </a:extLst>
           </p:cNvPr>
@@ -18051,8 +18125,8 @@
         </p:blipFill>
         <p:spPr bwMode="auto">
           <a:xfrm>
-            <a:off x="9567472" y="5042063"/>
-            <a:ext cx="1271304" cy="1271304"/>
+            <a:off x="6006318" y="5121595"/>
+            <a:ext cx="725682" cy="1148996"/>
           </a:xfrm>
           <a:prstGeom prst="rect">
             <a:avLst/>
@@ -18069,46 +18143,10 @@
           </a:extLst>
         </p:spPr>
       </p:pic>
-      <p:pic>
-        <p:nvPicPr>
-          <p:cNvPr id="14" name="Picture 13">
-            <a:extLst>
-              <a:ext uri="{FF2B5EF4-FFF2-40B4-BE49-F238E27FC236}">
-                <a16:creationId xmlns:a16="http://schemas.microsoft.com/office/drawing/2014/main" id="{36CBD41C-2572-4EBB-9BDE-A6AE863E099A}"/>
-              </a:ext>
-            </a:extLst>
-          </p:cNvPr>
-          <p:cNvPicPr>
-            <a:picLocks noChangeAspect="1"/>
-          </p:cNvPicPr>
-          <p:nvPr/>
-        </p:nvPicPr>
-        <p:blipFill>
-          <a:blip r:embed="rId6">
-            <a:extLst>
-              <a:ext uri="{28A0092B-C50C-407E-A947-70E740481C1C}">
-                <a14:useLocalDpi xmlns:a14="http://schemas.microsoft.com/office/drawing/2010/main" val="0"/>
-              </a:ext>
-            </a:extLst>
-          </a:blip>
-          <a:stretch>
-            <a:fillRect/>
-          </a:stretch>
-        </p:blipFill>
-        <p:spPr>
-          <a:xfrm>
-            <a:off x="8278089" y="5164497"/>
-            <a:ext cx="1151236" cy="1148870"/>
-          </a:xfrm>
-          <a:prstGeom prst="rect">
-            <a:avLst/>
-          </a:prstGeom>
-        </p:spPr>
-      </p:pic>
     </p:spTree>
     <p:extLst>
       <p:ext uri="{BB962C8B-B14F-4D97-AF65-F5344CB8AC3E}">
-        <p14:creationId xmlns:p14="http://schemas.microsoft.com/office/powerpoint/2010/main" val="1694233516"/>
+        <p14:creationId xmlns:p14="http://schemas.microsoft.com/office/powerpoint/2010/main" val="606311317"/>
       </p:ext>
     </p:extLst>
   </p:cSld>

</xml_diff>